<commit_message>
add disp page and profiles page and background page
</commit_message>
<xml_diff>
--- a/docs/src/images/logo.pptx
+++ b/docs/src/images/logo.pptx
@@ -2,18 +2,22 @@
 <file path=ppt/presentation.xml><?xml version="1.0" encoding="utf-8"?>
 <p:presentation xmlns:a="http://schemas.openxmlformats.org/drawingml/2006/main" xmlns:r="http://schemas.openxmlformats.org/officeDocument/2006/relationships" xmlns:p="http://schemas.openxmlformats.org/presentationml/2006/main" saveSubsetFonts="1" autoCompressPictures="0">
   <p:sldMasterIdLst>
-    <p:sldMasterId id="2147483648" r:id="rId1"/>
+    <p:sldMasterId id="2147483660" r:id="rId1"/>
   </p:sldMasterIdLst>
   <p:sldIdLst>
     <p:sldId id="256" r:id="rId2"/>
+    <p:sldId id="258" r:id="rId3"/>
+    <p:sldId id="257" r:id="rId4"/>
+    <p:sldId id="259" r:id="rId5"/>
+    <p:sldId id="260" r:id="rId6"/>
   </p:sldIdLst>
-  <p:sldSz cx="12192000" cy="6858000"/>
+  <p:sldSz cx="9321800" cy="7315200"/>
   <p:notesSz cx="6858000" cy="9144000"/>
   <p:defaultTextStyle>
     <a:defPPr>
       <a:defRPr lang="en-US"/>
     </a:defPPr>
-    <a:lvl1pPr marL="0" algn="l" defTabSz="914400" rtl="0" eaLnBrk="1" latinLnBrk="0" hangingPunct="1">
+    <a:lvl1pPr marL="0" algn="l" defTabSz="457200" rtl="0" eaLnBrk="1" latinLnBrk="0" hangingPunct="1">
       <a:defRPr sz="1800" kern="1200">
         <a:solidFill>
           <a:schemeClr val="tx1"/>
@@ -23,7 +27,7 @@
         <a:cs typeface="+mn-cs"/>
       </a:defRPr>
     </a:lvl1pPr>
-    <a:lvl2pPr marL="457200" algn="l" defTabSz="914400" rtl="0" eaLnBrk="1" latinLnBrk="0" hangingPunct="1">
+    <a:lvl2pPr marL="457200" algn="l" defTabSz="457200" rtl="0" eaLnBrk="1" latinLnBrk="0" hangingPunct="1">
       <a:defRPr sz="1800" kern="1200">
         <a:solidFill>
           <a:schemeClr val="tx1"/>
@@ -33,7 +37,7 @@
         <a:cs typeface="+mn-cs"/>
       </a:defRPr>
     </a:lvl2pPr>
-    <a:lvl3pPr marL="914400" algn="l" defTabSz="914400" rtl="0" eaLnBrk="1" latinLnBrk="0" hangingPunct="1">
+    <a:lvl3pPr marL="914400" algn="l" defTabSz="457200" rtl="0" eaLnBrk="1" latinLnBrk="0" hangingPunct="1">
       <a:defRPr sz="1800" kern="1200">
         <a:solidFill>
           <a:schemeClr val="tx1"/>
@@ -43,7 +47,7 @@
         <a:cs typeface="+mn-cs"/>
       </a:defRPr>
     </a:lvl3pPr>
-    <a:lvl4pPr marL="1371600" algn="l" defTabSz="914400" rtl="0" eaLnBrk="1" latinLnBrk="0" hangingPunct="1">
+    <a:lvl4pPr marL="1371600" algn="l" defTabSz="457200" rtl="0" eaLnBrk="1" latinLnBrk="0" hangingPunct="1">
       <a:defRPr sz="1800" kern="1200">
         <a:solidFill>
           <a:schemeClr val="tx1"/>
@@ -53,7 +57,7 @@
         <a:cs typeface="+mn-cs"/>
       </a:defRPr>
     </a:lvl4pPr>
-    <a:lvl5pPr marL="1828800" algn="l" defTabSz="914400" rtl="0" eaLnBrk="1" latinLnBrk="0" hangingPunct="1">
+    <a:lvl5pPr marL="1828800" algn="l" defTabSz="457200" rtl="0" eaLnBrk="1" latinLnBrk="0" hangingPunct="1">
       <a:defRPr sz="1800" kern="1200">
         <a:solidFill>
           <a:schemeClr val="tx1"/>
@@ -63,7 +67,7 @@
         <a:cs typeface="+mn-cs"/>
       </a:defRPr>
     </a:lvl5pPr>
-    <a:lvl6pPr marL="2286000" algn="l" defTabSz="914400" rtl="0" eaLnBrk="1" latinLnBrk="0" hangingPunct="1">
+    <a:lvl6pPr marL="2286000" algn="l" defTabSz="457200" rtl="0" eaLnBrk="1" latinLnBrk="0" hangingPunct="1">
       <a:defRPr sz="1800" kern="1200">
         <a:solidFill>
           <a:schemeClr val="tx1"/>
@@ -73,7 +77,7 @@
         <a:cs typeface="+mn-cs"/>
       </a:defRPr>
     </a:lvl6pPr>
-    <a:lvl7pPr marL="2743200" algn="l" defTabSz="914400" rtl="0" eaLnBrk="1" latinLnBrk="0" hangingPunct="1">
+    <a:lvl7pPr marL="2743200" algn="l" defTabSz="457200" rtl="0" eaLnBrk="1" latinLnBrk="0" hangingPunct="1">
       <a:defRPr sz="1800" kern="1200">
         <a:solidFill>
           <a:schemeClr val="tx1"/>
@@ -83,7 +87,7 @@
         <a:cs typeface="+mn-cs"/>
       </a:defRPr>
     </a:lvl7pPr>
-    <a:lvl8pPr marL="3200400" algn="l" defTabSz="914400" rtl="0" eaLnBrk="1" latinLnBrk="0" hangingPunct="1">
+    <a:lvl8pPr marL="3200400" algn="l" defTabSz="457200" rtl="0" eaLnBrk="1" latinLnBrk="0" hangingPunct="1">
       <a:defRPr sz="1800" kern="1200">
         <a:solidFill>
           <a:schemeClr val="tx1"/>
@@ -93,7 +97,7 @@
         <a:cs typeface="+mn-cs"/>
       </a:defRPr>
     </a:lvl8pPr>
-    <a:lvl9pPr marL="3657600" algn="l" defTabSz="914400" rtl="0" eaLnBrk="1" latinLnBrk="0" hangingPunct="1">
+    <a:lvl9pPr marL="3657600" algn="l" defTabSz="457200" rtl="0" eaLnBrk="1" latinLnBrk="0" hangingPunct="1">
       <a:defRPr sz="1800" kern="1200">
         <a:solidFill>
           <a:schemeClr val="tx1"/>
@@ -126,13 +130,7 @@
       </p:grpSpPr>
       <p:sp>
         <p:nvSpPr>
-          <p:cNvPr id="2" name="Title 1">
-            <a:extLst>
-              <a:ext uri="{FF2B5EF4-FFF2-40B4-BE49-F238E27FC236}">
-                <a16:creationId xmlns:a16="http://schemas.microsoft.com/office/drawing/2014/main" id="{FE4E9D6F-EC52-C052-23CC-FF96C0DB87A6}"/>
-              </a:ext>
-            </a:extLst>
-          </p:cNvPr>
+          <p:cNvPr id="2" name="Title 1"/>
           <p:cNvSpPr>
             <a:spLocks noGrp="1"/>
           </p:cNvSpPr>
@@ -142,20 +140,20 @@
         </p:nvSpPr>
         <p:spPr>
           <a:xfrm>
-            <a:off x="1524000" y="1122363"/>
-            <a:ext cx="9144000" cy="2387600"/>
+            <a:off x="699135" y="1197187"/>
+            <a:ext cx="7923530" cy="2546773"/>
           </a:xfrm>
         </p:spPr>
         <p:txBody>
           <a:bodyPr anchor="b"/>
           <a:lstStyle>
             <a:lvl1pPr algn="ctr">
-              <a:defRPr sz="6000"/>
+              <a:defRPr sz="6116"/>
             </a:lvl1pPr>
           </a:lstStyle>
           <a:p>
             <a:r>
-              <a:rPr lang="en-US"/>
+              <a:rPr lang="en-US" dirty="0"/>
               <a:t>Click to edit Master title style</a:t>
             </a:r>
           </a:p>
@@ -163,13 +161,7 @@
       </p:sp>
       <p:sp>
         <p:nvSpPr>
-          <p:cNvPr id="3" name="Subtitle 2">
-            <a:extLst>
-              <a:ext uri="{FF2B5EF4-FFF2-40B4-BE49-F238E27FC236}">
-                <a16:creationId xmlns:a16="http://schemas.microsoft.com/office/drawing/2014/main" id="{94C37860-9234-2565-0587-214F9B14B0D6}"/>
-              </a:ext>
-            </a:extLst>
-          </p:cNvPr>
+          <p:cNvPr id="3" name="Subtitle 2"/>
           <p:cNvSpPr>
             <a:spLocks noGrp="1"/>
           </p:cNvSpPr>
@@ -179,8 +171,8 @@
         </p:nvSpPr>
         <p:spPr>
           <a:xfrm>
-            <a:off x="1524000" y="3602038"/>
-            <a:ext cx="9144000" cy="1655762"/>
+            <a:off x="1165225" y="3842174"/>
+            <a:ext cx="6991350" cy="1766146"/>
           </a:xfrm>
         </p:spPr>
         <p:txBody>
@@ -188,44 +180,44 @@
           <a:lstStyle>
             <a:lvl1pPr marL="0" indent="0" algn="ctr">
               <a:buNone/>
-              <a:defRPr sz="2400"/>
+              <a:defRPr sz="2447"/>
             </a:lvl1pPr>
-            <a:lvl2pPr marL="457200" indent="0" algn="ctr">
-              <a:buNone/>
-              <a:defRPr sz="2000"/>
+            <a:lvl2pPr marL="466070" indent="0" algn="ctr">
+              <a:buNone/>
+              <a:defRPr sz="2039"/>
             </a:lvl2pPr>
-            <a:lvl3pPr marL="914400" indent="0" algn="ctr">
-              <a:buNone/>
-              <a:defRPr sz="1800"/>
+            <a:lvl3pPr marL="932139" indent="0" algn="ctr">
+              <a:buNone/>
+              <a:defRPr sz="1835"/>
             </a:lvl3pPr>
-            <a:lvl4pPr marL="1371600" indent="0" algn="ctr">
-              <a:buNone/>
-              <a:defRPr sz="1600"/>
+            <a:lvl4pPr marL="1398209" indent="0" algn="ctr">
+              <a:buNone/>
+              <a:defRPr sz="1631"/>
             </a:lvl4pPr>
-            <a:lvl5pPr marL="1828800" indent="0" algn="ctr">
-              <a:buNone/>
-              <a:defRPr sz="1600"/>
+            <a:lvl5pPr marL="1864279" indent="0" algn="ctr">
+              <a:buNone/>
+              <a:defRPr sz="1631"/>
             </a:lvl5pPr>
-            <a:lvl6pPr marL="2286000" indent="0" algn="ctr">
-              <a:buNone/>
-              <a:defRPr sz="1600"/>
+            <a:lvl6pPr marL="2330348" indent="0" algn="ctr">
+              <a:buNone/>
+              <a:defRPr sz="1631"/>
             </a:lvl6pPr>
-            <a:lvl7pPr marL="2743200" indent="0" algn="ctr">
-              <a:buNone/>
-              <a:defRPr sz="1600"/>
+            <a:lvl7pPr marL="2796418" indent="0" algn="ctr">
+              <a:buNone/>
+              <a:defRPr sz="1631"/>
             </a:lvl7pPr>
-            <a:lvl8pPr marL="3200400" indent="0" algn="ctr">
-              <a:buNone/>
-              <a:defRPr sz="1600"/>
+            <a:lvl8pPr marL="3262488" indent="0" algn="ctr">
+              <a:buNone/>
+              <a:defRPr sz="1631"/>
             </a:lvl8pPr>
-            <a:lvl9pPr marL="3657600" indent="0" algn="ctr">
-              <a:buNone/>
-              <a:defRPr sz="1600"/>
+            <a:lvl9pPr marL="3728557" indent="0" algn="ctr">
+              <a:buNone/>
+              <a:defRPr sz="1631"/>
             </a:lvl9pPr>
           </a:lstStyle>
           <a:p>
             <a:r>
-              <a:rPr lang="en-US"/>
+              <a:rPr lang="en-US" dirty="0"/>
               <a:t>Click to edit Master subtitle style</a:t>
             </a:r>
           </a:p>
@@ -233,13 +225,7 @@
       </p:sp>
       <p:sp>
         <p:nvSpPr>
-          <p:cNvPr id="4" name="Date Placeholder 3">
-            <a:extLst>
-              <a:ext uri="{FF2B5EF4-FFF2-40B4-BE49-F238E27FC236}">
-                <a16:creationId xmlns:a16="http://schemas.microsoft.com/office/drawing/2014/main" id="{D4C3B5EE-8909-A849-B35E-8B2D980FA0D4}"/>
-              </a:ext>
-            </a:extLst>
-          </p:cNvPr>
+          <p:cNvPr id="4" name="Date Placeholder 3"/>
           <p:cNvSpPr>
             <a:spLocks noGrp="1"/>
           </p:cNvSpPr>
@@ -261,13 +247,7 @@
       </p:sp>
       <p:sp>
         <p:nvSpPr>
-          <p:cNvPr id="5" name="Footer Placeholder 4">
-            <a:extLst>
-              <a:ext uri="{FF2B5EF4-FFF2-40B4-BE49-F238E27FC236}">
-                <a16:creationId xmlns:a16="http://schemas.microsoft.com/office/drawing/2014/main" id="{B4601656-5AF2-2951-94E8-A4D09B97CB05}"/>
-              </a:ext>
-            </a:extLst>
-          </p:cNvPr>
+          <p:cNvPr id="5" name="Footer Placeholder 4"/>
           <p:cNvSpPr>
             <a:spLocks noGrp="1"/>
           </p:cNvSpPr>
@@ -286,13 +266,7 @@
       </p:sp>
       <p:sp>
         <p:nvSpPr>
-          <p:cNvPr id="6" name="Slide Number Placeholder 5">
-            <a:extLst>
-              <a:ext uri="{FF2B5EF4-FFF2-40B4-BE49-F238E27FC236}">
-                <a16:creationId xmlns:a16="http://schemas.microsoft.com/office/drawing/2014/main" id="{6053241B-299D-1CEB-7423-25DAFD5376A0}"/>
-              </a:ext>
-            </a:extLst>
-          </p:cNvPr>
+          <p:cNvPr id="6" name="Slide Number Placeholder 5"/>
           <p:cNvSpPr>
             <a:spLocks noGrp="1"/>
           </p:cNvSpPr>
@@ -315,7 +289,7 @@
     </p:spTree>
     <p:extLst>
       <p:ext uri="{BB962C8B-B14F-4D97-AF65-F5344CB8AC3E}">
-        <p14:creationId xmlns:p14="http://schemas.microsoft.com/office/powerpoint/2010/main" val="1311673409"/>
+        <p14:creationId xmlns:p14="http://schemas.microsoft.com/office/powerpoint/2010/main" val="1449304606"/>
       </p:ext>
     </p:extLst>
   </p:cSld>
@@ -344,13 +318,7 @@
       </p:grpSpPr>
       <p:sp>
         <p:nvSpPr>
-          <p:cNvPr id="2" name="Title 1">
-            <a:extLst>
-              <a:ext uri="{FF2B5EF4-FFF2-40B4-BE49-F238E27FC236}">
-                <a16:creationId xmlns:a16="http://schemas.microsoft.com/office/drawing/2014/main" id="{64BE8865-38EF-B15B-01E9-90F3A4B787C1}"/>
-              </a:ext>
-            </a:extLst>
-          </p:cNvPr>
+          <p:cNvPr id="2" name="Title 1"/>
           <p:cNvSpPr>
             <a:spLocks noGrp="1"/>
           </p:cNvSpPr>
@@ -364,7 +332,7 @@
           <a:lstStyle/>
           <a:p>
             <a:r>
-              <a:rPr lang="en-US"/>
+              <a:rPr lang="en-US" dirty="0"/>
               <a:t>Click to edit Master title style</a:t>
             </a:r>
           </a:p>
@@ -372,13 +340,7 @@
       </p:sp>
       <p:sp>
         <p:nvSpPr>
-          <p:cNvPr id="3" name="Vertical Text Placeholder 2">
-            <a:extLst>
-              <a:ext uri="{FF2B5EF4-FFF2-40B4-BE49-F238E27FC236}">
-                <a16:creationId xmlns:a16="http://schemas.microsoft.com/office/drawing/2014/main" id="{AA3454C8-CE8D-133D-A90C-0360C139A620}"/>
-              </a:ext>
-            </a:extLst>
-          </p:cNvPr>
+          <p:cNvPr id="3" name="Vertical Text Placeholder 2"/>
           <p:cNvSpPr>
             <a:spLocks noGrp="1"/>
           </p:cNvSpPr>
@@ -393,35 +355,35 @@
           <a:p>
             <a:pPr lvl="0"/>
             <a:r>
-              <a:rPr lang="en-US"/>
+              <a:rPr lang="en-US" dirty="0"/>
               <a:t>Click to edit Master text styles</a:t>
             </a:r>
           </a:p>
           <a:p>
             <a:pPr lvl="1"/>
             <a:r>
-              <a:rPr lang="en-US"/>
+              <a:rPr lang="en-US" dirty="0"/>
               <a:t>Second level</a:t>
             </a:r>
           </a:p>
           <a:p>
             <a:pPr lvl="2"/>
             <a:r>
-              <a:rPr lang="en-US"/>
+              <a:rPr lang="en-US" dirty="0"/>
               <a:t>Third level</a:t>
             </a:r>
           </a:p>
           <a:p>
             <a:pPr lvl="3"/>
             <a:r>
-              <a:rPr lang="en-US"/>
+              <a:rPr lang="en-US" dirty="0"/>
               <a:t>Fourth level</a:t>
             </a:r>
           </a:p>
           <a:p>
             <a:pPr lvl="4"/>
             <a:r>
-              <a:rPr lang="en-US"/>
+              <a:rPr lang="en-US" dirty="0"/>
               <a:t>Fifth level</a:t>
             </a:r>
           </a:p>
@@ -429,13 +391,7 @@
       </p:sp>
       <p:sp>
         <p:nvSpPr>
-          <p:cNvPr id="4" name="Date Placeholder 3">
-            <a:extLst>
-              <a:ext uri="{FF2B5EF4-FFF2-40B4-BE49-F238E27FC236}">
-                <a16:creationId xmlns:a16="http://schemas.microsoft.com/office/drawing/2014/main" id="{56C96A1D-B41C-63B1-002E-90AA90CFEB95}"/>
-              </a:ext>
-            </a:extLst>
-          </p:cNvPr>
+          <p:cNvPr id="4" name="Date Placeholder 3"/>
           <p:cNvSpPr>
             <a:spLocks noGrp="1"/>
           </p:cNvSpPr>
@@ -457,13 +413,7 @@
       </p:sp>
       <p:sp>
         <p:nvSpPr>
-          <p:cNvPr id="5" name="Footer Placeholder 4">
-            <a:extLst>
-              <a:ext uri="{FF2B5EF4-FFF2-40B4-BE49-F238E27FC236}">
-                <a16:creationId xmlns:a16="http://schemas.microsoft.com/office/drawing/2014/main" id="{2B6C003A-8E04-6B56-9E58-43C7EF6C3E29}"/>
-              </a:ext>
-            </a:extLst>
-          </p:cNvPr>
+          <p:cNvPr id="5" name="Footer Placeholder 4"/>
           <p:cNvSpPr>
             <a:spLocks noGrp="1"/>
           </p:cNvSpPr>
@@ -482,13 +432,7 @@
       </p:sp>
       <p:sp>
         <p:nvSpPr>
-          <p:cNvPr id="6" name="Slide Number Placeholder 5">
-            <a:extLst>
-              <a:ext uri="{FF2B5EF4-FFF2-40B4-BE49-F238E27FC236}">
-                <a16:creationId xmlns:a16="http://schemas.microsoft.com/office/drawing/2014/main" id="{3CD7FA33-A873-2A43-EBFA-1EB9D022663F}"/>
-              </a:ext>
-            </a:extLst>
-          </p:cNvPr>
+          <p:cNvPr id="6" name="Slide Number Placeholder 5"/>
           <p:cNvSpPr>
             <a:spLocks noGrp="1"/>
           </p:cNvSpPr>
@@ -511,7 +455,7 @@
     </p:spTree>
     <p:extLst>
       <p:ext uri="{BB962C8B-B14F-4D97-AF65-F5344CB8AC3E}">
-        <p14:creationId xmlns:p14="http://schemas.microsoft.com/office/powerpoint/2010/main" val="2466425722"/>
+        <p14:creationId xmlns:p14="http://schemas.microsoft.com/office/powerpoint/2010/main" val="3637871058"/>
       </p:ext>
     </p:extLst>
   </p:cSld>
@@ -540,13 +484,7 @@
       </p:grpSpPr>
       <p:sp>
         <p:nvSpPr>
-          <p:cNvPr id="2" name="Vertical Title 1">
-            <a:extLst>
-              <a:ext uri="{FF2B5EF4-FFF2-40B4-BE49-F238E27FC236}">
-                <a16:creationId xmlns:a16="http://schemas.microsoft.com/office/drawing/2014/main" id="{FC36039B-1CD3-98FF-52FC-A0FD1B0F92A2}"/>
-              </a:ext>
-            </a:extLst>
-          </p:cNvPr>
+          <p:cNvPr id="2" name="Vertical Title 1"/>
           <p:cNvSpPr>
             <a:spLocks noGrp="1"/>
           </p:cNvSpPr>
@@ -556,8 +494,8 @@
         </p:nvSpPr>
         <p:spPr>
           <a:xfrm>
-            <a:off x="8724900" y="365125"/>
-            <a:ext cx="2628900" cy="5811838"/>
+            <a:off x="6670914" y="389467"/>
+            <a:ext cx="2010013" cy="6199294"/>
           </a:xfrm>
         </p:spPr>
         <p:txBody>
@@ -565,7 +503,7 @@
           <a:lstStyle/>
           <a:p>
             <a:r>
-              <a:rPr lang="en-US"/>
+              <a:rPr lang="en-US" dirty="0"/>
               <a:t>Click to edit Master title style</a:t>
             </a:r>
           </a:p>
@@ -573,13 +511,7 @@
       </p:sp>
       <p:sp>
         <p:nvSpPr>
-          <p:cNvPr id="3" name="Vertical Text Placeholder 2">
-            <a:extLst>
-              <a:ext uri="{FF2B5EF4-FFF2-40B4-BE49-F238E27FC236}">
-                <a16:creationId xmlns:a16="http://schemas.microsoft.com/office/drawing/2014/main" id="{49F587E5-6B92-E5AD-EB56-5610A0C74007}"/>
-              </a:ext>
-            </a:extLst>
-          </p:cNvPr>
+          <p:cNvPr id="3" name="Vertical Text Placeholder 2"/>
           <p:cNvSpPr>
             <a:spLocks noGrp="1"/>
           </p:cNvSpPr>
@@ -589,8 +521,8 @@
         </p:nvSpPr>
         <p:spPr>
           <a:xfrm>
-            <a:off x="838200" y="365125"/>
-            <a:ext cx="7734300" cy="5811838"/>
+            <a:off x="640874" y="389467"/>
+            <a:ext cx="5913517" cy="6199294"/>
           </a:xfrm>
         </p:spPr>
         <p:txBody>
@@ -599,35 +531,35 @@
           <a:p>
             <a:pPr lvl="0"/>
             <a:r>
-              <a:rPr lang="en-US"/>
+              <a:rPr lang="en-US" dirty="0"/>
               <a:t>Click to edit Master text styles</a:t>
             </a:r>
           </a:p>
           <a:p>
             <a:pPr lvl="1"/>
             <a:r>
-              <a:rPr lang="en-US"/>
+              <a:rPr lang="en-US" dirty="0"/>
               <a:t>Second level</a:t>
             </a:r>
           </a:p>
           <a:p>
             <a:pPr lvl="2"/>
             <a:r>
-              <a:rPr lang="en-US"/>
+              <a:rPr lang="en-US" dirty="0"/>
               <a:t>Third level</a:t>
             </a:r>
           </a:p>
           <a:p>
             <a:pPr lvl="3"/>
             <a:r>
-              <a:rPr lang="en-US"/>
+              <a:rPr lang="en-US" dirty="0"/>
               <a:t>Fourth level</a:t>
             </a:r>
           </a:p>
           <a:p>
             <a:pPr lvl="4"/>
             <a:r>
-              <a:rPr lang="en-US"/>
+              <a:rPr lang="en-US" dirty="0"/>
               <a:t>Fifth level</a:t>
             </a:r>
           </a:p>
@@ -635,13 +567,7 @@
       </p:sp>
       <p:sp>
         <p:nvSpPr>
-          <p:cNvPr id="4" name="Date Placeholder 3">
-            <a:extLst>
-              <a:ext uri="{FF2B5EF4-FFF2-40B4-BE49-F238E27FC236}">
-                <a16:creationId xmlns:a16="http://schemas.microsoft.com/office/drawing/2014/main" id="{4C5D51D9-847C-2824-DF1C-57C2BDBEA44A}"/>
-              </a:ext>
-            </a:extLst>
-          </p:cNvPr>
+          <p:cNvPr id="4" name="Date Placeholder 3"/>
           <p:cNvSpPr>
             <a:spLocks noGrp="1"/>
           </p:cNvSpPr>
@@ -663,13 +589,7 @@
       </p:sp>
       <p:sp>
         <p:nvSpPr>
-          <p:cNvPr id="5" name="Footer Placeholder 4">
-            <a:extLst>
-              <a:ext uri="{FF2B5EF4-FFF2-40B4-BE49-F238E27FC236}">
-                <a16:creationId xmlns:a16="http://schemas.microsoft.com/office/drawing/2014/main" id="{C96833DC-AAE6-8B0F-FC33-B2C4EF8A00CA}"/>
-              </a:ext>
-            </a:extLst>
-          </p:cNvPr>
+          <p:cNvPr id="5" name="Footer Placeholder 4"/>
           <p:cNvSpPr>
             <a:spLocks noGrp="1"/>
           </p:cNvSpPr>
@@ -688,13 +608,7 @@
       </p:sp>
       <p:sp>
         <p:nvSpPr>
-          <p:cNvPr id="6" name="Slide Number Placeholder 5">
-            <a:extLst>
-              <a:ext uri="{FF2B5EF4-FFF2-40B4-BE49-F238E27FC236}">
-                <a16:creationId xmlns:a16="http://schemas.microsoft.com/office/drawing/2014/main" id="{CFEB4907-108F-15DA-A3EE-8C7FF12C334C}"/>
-              </a:ext>
-            </a:extLst>
-          </p:cNvPr>
+          <p:cNvPr id="6" name="Slide Number Placeholder 5"/>
           <p:cNvSpPr>
             <a:spLocks noGrp="1"/>
           </p:cNvSpPr>
@@ -717,7 +631,7 @@
     </p:spTree>
     <p:extLst>
       <p:ext uri="{BB962C8B-B14F-4D97-AF65-F5344CB8AC3E}">
-        <p14:creationId xmlns:p14="http://schemas.microsoft.com/office/powerpoint/2010/main" val="544720747"/>
+        <p14:creationId xmlns:p14="http://schemas.microsoft.com/office/powerpoint/2010/main" val="1976697675"/>
       </p:ext>
     </p:extLst>
   </p:cSld>
@@ -746,13 +660,7 @@
       </p:grpSpPr>
       <p:sp>
         <p:nvSpPr>
-          <p:cNvPr id="2" name="Title 1">
-            <a:extLst>
-              <a:ext uri="{FF2B5EF4-FFF2-40B4-BE49-F238E27FC236}">
-                <a16:creationId xmlns:a16="http://schemas.microsoft.com/office/drawing/2014/main" id="{43203647-5E90-6F58-258E-26ACAC391546}"/>
-              </a:ext>
-            </a:extLst>
-          </p:cNvPr>
+          <p:cNvPr id="2" name="Title 1"/>
           <p:cNvSpPr>
             <a:spLocks noGrp="1"/>
           </p:cNvSpPr>
@@ -766,7 +674,7 @@
           <a:lstStyle/>
           <a:p>
             <a:r>
-              <a:rPr lang="en-US"/>
+              <a:rPr lang="en-US" dirty="0"/>
               <a:t>Click to edit Master title style</a:t>
             </a:r>
           </a:p>
@@ -774,13 +682,7 @@
       </p:sp>
       <p:sp>
         <p:nvSpPr>
-          <p:cNvPr id="3" name="Content Placeholder 2">
-            <a:extLst>
-              <a:ext uri="{FF2B5EF4-FFF2-40B4-BE49-F238E27FC236}">
-                <a16:creationId xmlns:a16="http://schemas.microsoft.com/office/drawing/2014/main" id="{100667F9-2163-46DD-15ED-4FDD017BC984}"/>
-              </a:ext>
-            </a:extLst>
-          </p:cNvPr>
+          <p:cNvPr id="3" name="Content Placeholder 2"/>
           <p:cNvSpPr>
             <a:spLocks noGrp="1"/>
           </p:cNvSpPr>
@@ -795,35 +697,35 @@
           <a:p>
             <a:pPr lvl="0"/>
             <a:r>
-              <a:rPr lang="en-US"/>
+              <a:rPr lang="en-US" dirty="0"/>
               <a:t>Click to edit Master text styles</a:t>
             </a:r>
           </a:p>
           <a:p>
             <a:pPr lvl="1"/>
             <a:r>
-              <a:rPr lang="en-US"/>
+              <a:rPr lang="en-US" dirty="0"/>
               <a:t>Second level</a:t>
             </a:r>
           </a:p>
           <a:p>
             <a:pPr lvl="2"/>
             <a:r>
-              <a:rPr lang="en-US"/>
+              <a:rPr lang="en-US" dirty="0"/>
               <a:t>Third level</a:t>
             </a:r>
           </a:p>
           <a:p>
             <a:pPr lvl="3"/>
             <a:r>
-              <a:rPr lang="en-US"/>
+              <a:rPr lang="en-US" dirty="0"/>
               <a:t>Fourth level</a:t>
             </a:r>
           </a:p>
           <a:p>
             <a:pPr lvl="4"/>
             <a:r>
-              <a:rPr lang="en-US"/>
+              <a:rPr lang="en-US" dirty="0"/>
               <a:t>Fifth level</a:t>
             </a:r>
           </a:p>
@@ -831,13 +733,7 @@
       </p:sp>
       <p:sp>
         <p:nvSpPr>
-          <p:cNvPr id="4" name="Date Placeholder 3">
-            <a:extLst>
-              <a:ext uri="{FF2B5EF4-FFF2-40B4-BE49-F238E27FC236}">
-                <a16:creationId xmlns:a16="http://schemas.microsoft.com/office/drawing/2014/main" id="{3423E3A7-A969-11B5-2124-2B34E3CB0AF4}"/>
-              </a:ext>
-            </a:extLst>
-          </p:cNvPr>
+          <p:cNvPr id="4" name="Date Placeholder 3"/>
           <p:cNvSpPr>
             <a:spLocks noGrp="1"/>
           </p:cNvSpPr>
@@ -859,13 +755,7 @@
       </p:sp>
       <p:sp>
         <p:nvSpPr>
-          <p:cNvPr id="5" name="Footer Placeholder 4">
-            <a:extLst>
-              <a:ext uri="{FF2B5EF4-FFF2-40B4-BE49-F238E27FC236}">
-                <a16:creationId xmlns:a16="http://schemas.microsoft.com/office/drawing/2014/main" id="{144F55AF-3111-2C8A-60D5-5E04FB5F548E}"/>
-              </a:ext>
-            </a:extLst>
-          </p:cNvPr>
+          <p:cNvPr id="5" name="Footer Placeholder 4"/>
           <p:cNvSpPr>
             <a:spLocks noGrp="1"/>
           </p:cNvSpPr>
@@ -884,13 +774,7 @@
       </p:sp>
       <p:sp>
         <p:nvSpPr>
-          <p:cNvPr id="6" name="Slide Number Placeholder 5">
-            <a:extLst>
-              <a:ext uri="{FF2B5EF4-FFF2-40B4-BE49-F238E27FC236}">
-                <a16:creationId xmlns:a16="http://schemas.microsoft.com/office/drawing/2014/main" id="{55CDF413-88A0-ECA3-F151-5D1981590E9D}"/>
-              </a:ext>
-            </a:extLst>
-          </p:cNvPr>
+          <p:cNvPr id="6" name="Slide Number Placeholder 5"/>
           <p:cNvSpPr>
             <a:spLocks noGrp="1"/>
           </p:cNvSpPr>
@@ -913,7 +797,7 @@
     </p:spTree>
     <p:extLst>
       <p:ext uri="{BB962C8B-B14F-4D97-AF65-F5344CB8AC3E}">
-        <p14:creationId xmlns:p14="http://schemas.microsoft.com/office/powerpoint/2010/main" val="1372075612"/>
+        <p14:creationId xmlns:p14="http://schemas.microsoft.com/office/powerpoint/2010/main" val="1572556124"/>
       </p:ext>
     </p:extLst>
   </p:cSld>
@@ -942,13 +826,7 @@
       </p:grpSpPr>
       <p:sp>
         <p:nvSpPr>
-          <p:cNvPr id="2" name="Title 1">
-            <a:extLst>
-              <a:ext uri="{FF2B5EF4-FFF2-40B4-BE49-F238E27FC236}">
-                <a16:creationId xmlns:a16="http://schemas.microsoft.com/office/drawing/2014/main" id="{19A35142-6677-5CDB-1E80-C5FAD2ED9131}"/>
-              </a:ext>
-            </a:extLst>
-          </p:cNvPr>
+          <p:cNvPr id="2" name="Title 1"/>
           <p:cNvSpPr>
             <a:spLocks noGrp="1"/>
           </p:cNvSpPr>
@@ -958,20 +836,20 @@
         </p:nvSpPr>
         <p:spPr>
           <a:xfrm>
-            <a:off x="831850" y="1709738"/>
-            <a:ext cx="10515600" cy="2852737"/>
+            <a:off x="636019" y="1823722"/>
+            <a:ext cx="8040053" cy="3042919"/>
           </a:xfrm>
         </p:spPr>
         <p:txBody>
           <a:bodyPr anchor="b"/>
           <a:lstStyle>
             <a:lvl1pPr>
-              <a:defRPr sz="6000"/>
+              <a:defRPr sz="6116"/>
             </a:lvl1pPr>
           </a:lstStyle>
           <a:p>
             <a:r>
-              <a:rPr lang="en-US"/>
+              <a:rPr lang="en-US" dirty="0"/>
               <a:t>Click to edit Master title style</a:t>
             </a:r>
           </a:p>
@@ -979,13 +857,7 @@
       </p:sp>
       <p:sp>
         <p:nvSpPr>
-          <p:cNvPr id="3" name="Text Placeholder 2">
-            <a:extLst>
-              <a:ext uri="{FF2B5EF4-FFF2-40B4-BE49-F238E27FC236}">
-                <a16:creationId xmlns:a16="http://schemas.microsoft.com/office/drawing/2014/main" id="{132A046A-6F6D-A23B-5074-67B865D520AA}"/>
-              </a:ext>
-            </a:extLst>
-          </p:cNvPr>
+          <p:cNvPr id="3" name="Text Placeholder 2"/>
           <p:cNvSpPr>
             <a:spLocks noGrp="1"/>
           </p:cNvSpPr>
@@ -995,8 +867,8 @@
         </p:nvSpPr>
         <p:spPr>
           <a:xfrm>
-            <a:off x="831850" y="4589463"/>
-            <a:ext cx="10515600" cy="1500187"/>
+            <a:off x="636019" y="4895429"/>
+            <a:ext cx="8040053" cy="1600199"/>
           </a:xfrm>
         </p:spPr>
         <p:txBody>
@@ -1004,17 +876,15 @@
           <a:lstStyle>
             <a:lvl1pPr marL="0" indent="0">
               <a:buNone/>
-              <a:defRPr sz="2400">
+              <a:defRPr sz="2447">
                 <a:solidFill>
-                  <a:schemeClr val="tx1">
-                    <a:tint val="75000"/>
-                  </a:schemeClr>
+                  <a:schemeClr val="tx1"/>
                 </a:solidFill>
               </a:defRPr>
             </a:lvl1pPr>
-            <a:lvl2pPr marL="457200" indent="0">
-              <a:buNone/>
-              <a:defRPr sz="2000">
+            <a:lvl2pPr marL="466070" indent="0">
+              <a:buNone/>
+              <a:defRPr sz="2039">
                 <a:solidFill>
                   <a:schemeClr val="tx1">
                     <a:tint val="75000"/>
@@ -1022,9 +892,9 @@
                 </a:solidFill>
               </a:defRPr>
             </a:lvl2pPr>
-            <a:lvl3pPr marL="914400" indent="0">
-              <a:buNone/>
-              <a:defRPr sz="1800">
+            <a:lvl3pPr marL="932139" indent="0">
+              <a:buNone/>
+              <a:defRPr sz="1835">
                 <a:solidFill>
                   <a:schemeClr val="tx1">
                     <a:tint val="75000"/>
@@ -1032,9 +902,9 @@
                 </a:solidFill>
               </a:defRPr>
             </a:lvl3pPr>
-            <a:lvl4pPr marL="1371600" indent="0">
-              <a:buNone/>
-              <a:defRPr sz="1600">
+            <a:lvl4pPr marL="1398209" indent="0">
+              <a:buNone/>
+              <a:defRPr sz="1631">
                 <a:solidFill>
                   <a:schemeClr val="tx1">
                     <a:tint val="75000"/>
@@ -1042,9 +912,9 @@
                 </a:solidFill>
               </a:defRPr>
             </a:lvl4pPr>
-            <a:lvl5pPr marL="1828800" indent="0">
-              <a:buNone/>
-              <a:defRPr sz="1600">
+            <a:lvl5pPr marL="1864279" indent="0">
+              <a:buNone/>
+              <a:defRPr sz="1631">
                 <a:solidFill>
                   <a:schemeClr val="tx1">
                     <a:tint val="75000"/>
@@ -1052,9 +922,9 @@
                 </a:solidFill>
               </a:defRPr>
             </a:lvl5pPr>
-            <a:lvl6pPr marL="2286000" indent="0">
-              <a:buNone/>
-              <a:defRPr sz="1600">
+            <a:lvl6pPr marL="2330348" indent="0">
+              <a:buNone/>
+              <a:defRPr sz="1631">
                 <a:solidFill>
                   <a:schemeClr val="tx1">
                     <a:tint val="75000"/>
@@ -1062,9 +932,9 @@
                 </a:solidFill>
               </a:defRPr>
             </a:lvl6pPr>
-            <a:lvl7pPr marL="2743200" indent="0">
-              <a:buNone/>
-              <a:defRPr sz="1600">
+            <a:lvl7pPr marL="2796418" indent="0">
+              <a:buNone/>
+              <a:defRPr sz="1631">
                 <a:solidFill>
                   <a:schemeClr val="tx1">
                     <a:tint val="75000"/>
@@ -1072,9 +942,9 @@
                 </a:solidFill>
               </a:defRPr>
             </a:lvl7pPr>
-            <a:lvl8pPr marL="3200400" indent="0">
-              <a:buNone/>
-              <a:defRPr sz="1600">
+            <a:lvl8pPr marL="3262488" indent="0">
+              <a:buNone/>
+              <a:defRPr sz="1631">
                 <a:solidFill>
                   <a:schemeClr val="tx1">
                     <a:tint val="75000"/>
@@ -1082,9 +952,9 @@
                 </a:solidFill>
               </a:defRPr>
             </a:lvl8pPr>
-            <a:lvl9pPr marL="3657600" indent="0">
-              <a:buNone/>
-              <a:defRPr sz="1600">
+            <a:lvl9pPr marL="3728557" indent="0">
+              <a:buNone/>
+              <a:defRPr sz="1631">
                 <a:solidFill>
                   <a:schemeClr val="tx1">
                     <a:tint val="75000"/>
@@ -1096,7 +966,7 @@
           <a:p>
             <a:pPr lvl="0"/>
             <a:r>
-              <a:rPr lang="en-US"/>
+              <a:rPr lang="en-US" dirty="0"/>
               <a:t>Click to edit Master text styles</a:t>
             </a:r>
           </a:p>
@@ -1104,13 +974,7 @@
       </p:sp>
       <p:sp>
         <p:nvSpPr>
-          <p:cNvPr id="4" name="Date Placeholder 3">
-            <a:extLst>
-              <a:ext uri="{FF2B5EF4-FFF2-40B4-BE49-F238E27FC236}">
-                <a16:creationId xmlns:a16="http://schemas.microsoft.com/office/drawing/2014/main" id="{F7E9FA78-6DFF-3995-9E2E-2A3D7239DB76}"/>
-              </a:ext>
-            </a:extLst>
-          </p:cNvPr>
+          <p:cNvPr id="4" name="Date Placeholder 3"/>
           <p:cNvSpPr>
             <a:spLocks noGrp="1"/>
           </p:cNvSpPr>
@@ -1132,13 +996,7 @@
       </p:sp>
       <p:sp>
         <p:nvSpPr>
-          <p:cNvPr id="5" name="Footer Placeholder 4">
-            <a:extLst>
-              <a:ext uri="{FF2B5EF4-FFF2-40B4-BE49-F238E27FC236}">
-                <a16:creationId xmlns:a16="http://schemas.microsoft.com/office/drawing/2014/main" id="{DE9547BA-46A7-2A02-BA82-54D50E725595}"/>
-              </a:ext>
-            </a:extLst>
-          </p:cNvPr>
+          <p:cNvPr id="5" name="Footer Placeholder 4"/>
           <p:cNvSpPr>
             <a:spLocks noGrp="1"/>
           </p:cNvSpPr>
@@ -1157,13 +1015,7 @@
       </p:sp>
       <p:sp>
         <p:nvSpPr>
-          <p:cNvPr id="6" name="Slide Number Placeholder 5">
-            <a:extLst>
-              <a:ext uri="{FF2B5EF4-FFF2-40B4-BE49-F238E27FC236}">
-                <a16:creationId xmlns:a16="http://schemas.microsoft.com/office/drawing/2014/main" id="{C2F6A79A-436D-028F-F50A-D7305D7E47E1}"/>
-              </a:ext>
-            </a:extLst>
-          </p:cNvPr>
+          <p:cNvPr id="6" name="Slide Number Placeholder 5"/>
           <p:cNvSpPr>
             <a:spLocks noGrp="1"/>
           </p:cNvSpPr>
@@ -1186,7 +1038,7 @@
     </p:spTree>
     <p:extLst>
       <p:ext uri="{BB962C8B-B14F-4D97-AF65-F5344CB8AC3E}">
-        <p14:creationId xmlns:p14="http://schemas.microsoft.com/office/powerpoint/2010/main" val="1476651687"/>
+        <p14:creationId xmlns:p14="http://schemas.microsoft.com/office/powerpoint/2010/main" val="3142303288"/>
       </p:ext>
     </p:extLst>
   </p:cSld>
@@ -1215,13 +1067,7 @@
       </p:grpSpPr>
       <p:sp>
         <p:nvSpPr>
-          <p:cNvPr id="2" name="Title 1">
-            <a:extLst>
-              <a:ext uri="{FF2B5EF4-FFF2-40B4-BE49-F238E27FC236}">
-                <a16:creationId xmlns:a16="http://schemas.microsoft.com/office/drawing/2014/main" id="{E792470A-4330-D1D7-8DBE-AE836D96A7A7}"/>
-              </a:ext>
-            </a:extLst>
-          </p:cNvPr>
+          <p:cNvPr id="2" name="Title 1"/>
           <p:cNvSpPr>
             <a:spLocks noGrp="1"/>
           </p:cNvSpPr>
@@ -1235,7 +1081,7 @@
           <a:lstStyle/>
           <a:p>
             <a:r>
-              <a:rPr lang="en-US"/>
+              <a:rPr lang="en-US" dirty="0"/>
               <a:t>Click to edit Master title style</a:t>
             </a:r>
           </a:p>
@@ -1243,13 +1089,7 @@
       </p:sp>
       <p:sp>
         <p:nvSpPr>
-          <p:cNvPr id="3" name="Content Placeholder 2">
-            <a:extLst>
-              <a:ext uri="{FF2B5EF4-FFF2-40B4-BE49-F238E27FC236}">
-                <a16:creationId xmlns:a16="http://schemas.microsoft.com/office/drawing/2014/main" id="{4BCEF5CE-FC65-34C7-AE15-CB094C96391E}"/>
-              </a:ext>
-            </a:extLst>
-          </p:cNvPr>
+          <p:cNvPr id="3" name="Content Placeholder 2"/>
           <p:cNvSpPr>
             <a:spLocks noGrp="1"/>
           </p:cNvSpPr>
@@ -1259,8 +1099,8 @@
         </p:nvSpPr>
         <p:spPr>
           <a:xfrm>
-            <a:off x="838200" y="1825625"/>
-            <a:ext cx="5181600" cy="4351338"/>
+            <a:off x="640874" y="1947333"/>
+            <a:ext cx="3961765" cy="4641427"/>
           </a:xfrm>
         </p:spPr>
         <p:txBody>
@@ -1269,35 +1109,35 @@
           <a:p>
             <a:pPr lvl="0"/>
             <a:r>
-              <a:rPr lang="en-US"/>
+              <a:rPr lang="en-US" dirty="0"/>
               <a:t>Click to edit Master text styles</a:t>
             </a:r>
           </a:p>
           <a:p>
             <a:pPr lvl="1"/>
             <a:r>
-              <a:rPr lang="en-US"/>
+              <a:rPr lang="en-US" dirty="0"/>
               <a:t>Second level</a:t>
             </a:r>
           </a:p>
           <a:p>
             <a:pPr lvl="2"/>
             <a:r>
-              <a:rPr lang="en-US"/>
+              <a:rPr lang="en-US" dirty="0"/>
               <a:t>Third level</a:t>
             </a:r>
           </a:p>
           <a:p>
             <a:pPr lvl="3"/>
             <a:r>
-              <a:rPr lang="en-US"/>
+              <a:rPr lang="en-US" dirty="0"/>
               <a:t>Fourth level</a:t>
             </a:r>
           </a:p>
           <a:p>
             <a:pPr lvl="4"/>
             <a:r>
-              <a:rPr lang="en-US"/>
+              <a:rPr lang="en-US" dirty="0"/>
               <a:t>Fifth level</a:t>
             </a:r>
           </a:p>
@@ -1305,13 +1145,7 @@
       </p:sp>
       <p:sp>
         <p:nvSpPr>
-          <p:cNvPr id="4" name="Content Placeholder 3">
-            <a:extLst>
-              <a:ext uri="{FF2B5EF4-FFF2-40B4-BE49-F238E27FC236}">
-                <a16:creationId xmlns:a16="http://schemas.microsoft.com/office/drawing/2014/main" id="{8A08A755-58A7-A5D4-C618-6E16813EA356}"/>
-              </a:ext>
-            </a:extLst>
-          </p:cNvPr>
+          <p:cNvPr id="4" name="Content Placeholder 3"/>
           <p:cNvSpPr>
             <a:spLocks noGrp="1"/>
           </p:cNvSpPr>
@@ -1321,8 +1155,8 @@
         </p:nvSpPr>
         <p:spPr>
           <a:xfrm>
-            <a:off x="6172200" y="1825625"/>
-            <a:ext cx="5181600" cy="4351338"/>
+            <a:off x="4719161" y="1947333"/>
+            <a:ext cx="3961765" cy="4641427"/>
           </a:xfrm>
         </p:spPr>
         <p:txBody>
@@ -1331,35 +1165,35 @@
           <a:p>
             <a:pPr lvl="0"/>
             <a:r>
-              <a:rPr lang="en-US"/>
+              <a:rPr lang="en-US" dirty="0"/>
               <a:t>Click to edit Master text styles</a:t>
             </a:r>
           </a:p>
           <a:p>
             <a:pPr lvl="1"/>
             <a:r>
-              <a:rPr lang="en-US"/>
+              <a:rPr lang="en-US" dirty="0"/>
               <a:t>Second level</a:t>
             </a:r>
           </a:p>
           <a:p>
             <a:pPr lvl="2"/>
             <a:r>
-              <a:rPr lang="en-US"/>
+              <a:rPr lang="en-US" dirty="0"/>
               <a:t>Third level</a:t>
             </a:r>
           </a:p>
           <a:p>
             <a:pPr lvl="3"/>
             <a:r>
-              <a:rPr lang="en-US"/>
+              <a:rPr lang="en-US" dirty="0"/>
               <a:t>Fourth level</a:t>
             </a:r>
           </a:p>
           <a:p>
             <a:pPr lvl="4"/>
             <a:r>
-              <a:rPr lang="en-US"/>
+              <a:rPr lang="en-US" dirty="0"/>
               <a:t>Fifth level</a:t>
             </a:r>
           </a:p>
@@ -1367,13 +1201,7 @@
       </p:sp>
       <p:sp>
         <p:nvSpPr>
-          <p:cNvPr id="5" name="Date Placeholder 4">
-            <a:extLst>
-              <a:ext uri="{FF2B5EF4-FFF2-40B4-BE49-F238E27FC236}">
-                <a16:creationId xmlns:a16="http://schemas.microsoft.com/office/drawing/2014/main" id="{1F176E1F-6EF4-8A68-1B3A-1155A6684141}"/>
-              </a:ext>
-            </a:extLst>
-          </p:cNvPr>
+          <p:cNvPr id="5" name="Date Placeholder 4"/>
           <p:cNvSpPr>
             <a:spLocks noGrp="1"/>
           </p:cNvSpPr>
@@ -1395,13 +1223,7 @@
       </p:sp>
       <p:sp>
         <p:nvSpPr>
-          <p:cNvPr id="6" name="Footer Placeholder 5">
-            <a:extLst>
-              <a:ext uri="{FF2B5EF4-FFF2-40B4-BE49-F238E27FC236}">
-                <a16:creationId xmlns:a16="http://schemas.microsoft.com/office/drawing/2014/main" id="{70B5708A-06F7-207E-4CDA-D6A26162468B}"/>
-              </a:ext>
-            </a:extLst>
-          </p:cNvPr>
+          <p:cNvPr id="6" name="Footer Placeholder 5"/>
           <p:cNvSpPr>
             <a:spLocks noGrp="1"/>
           </p:cNvSpPr>
@@ -1420,13 +1242,7 @@
       </p:sp>
       <p:sp>
         <p:nvSpPr>
-          <p:cNvPr id="7" name="Slide Number Placeholder 6">
-            <a:extLst>
-              <a:ext uri="{FF2B5EF4-FFF2-40B4-BE49-F238E27FC236}">
-                <a16:creationId xmlns:a16="http://schemas.microsoft.com/office/drawing/2014/main" id="{97BE38AA-65E8-AD4A-EC72-67FD52FE70EB}"/>
-              </a:ext>
-            </a:extLst>
-          </p:cNvPr>
+          <p:cNvPr id="7" name="Slide Number Placeholder 6"/>
           <p:cNvSpPr>
             <a:spLocks noGrp="1"/>
           </p:cNvSpPr>
@@ -1449,7 +1265,7 @@
     </p:spTree>
     <p:extLst>
       <p:ext uri="{BB962C8B-B14F-4D97-AF65-F5344CB8AC3E}">
-        <p14:creationId xmlns:p14="http://schemas.microsoft.com/office/powerpoint/2010/main" val="2971078641"/>
+        <p14:creationId xmlns:p14="http://schemas.microsoft.com/office/powerpoint/2010/main" val="2815140334"/>
       </p:ext>
     </p:extLst>
   </p:cSld>
@@ -1478,13 +1294,7 @@
       </p:grpSpPr>
       <p:sp>
         <p:nvSpPr>
-          <p:cNvPr id="2" name="Title 1">
-            <a:extLst>
-              <a:ext uri="{FF2B5EF4-FFF2-40B4-BE49-F238E27FC236}">
-                <a16:creationId xmlns:a16="http://schemas.microsoft.com/office/drawing/2014/main" id="{B00D6E55-F702-FAC9-28DF-07E27144E3B6}"/>
-              </a:ext>
-            </a:extLst>
-          </p:cNvPr>
+          <p:cNvPr id="2" name="Title 1"/>
           <p:cNvSpPr>
             <a:spLocks noGrp="1"/>
           </p:cNvSpPr>
@@ -1494,8 +1304,8 @@
         </p:nvSpPr>
         <p:spPr>
           <a:xfrm>
-            <a:off x="839788" y="365125"/>
-            <a:ext cx="10515600" cy="1325563"/>
+            <a:off x="642088" y="389468"/>
+            <a:ext cx="8040053" cy="1413934"/>
           </a:xfrm>
         </p:spPr>
         <p:txBody>
@@ -1503,7 +1313,7 @@
           <a:lstStyle/>
           <a:p>
             <a:r>
-              <a:rPr lang="en-US"/>
+              <a:rPr lang="en-US" dirty="0"/>
               <a:t>Click to edit Master title style</a:t>
             </a:r>
           </a:p>
@@ -1511,13 +1321,7 @@
       </p:sp>
       <p:sp>
         <p:nvSpPr>
-          <p:cNvPr id="3" name="Text Placeholder 2">
-            <a:extLst>
-              <a:ext uri="{FF2B5EF4-FFF2-40B4-BE49-F238E27FC236}">
-                <a16:creationId xmlns:a16="http://schemas.microsoft.com/office/drawing/2014/main" id="{61CBC0DC-C1D5-FD3A-97F6-1E561838336D}"/>
-              </a:ext>
-            </a:extLst>
-          </p:cNvPr>
+          <p:cNvPr id="3" name="Text Placeholder 2"/>
           <p:cNvSpPr>
             <a:spLocks noGrp="1"/>
           </p:cNvSpPr>
@@ -1527,8 +1331,8 @@
         </p:nvSpPr>
         <p:spPr>
           <a:xfrm>
-            <a:off x="839788" y="1681163"/>
-            <a:ext cx="5157787" cy="823912"/>
+            <a:off x="642089" y="1793241"/>
+            <a:ext cx="3943558" cy="878839"/>
           </a:xfrm>
         </p:spPr>
         <p:txBody>
@@ -1536,45 +1340,45 @@
           <a:lstStyle>
             <a:lvl1pPr marL="0" indent="0">
               <a:buNone/>
-              <a:defRPr sz="2400" b="1"/>
+              <a:defRPr sz="2447" b="1"/>
             </a:lvl1pPr>
-            <a:lvl2pPr marL="457200" indent="0">
-              <a:buNone/>
-              <a:defRPr sz="2000" b="1"/>
+            <a:lvl2pPr marL="466070" indent="0">
+              <a:buNone/>
+              <a:defRPr sz="2039" b="1"/>
             </a:lvl2pPr>
-            <a:lvl3pPr marL="914400" indent="0">
-              <a:buNone/>
-              <a:defRPr sz="1800" b="1"/>
+            <a:lvl3pPr marL="932139" indent="0">
+              <a:buNone/>
+              <a:defRPr sz="1835" b="1"/>
             </a:lvl3pPr>
-            <a:lvl4pPr marL="1371600" indent="0">
-              <a:buNone/>
-              <a:defRPr sz="1600" b="1"/>
+            <a:lvl4pPr marL="1398209" indent="0">
+              <a:buNone/>
+              <a:defRPr sz="1631" b="1"/>
             </a:lvl4pPr>
-            <a:lvl5pPr marL="1828800" indent="0">
-              <a:buNone/>
-              <a:defRPr sz="1600" b="1"/>
+            <a:lvl5pPr marL="1864279" indent="0">
+              <a:buNone/>
+              <a:defRPr sz="1631" b="1"/>
             </a:lvl5pPr>
-            <a:lvl6pPr marL="2286000" indent="0">
-              <a:buNone/>
-              <a:defRPr sz="1600" b="1"/>
+            <a:lvl6pPr marL="2330348" indent="0">
+              <a:buNone/>
+              <a:defRPr sz="1631" b="1"/>
             </a:lvl6pPr>
-            <a:lvl7pPr marL="2743200" indent="0">
-              <a:buNone/>
-              <a:defRPr sz="1600" b="1"/>
+            <a:lvl7pPr marL="2796418" indent="0">
+              <a:buNone/>
+              <a:defRPr sz="1631" b="1"/>
             </a:lvl7pPr>
-            <a:lvl8pPr marL="3200400" indent="0">
-              <a:buNone/>
-              <a:defRPr sz="1600" b="1"/>
+            <a:lvl8pPr marL="3262488" indent="0">
+              <a:buNone/>
+              <a:defRPr sz="1631" b="1"/>
             </a:lvl8pPr>
-            <a:lvl9pPr marL="3657600" indent="0">
-              <a:buNone/>
-              <a:defRPr sz="1600" b="1"/>
+            <a:lvl9pPr marL="3728557" indent="0">
+              <a:buNone/>
+              <a:defRPr sz="1631" b="1"/>
             </a:lvl9pPr>
           </a:lstStyle>
           <a:p>
             <a:pPr lvl="0"/>
             <a:r>
-              <a:rPr lang="en-US"/>
+              <a:rPr lang="en-US" dirty="0"/>
               <a:t>Click to edit Master text styles</a:t>
             </a:r>
           </a:p>
@@ -1582,13 +1386,7 @@
       </p:sp>
       <p:sp>
         <p:nvSpPr>
-          <p:cNvPr id="4" name="Content Placeholder 3">
-            <a:extLst>
-              <a:ext uri="{FF2B5EF4-FFF2-40B4-BE49-F238E27FC236}">
-                <a16:creationId xmlns:a16="http://schemas.microsoft.com/office/drawing/2014/main" id="{1FAB9366-BA60-2F45-3916-0EE039984958}"/>
-              </a:ext>
-            </a:extLst>
-          </p:cNvPr>
+          <p:cNvPr id="4" name="Content Placeholder 3"/>
           <p:cNvSpPr>
             <a:spLocks noGrp="1"/>
           </p:cNvSpPr>
@@ -1598,8 +1396,8 @@
         </p:nvSpPr>
         <p:spPr>
           <a:xfrm>
-            <a:off x="839788" y="2505075"/>
-            <a:ext cx="5157787" cy="3684588"/>
+            <a:off x="642089" y="2672080"/>
+            <a:ext cx="3943558" cy="3930227"/>
           </a:xfrm>
         </p:spPr>
         <p:txBody>
@@ -1608,35 +1406,35 @@
           <a:p>
             <a:pPr lvl="0"/>
             <a:r>
-              <a:rPr lang="en-US"/>
+              <a:rPr lang="en-US" dirty="0"/>
               <a:t>Click to edit Master text styles</a:t>
             </a:r>
           </a:p>
           <a:p>
             <a:pPr lvl="1"/>
             <a:r>
-              <a:rPr lang="en-US"/>
+              <a:rPr lang="en-US" dirty="0"/>
               <a:t>Second level</a:t>
             </a:r>
           </a:p>
           <a:p>
             <a:pPr lvl="2"/>
             <a:r>
-              <a:rPr lang="en-US"/>
+              <a:rPr lang="en-US" dirty="0"/>
               <a:t>Third level</a:t>
             </a:r>
           </a:p>
           <a:p>
             <a:pPr lvl="3"/>
             <a:r>
-              <a:rPr lang="en-US"/>
+              <a:rPr lang="en-US" dirty="0"/>
               <a:t>Fourth level</a:t>
             </a:r>
           </a:p>
           <a:p>
             <a:pPr lvl="4"/>
             <a:r>
-              <a:rPr lang="en-US"/>
+              <a:rPr lang="en-US" dirty="0"/>
               <a:t>Fifth level</a:t>
             </a:r>
           </a:p>
@@ -1644,13 +1442,7 @@
       </p:sp>
       <p:sp>
         <p:nvSpPr>
-          <p:cNvPr id="5" name="Text Placeholder 4">
-            <a:extLst>
-              <a:ext uri="{FF2B5EF4-FFF2-40B4-BE49-F238E27FC236}">
-                <a16:creationId xmlns:a16="http://schemas.microsoft.com/office/drawing/2014/main" id="{E42779F0-43FE-8B74-C2BD-AB3628EA27DF}"/>
-              </a:ext>
-            </a:extLst>
-          </p:cNvPr>
+          <p:cNvPr id="5" name="Text Placeholder 4"/>
           <p:cNvSpPr>
             <a:spLocks noGrp="1"/>
           </p:cNvSpPr>
@@ -1660,8 +1452,8 @@
         </p:nvSpPr>
         <p:spPr>
           <a:xfrm>
-            <a:off x="6172200" y="1681163"/>
-            <a:ext cx="5183188" cy="823912"/>
+            <a:off x="4719162" y="1793241"/>
+            <a:ext cx="3962979" cy="878839"/>
           </a:xfrm>
         </p:spPr>
         <p:txBody>
@@ -1669,45 +1461,45 @@
           <a:lstStyle>
             <a:lvl1pPr marL="0" indent="0">
               <a:buNone/>
-              <a:defRPr sz="2400" b="1"/>
+              <a:defRPr sz="2447" b="1"/>
             </a:lvl1pPr>
-            <a:lvl2pPr marL="457200" indent="0">
-              <a:buNone/>
-              <a:defRPr sz="2000" b="1"/>
+            <a:lvl2pPr marL="466070" indent="0">
+              <a:buNone/>
+              <a:defRPr sz="2039" b="1"/>
             </a:lvl2pPr>
-            <a:lvl3pPr marL="914400" indent="0">
-              <a:buNone/>
-              <a:defRPr sz="1800" b="1"/>
+            <a:lvl3pPr marL="932139" indent="0">
+              <a:buNone/>
+              <a:defRPr sz="1835" b="1"/>
             </a:lvl3pPr>
-            <a:lvl4pPr marL="1371600" indent="0">
-              <a:buNone/>
-              <a:defRPr sz="1600" b="1"/>
+            <a:lvl4pPr marL="1398209" indent="0">
+              <a:buNone/>
+              <a:defRPr sz="1631" b="1"/>
             </a:lvl4pPr>
-            <a:lvl5pPr marL="1828800" indent="0">
-              <a:buNone/>
-              <a:defRPr sz="1600" b="1"/>
+            <a:lvl5pPr marL="1864279" indent="0">
+              <a:buNone/>
+              <a:defRPr sz="1631" b="1"/>
             </a:lvl5pPr>
-            <a:lvl6pPr marL="2286000" indent="0">
-              <a:buNone/>
-              <a:defRPr sz="1600" b="1"/>
+            <a:lvl6pPr marL="2330348" indent="0">
+              <a:buNone/>
+              <a:defRPr sz="1631" b="1"/>
             </a:lvl6pPr>
-            <a:lvl7pPr marL="2743200" indent="0">
-              <a:buNone/>
-              <a:defRPr sz="1600" b="1"/>
+            <a:lvl7pPr marL="2796418" indent="0">
+              <a:buNone/>
+              <a:defRPr sz="1631" b="1"/>
             </a:lvl7pPr>
-            <a:lvl8pPr marL="3200400" indent="0">
-              <a:buNone/>
-              <a:defRPr sz="1600" b="1"/>
+            <a:lvl8pPr marL="3262488" indent="0">
+              <a:buNone/>
+              <a:defRPr sz="1631" b="1"/>
             </a:lvl8pPr>
-            <a:lvl9pPr marL="3657600" indent="0">
-              <a:buNone/>
-              <a:defRPr sz="1600" b="1"/>
+            <a:lvl9pPr marL="3728557" indent="0">
+              <a:buNone/>
+              <a:defRPr sz="1631" b="1"/>
             </a:lvl9pPr>
           </a:lstStyle>
           <a:p>
             <a:pPr lvl="0"/>
             <a:r>
-              <a:rPr lang="en-US"/>
+              <a:rPr lang="en-US" dirty="0"/>
               <a:t>Click to edit Master text styles</a:t>
             </a:r>
           </a:p>
@@ -1715,13 +1507,7 @@
       </p:sp>
       <p:sp>
         <p:nvSpPr>
-          <p:cNvPr id="6" name="Content Placeholder 5">
-            <a:extLst>
-              <a:ext uri="{FF2B5EF4-FFF2-40B4-BE49-F238E27FC236}">
-                <a16:creationId xmlns:a16="http://schemas.microsoft.com/office/drawing/2014/main" id="{03C1DC6C-9F39-25A0-D1A0-E63CD7CDADF8}"/>
-              </a:ext>
-            </a:extLst>
-          </p:cNvPr>
+          <p:cNvPr id="6" name="Content Placeholder 5"/>
           <p:cNvSpPr>
             <a:spLocks noGrp="1"/>
           </p:cNvSpPr>
@@ -1731,8 +1517,8 @@
         </p:nvSpPr>
         <p:spPr>
           <a:xfrm>
-            <a:off x="6172200" y="2505075"/>
-            <a:ext cx="5183188" cy="3684588"/>
+            <a:off x="4719162" y="2672080"/>
+            <a:ext cx="3962979" cy="3930227"/>
           </a:xfrm>
         </p:spPr>
         <p:txBody>
@@ -1741,35 +1527,35 @@
           <a:p>
             <a:pPr lvl="0"/>
             <a:r>
-              <a:rPr lang="en-US"/>
+              <a:rPr lang="en-US" dirty="0"/>
               <a:t>Click to edit Master text styles</a:t>
             </a:r>
           </a:p>
           <a:p>
             <a:pPr lvl="1"/>
             <a:r>
-              <a:rPr lang="en-US"/>
+              <a:rPr lang="en-US" dirty="0"/>
               <a:t>Second level</a:t>
             </a:r>
           </a:p>
           <a:p>
             <a:pPr lvl="2"/>
             <a:r>
-              <a:rPr lang="en-US"/>
+              <a:rPr lang="en-US" dirty="0"/>
               <a:t>Third level</a:t>
             </a:r>
           </a:p>
           <a:p>
             <a:pPr lvl="3"/>
             <a:r>
-              <a:rPr lang="en-US"/>
+              <a:rPr lang="en-US" dirty="0"/>
               <a:t>Fourth level</a:t>
             </a:r>
           </a:p>
           <a:p>
             <a:pPr lvl="4"/>
             <a:r>
-              <a:rPr lang="en-US"/>
+              <a:rPr lang="en-US" dirty="0"/>
               <a:t>Fifth level</a:t>
             </a:r>
           </a:p>
@@ -1777,13 +1563,7 @@
       </p:sp>
       <p:sp>
         <p:nvSpPr>
-          <p:cNvPr id="7" name="Date Placeholder 6">
-            <a:extLst>
-              <a:ext uri="{FF2B5EF4-FFF2-40B4-BE49-F238E27FC236}">
-                <a16:creationId xmlns:a16="http://schemas.microsoft.com/office/drawing/2014/main" id="{03B4C211-346D-3963-300A-FA9870567186}"/>
-              </a:ext>
-            </a:extLst>
-          </p:cNvPr>
+          <p:cNvPr id="7" name="Date Placeholder 6"/>
           <p:cNvSpPr>
             <a:spLocks noGrp="1"/>
           </p:cNvSpPr>
@@ -1805,13 +1585,7 @@
       </p:sp>
       <p:sp>
         <p:nvSpPr>
-          <p:cNvPr id="8" name="Footer Placeholder 7">
-            <a:extLst>
-              <a:ext uri="{FF2B5EF4-FFF2-40B4-BE49-F238E27FC236}">
-                <a16:creationId xmlns:a16="http://schemas.microsoft.com/office/drawing/2014/main" id="{3A62E38E-84FF-F142-7EBD-D1C2A0EAE662}"/>
-              </a:ext>
-            </a:extLst>
-          </p:cNvPr>
+          <p:cNvPr id="8" name="Footer Placeholder 7"/>
           <p:cNvSpPr>
             <a:spLocks noGrp="1"/>
           </p:cNvSpPr>
@@ -1830,13 +1604,7 @@
       </p:sp>
       <p:sp>
         <p:nvSpPr>
-          <p:cNvPr id="9" name="Slide Number Placeholder 8">
-            <a:extLst>
-              <a:ext uri="{FF2B5EF4-FFF2-40B4-BE49-F238E27FC236}">
-                <a16:creationId xmlns:a16="http://schemas.microsoft.com/office/drawing/2014/main" id="{5D7AC24E-9C93-B51B-502F-C8F9F787C450}"/>
-              </a:ext>
-            </a:extLst>
-          </p:cNvPr>
+          <p:cNvPr id="9" name="Slide Number Placeholder 8"/>
           <p:cNvSpPr>
             <a:spLocks noGrp="1"/>
           </p:cNvSpPr>
@@ -1859,7 +1627,7 @@
     </p:spTree>
     <p:extLst>
       <p:ext uri="{BB962C8B-B14F-4D97-AF65-F5344CB8AC3E}">
-        <p14:creationId xmlns:p14="http://schemas.microsoft.com/office/powerpoint/2010/main" val="982765692"/>
+        <p14:creationId xmlns:p14="http://schemas.microsoft.com/office/powerpoint/2010/main" val="3368122470"/>
       </p:ext>
     </p:extLst>
   </p:cSld>
@@ -1888,13 +1656,7 @@
       </p:grpSpPr>
       <p:sp>
         <p:nvSpPr>
-          <p:cNvPr id="2" name="Title 1">
-            <a:extLst>
-              <a:ext uri="{FF2B5EF4-FFF2-40B4-BE49-F238E27FC236}">
-                <a16:creationId xmlns:a16="http://schemas.microsoft.com/office/drawing/2014/main" id="{587D57A2-3D9A-44D2-3528-0E74FE3A75A6}"/>
-              </a:ext>
-            </a:extLst>
-          </p:cNvPr>
+          <p:cNvPr id="2" name="Title 1"/>
           <p:cNvSpPr>
             <a:spLocks noGrp="1"/>
           </p:cNvSpPr>
@@ -1908,7 +1670,7 @@
           <a:lstStyle/>
           <a:p>
             <a:r>
-              <a:rPr lang="en-US"/>
+              <a:rPr lang="en-US" dirty="0"/>
               <a:t>Click to edit Master title style</a:t>
             </a:r>
           </a:p>
@@ -1916,13 +1678,7 @@
       </p:sp>
       <p:sp>
         <p:nvSpPr>
-          <p:cNvPr id="3" name="Date Placeholder 2">
-            <a:extLst>
-              <a:ext uri="{FF2B5EF4-FFF2-40B4-BE49-F238E27FC236}">
-                <a16:creationId xmlns:a16="http://schemas.microsoft.com/office/drawing/2014/main" id="{CC70D2F2-E780-9C47-3942-143B3641FE79}"/>
-              </a:ext>
-            </a:extLst>
-          </p:cNvPr>
+          <p:cNvPr id="3" name="Date Placeholder 2"/>
           <p:cNvSpPr>
             <a:spLocks noGrp="1"/>
           </p:cNvSpPr>
@@ -1944,13 +1700,7 @@
       </p:sp>
       <p:sp>
         <p:nvSpPr>
-          <p:cNvPr id="4" name="Footer Placeholder 3">
-            <a:extLst>
-              <a:ext uri="{FF2B5EF4-FFF2-40B4-BE49-F238E27FC236}">
-                <a16:creationId xmlns:a16="http://schemas.microsoft.com/office/drawing/2014/main" id="{7FB937D4-2417-D53B-17E5-D6A2D48F5072}"/>
-              </a:ext>
-            </a:extLst>
-          </p:cNvPr>
+          <p:cNvPr id="4" name="Footer Placeholder 3"/>
           <p:cNvSpPr>
             <a:spLocks noGrp="1"/>
           </p:cNvSpPr>
@@ -1969,13 +1719,7 @@
       </p:sp>
       <p:sp>
         <p:nvSpPr>
-          <p:cNvPr id="5" name="Slide Number Placeholder 4">
-            <a:extLst>
-              <a:ext uri="{FF2B5EF4-FFF2-40B4-BE49-F238E27FC236}">
-                <a16:creationId xmlns:a16="http://schemas.microsoft.com/office/drawing/2014/main" id="{A78409BD-64A7-61BF-2F61-9D5D705EB95D}"/>
-              </a:ext>
-            </a:extLst>
-          </p:cNvPr>
+          <p:cNvPr id="5" name="Slide Number Placeholder 4"/>
           <p:cNvSpPr>
             <a:spLocks noGrp="1"/>
           </p:cNvSpPr>
@@ -1998,7 +1742,7 @@
     </p:spTree>
     <p:extLst>
       <p:ext uri="{BB962C8B-B14F-4D97-AF65-F5344CB8AC3E}">
-        <p14:creationId xmlns:p14="http://schemas.microsoft.com/office/powerpoint/2010/main" val="2527549053"/>
+        <p14:creationId xmlns:p14="http://schemas.microsoft.com/office/powerpoint/2010/main" val="3160565418"/>
       </p:ext>
     </p:extLst>
   </p:cSld>
@@ -2027,13 +1771,7 @@
       </p:grpSpPr>
       <p:sp>
         <p:nvSpPr>
-          <p:cNvPr id="2" name="Date Placeholder 1">
-            <a:extLst>
-              <a:ext uri="{FF2B5EF4-FFF2-40B4-BE49-F238E27FC236}">
-                <a16:creationId xmlns:a16="http://schemas.microsoft.com/office/drawing/2014/main" id="{3475F751-CBE8-569B-B112-6C27BDE4BD5F}"/>
-              </a:ext>
-            </a:extLst>
-          </p:cNvPr>
+          <p:cNvPr id="2" name="Date Placeholder 1"/>
           <p:cNvSpPr>
             <a:spLocks noGrp="1"/>
           </p:cNvSpPr>
@@ -2055,13 +1793,7 @@
       </p:sp>
       <p:sp>
         <p:nvSpPr>
-          <p:cNvPr id="3" name="Footer Placeholder 2">
-            <a:extLst>
-              <a:ext uri="{FF2B5EF4-FFF2-40B4-BE49-F238E27FC236}">
-                <a16:creationId xmlns:a16="http://schemas.microsoft.com/office/drawing/2014/main" id="{B2AC8988-75BE-5507-B6D7-A9B91651FBAB}"/>
-              </a:ext>
-            </a:extLst>
-          </p:cNvPr>
+          <p:cNvPr id="3" name="Footer Placeholder 2"/>
           <p:cNvSpPr>
             <a:spLocks noGrp="1"/>
           </p:cNvSpPr>
@@ -2080,13 +1812,7 @@
       </p:sp>
       <p:sp>
         <p:nvSpPr>
-          <p:cNvPr id="4" name="Slide Number Placeholder 3">
-            <a:extLst>
-              <a:ext uri="{FF2B5EF4-FFF2-40B4-BE49-F238E27FC236}">
-                <a16:creationId xmlns:a16="http://schemas.microsoft.com/office/drawing/2014/main" id="{5A8301A8-9FEB-F913-9443-7B5EC4B661E9}"/>
-              </a:ext>
-            </a:extLst>
-          </p:cNvPr>
+          <p:cNvPr id="4" name="Slide Number Placeholder 3"/>
           <p:cNvSpPr>
             <a:spLocks noGrp="1"/>
           </p:cNvSpPr>
@@ -2109,7 +1835,7 @@
     </p:spTree>
     <p:extLst>
       <p:ext uri="{BB962C8B-B14F-4D97-AF65-F5344CB8AC3E}">
-        <p14:creationId xmlns:p14="http://schemas.microsoft.com/office/powerpoint/2010/main" val="2527111572"/>
+        <p14:creationId xmlns:p14="http://schemas.microsoft.com/office/powerpoint/2010/main" val="978258748"/>
       </p:ext>
     </p:extLst>
   </p:cSld>
@@ -2138,13 +1864,7 @@
       </p:grpSpPr>
       <p:sp>
         <p:nvSpPr>
-          <p:cNvPr id="2" name="Title 1">
-            <a:extLst>
-              <a:ext uri="{FF2B5EF4-FFF2-40B4-BE49-F238E27FC236}">
-                <a16:creationId xmlns:a16="http://schemas.microsoft.com/office/drawing/2014/main" id="{7DE494D0-A455-CBA2-8224-2B7CE25D82BA}"/>
-              </a:ext>
-            </a:extLst>
-          </p:cNvPr>
+          <p:cNvPr id="2" name="Title 1"/>
           <p:cNvSpPr>
             <a:spLocks noGrp="1"/>
           </p:cNvSpPr>
@@ -2154,20 +1874,20 @@
         </p:nvSpPr>
         <p:spPr>
           <a:xfrm>
-            <a:off x="839788" y="457200"/>
-            <a:ext cx="3932237" cy="1600200"/>
+            <a:off x="642088" y="487680"/>
+            <a:ext cx="3006523" cy="1706880"/>
           </a:xfrm>
         </p:spPr>
         <p:txBody>
           <a:bodyPr anchor="b"/>
           <a:lstStyle>
             <a:lvl1pPr>
-              <a:defRPr sz="3200"/>
+              <a:defRPr sz="3262"/>
             </a:lvl1pPr>
           </a:lstStyle>
           <a:p>
             <a:r>
-              <a:rPr lang="en-US"/>
+              <a:rPr lang="en-US" dirty="0"/>
               <a:t>Click to edit Master title style</a:t>
             </a:r>
           </a:p>
@@ -2175,13 +1895,7 @@
       </p:sp>
       <p:sp>
         <p:nvSpPr>
-          <p:cNvPr id="3" name="Content Placeholder 2">
-            <a:extLst>
-              <a:ext uri="{FF2B5EF4-FFF2-40B4-BE49-F238E27FC236}">
-                <a16:creationId xmlns:a16="http://schemas.microsoft.com/office/drawing/2014/main" id="{6791A8EF-76F9-BF17-0EBA-982931180F7F}"/>
-              </a:ext>
-            </a:extLst>
-          </p:cNvPr>
+          <p:cNvPr id="3" name="Content Placeholder 2"/>
           <p:cNvSpPr>
             <a:spLocks noGrp="1"/>
           </p:cNvSpPr>
@@ -2191,73 +1905,73 @@
         </p:nvSpPr>
         <p:spPr>
           <a:xfrm>
-            <a:off x="5183188" y="987425"/>
-            <a:ext cx="6172200" cy="4873625"/>
+            <a:off x="3962979" y="1053255"/>
+            <a:ext cx="4719161" cy="5198533"/>
           </a:xfrm>
         </p:spPr>
         <p:txBody>
           <a:bodyPr/>
           <a:lstStyle>
             <a:lvl1pPr>
-              <a:defRPr sz="3200"/>
+              <a:defRPr sz="3262"/>
             </a:lvl1pPr>
             <a:lvl2pPr>
-              <a:defRPr sz="2800"/>
+              <a:defRPr sz="2854"/>
             </a:lvl2pPr>
             <a:lvl3pPr>
-              <a:defRPr sz="2400"/>
+              <a:defRPr sz="2447"/>
             </a:lvl3pPr>
             <a:lvl4pPr>
-              <a:defRPr sz="2000"/>
+              <a:defRPr sz="2039"/>
             </a:lvl4pPr>
             <a:lvl5pPr>
-              <a:defRPr sz="2000"/>
+              <a:defRPr sz="2039"/>
             </a:lvl5pPr>
             <a:lvl6pPr>
-              <a:defRPr sz="2000"/>
+              <a:defRPr sz="2039"/>
             </a:lvl6pPr>
             <a:lvl7pPr>
-              <a:defRPr sz="2000"/>
+              <a:defRPr sz="2039"/>
             </a:lvl7pPr>
             <a:lvl8pPr>
-              <a:defRPr sz="2000"/>
+              <a:defRPr sz="2039"/>
             </a:lvl8pPr>
             <a:lvl9pPr>
-              <a:defRPr sz="2000"/>
+              <a:defRPr sz="2039"/>
             </a:lvl9pPr>
           </a:lstStyle>
           <a:p>
             <a:pPr lvl="0"/>
             <a:r>
-              <a:rPr lang="en-US"/>
+              <a:rPr lang="en-US" dirty="0"/>
               <a:t>Click to edit Master text styles</a:t>
             </a:r>
           </a:p>
           <a:p>
             <a:pPr lvl="1"/>
             <a:r>
-              <a:rPr lang="en-US"/>
+              <a:rPr lang="en-US" dirty="0"/>
               <a:t>Second level</a:t>
             </a:r>
           </a:p>
           <a:p>
             <a:pPr lvl="2"/>
             <a:r>
-              <a:rPr lang="en-US"/>
+              <a:rPr lang="en-US" dirty="0"/>
               <a:t>Third level</a:t>
             </a:r>
           </a:p>
           <a:p>
             <a:pPr lvl="3"/>
             <a:r>
-              <a:rPr lang="en-US"/>
+              <a:rPr lang="en-US" dirty="0"/>
               <a:t>Fourth level</a:t>
             </a:r>
           </a:p>
           <a:p>
             <a:pPr lvl="4"/>
             <a:r>
-              <a:rPr lang="en-US"/>
+              <a:rPr lang="en-US" dirty="0"/>
               <a:t>Fifth level</a:t>
             </a:r>
           </a:p>
@@ -2265,13 +1979,7 @@
       </p:sp>
       <p:sp>
         <p:nvSpPr>
-          <p:cNvPr id="4" name="Text Placeholder 3">
-            <a:extLst>
-              <a:ext uri="{FF2B5EF4-FFF2-40B4-BE49-F238E27FC236}">
-                <a16:creationId xmlns:a16="http://schemas.microsoft.com/office/drawing/2014/main" id="{B7DA03CE-7F4D-6A5F-C9E4-3BAD807C855D}"/>
-              </a:ext>
-            </a:extLst>
-          </p:cNvPr>
+          <p:cNvPr id="4" name="Text Placeholder 3"/>
           <p:cNvSpPr>
             <a:spLocks noGrp="1"/>
           </p:cNvSpPr>
@@ -2281,8 +1989,8 @@
         </p:nvSpPr>
         <p:spPr>
           <a:xfrm>
-            <a:off x="839788" y="2057400"/>
-            <a:ext cx="3932237" cy="3811588"/>
+            <a:off x="642088" y="2194560"/>
+            <a:ext cx="3006523" cy="4065694"/>
           </a:xfrm>
         </p:spPr>
         <p:txBody>
@@ -2290,45 +1998,45 @@
           <a:lstStyle>
             <a:lvl1pPr marL="0" indent="0">
               <a:buNone/>
-              <a:defRPr sz="1600"/>
+              <a:defRPr sz="1631"/>
             </a:lvl1pPr>
-            <a:lvl2pPr marL="457200" indent="0">
-              <a:buNone/>
-              <a:defRPr sz="1400"/>
+            <a:lvl2pPr marL="466070" indent="0">
+              <a:buNone/>
+              <a:defRPr sz="1427"/>
             </a:lvl2pPr>
-            <a:lvl3pPr marL="914400" indent="0">
-              <a:buNone/>
-              <a:defRPr sz="1200"/>
+            <a:lvl3pPr marL="932139" indent="0">
+              <a:buNone/>
+              <a:defRPr sz="1223"/>
             </a:lvl3pPr>
-            <a:lvl4pPr marL="1371600" indent="0">
-              <a:buNone/>
-              <a:defRPr sz="1000"/>
+            <a:lvl4pPr marL="1398209" indent="0">
+              <a:buNone/>
+              <a:defRPr sz="1019"/>
             </a:lvl4pPr>
-            <a:lvl5pPr marL="1828800" indent="0">
-              <a:buNone/>
-              <a:defRPr sz="1000"/>
+            <a:lvl5pPr marL="1864279" indent="0">
+              <a:buNone/>
+              <a:defRPr sz="1019"/>
             </a:lvl5pPr>
-            <a:lvl6pPr marL="2286000" indent="0">
-              <a:buNone/>
-              <a:defRPr sz="1000"/>
+            <a:lvl6pPr marL="2330348" indent="0">
+              <a:buNone/>
+              <a:defRPr sz="1019"/>
             </a:lvl6pPr>
-            <a:lvl7pPr marL="2743200" indent="0">
-              <a:buNone/>
-              <a:defRPr sz="1000"/>
+            <a:lvl7pPr marL="2796418" indent="0">
+              <a:buNone/>
+              <a:defRPr sz="1019"/>
             </a:lvl7pPr>
-            <a:lvl8pPr marL="3200400" indent="0">
-              <a:buNone/>
-              <a:defRPr sz="1000"/>
+            <a:lvl8pPr marL="3262488" indent="0">
+              <a:buNone/>
+              <a:defRPr sz="1019"/>
             </a:lvl8pPr>
-            <a:lvl9pPr marL="3657600" indent="0">
-              <a:buNone/>
-              <a:defRPr sz="1000"/>
+            <a:lvl9pPr marL="3728557" indent="0">
+              <a:buNone/>
+              <a:defRPr sz="1019"/>
             </a:lvl9pPr>
           </a:lstStyle>
           <a:p>
             <a:pPr lvl="0"/>
             <a:r>
-              <a:rPr lang="en-US"/>
+              <a:rPr lang="en-US" dirty="0"/>
               <a:t>Click to edit Master text styles</a:t>
             </a:r>
           </a:p>
@@ -2336,13 +2044,7 @@
       </p:sp>
       <p:sp>
         <p:nvSpPr>
-          <p:cNvPr id="5" name="Date Placeholder 4">
-            <a:extLst>
-              <a:ext uri="{FF2B5EF4-FFF2-40B4-BE49-F238E27FC236}">
-                <a16:creationId xmlns:a16="http://schemas.microsoft.com/office/drawing/2014/main" id="{A5A8C3F5-D171-E620-AD85-89AE5BAAF94C}"/>
-              </a:ext>
-            </a:extLst>
-          </p:cNvPr>
+          <p:cNvPr id="5" name="Date Placeholder 4"/>
           <p:cNvSpPr>
             <a:spLocks noGrp="1"/>
           </p:cNvSpPr>
@@ -2364,13 +2066,7 @@
       </p:sp>
       <p:sp>
         <p:nvSpPr>
-          <p:cNvPr id="6" name="Footer Placeholder 5">
-            <a:extLst>
-              <a:ext uri="{FF2B5EF4-FFF2-40B4-BE49-F238E27FC236}">
-                <a16:creationId xmlns:a16="http://schemas.microsoft.com/office/drawing/2014/main" id="{7258A40B-7F49-7298-5227-B181CB3F995A}"/>
-              </a:ext>
-            </a:extLst>
-          </p:cNvPr>
+          <p:cNvPr id="6" name="Footer Placeholder 5"/>
           <p:cNvSpPr>
             <a:spLocks noGrp="1"/>
           </p:cNvSpPr>
@@ -2389,13 +2085,7 @@
       </p:sp>
       <p:sp>
         <p:nvSpPr>
-          <p:cNvPr id="7" name="Slide Number Placeholder 6">
-            <a:extLst>
-              <a:ext uri="{FF2B5EF4-FFF2-40B4-BE49-F238E27FC236}">
-                <a16:creationId xmlns:a16="http://schemas.microsoft.com/office/drawing/2014/main" id="{A2D164CE-1DC0-DF48-8B0F-26232B980636}"/>
-              </a:ext>
-            </a:extLst>
-          </p:cNvPr>
+          <p:cNvPr id="7" name="Slide Number Placeholder 6"/>
           <p:cNvSpPr>
             <a:spLocks noGrp="1"/>
           </p:cNvSpPr>
@@ -2418,7 +2108,7 @@
     </p:spTree>
     <p:extLst>
       <p:ext uri="{BB962C8B-B14F-4D97-AF65-F5344CB8AC3E}">
-        <p14:creationId xmlns:p14="http://schemas.microsoft.com/office/powerpoint/2010/main" val="2572449546"/>
+        <p14:creationId xmlns:p14="http://schemas.microsoft.com/office/powerpoint/2010/main" val="2751977543"/>
       </p:ext>
     </p:extLst>
   </p:cSld>
@@ -2447,13 +2137,7 @@
       </p:grpSpPr>
       <p:sp>
         <p:nvSpPr>
-          <p:cNvPr id="2" name="Title 1">
-            <a:extLst>
-              <a:ext uri="{FF2B5EF4-FFF2-40B4-BE49-F238E27FC236}">
-                <a16:creationId xmlns:a16="http://schemas.microsoft.com/office/drawing/2014/main" id="{BDEC3CD8-6461-DDE8-7EC3-D5260D185C07}"/>
-              </a:ext>
-            </a:extLst>
-          </p:cNvPr>
+          <p:cNvPr id="2" name="Title 1"/>
           <p:cNvSpPr>
             <a:spLocks noGrp="1"/>
           </p:cNvSpPr>
@@ -2463,20 +2147,20 @@
         </p:nvSpPr>
         <p:spPr>
           <a:xfrm>
-            <a:off x="839788" y="457200"/>
-            <a:ext cx="3932237" cy="1600200"/>
+            <a:off x="642088" y="487680"/>
+            <a:ext cx="3006523" cy="1706880"/>
           </a:xfrm>
         </p:spPr>
         <p:txBody>
           <a:bodyPr anchor="b"/>
           <a:lstStyle>
             <a:lvl1pPr>
-              <a:defRPr sz="3200"/>
+              <a:defRPr sz="3262"/>
             </a:lvl1pPr>
           </a:lstStyle>
           <a:p>
             <a:r>
-              <a:rPr lang="en-US"/>
+              <a:rPr lang="en-US" dirty="0"/>
               <a:t>Click to edit Master title style</a:t>
             </a:r>
           </a:p>
@@ -2484,15 +2168,9 @@
       </p:sp>
       <p:sp>
         <p:nvSpPr>
-          <p:cNvPr id="3" name="Picture Placeholder 2">
-            <a:extLst>
-              <a:ext uri="{FF2B5EF4-FFF2-40B4-BE49-F238E27FC236}">
-                <a16:creationId xmlns:a16="http://schemas.microsoft.com/office/drawing/2014/main" id="{8863C2A4-86B3-1277-3E6C-FE6673DFD584}"/>
-              </a:ext>
-            </a:extLst>
-          </p:cNvPr>
-          <p:cNvSpPr>
-            <a:spLocks noGrp="1"/>
+          <p:cNvPr id="3" name="Picture Placeholder 2"/>
+          <p:cNvSpPr>
+            <a:spLocks noGrp="1" noChangeAspect="1"/>
           </p:cNvSpPr>
           <p:nvPr>
             <p:ph type="pic" idx="1"/>
@@ -2500,64 +2178,61 @@
         </p:nvSpPr>
         <p:spPr>
           <a:xfrm>
-            <a:off x="5183188" y="987425"/>
-            <a:ext cx="6172200" cy="4873625"/>
+            <a:off x="3962979" y="1053255"/>
+            <a:ext cx="4719161" cy="5198533"/>
           </a:xfrm>
         </p:spPr>
         <p:txBody>
-          <a:bodyPr/>
+          <a:bodyPr anchor="t"/>
           <a:lstStyle>
             <a:lvl1pPr marL="0" indent="0">
               <a:buNone/>
-              <a:defRPr sz="3200"/>
+              <a:defRPr sz="3262"/>
             </a:lvl1pPr>
-            <a:lvl2pPr marL="457200" indent="0">
-              <a:buNone/>
-              <a:defRPr sz="2800"/>
+            <a:lvl2pPr marL="466070" indent="0">
+              <a:buNone/>
+              <a:defRPr sz="2854"/>
             </a:lvl2pPr>
-            <a:lvl3pPr marL="914400" indent="0">
-              <a:buNone/>
-              <a:defRPr sz="2400"/>
+            <a:lvl3pPr marL="932139" indent="0">
+              <a:buNone/>
+              <a:defRPr sz="2447"/>
             </a:lvl3pPr>
-            <a:lvl4pPr marL="1371600" indent="0">
-              <a:buNone/>
-              <a:defRPr sz="2000"/>
+            <a:lvl4pPr marL="1398209" indent="0">
+              <a:buNone/>
+              <a:defRPr sz="2039"/>
             </a:lvl4pPr>
-            <a:lvl5pPr marL="1828800" indent="0">
-              <a:buNone/>
-              <a:defRPr sz="2000"/>
+            <a:lvl5pPr marL="1864279" indent="0">
+              <a:buNone/>
+              <a:defRPr sz="2039"/>
             </a:lvl5pPr>
-            <a:lvl6pPr marL="2286000" indent="0">
-              <a:buNone/>
-              <a:defRPr sz="2000"/>
+            <a:lvl6pPr marL="2330348" indent="0">
+              <a:buNone/>
+              <a:defRPr sz="2039"/>
             </a:lvl6pPr>
-            <a:lvl7pPr marL="2743200" indent="0">
-              <a:buNone/>
-              <a:defRPr sz="2000"/>
+            <a:lvl7pPr marL="2796418" indent="0">
+              <a:buNone/>
+              <a:defRPr sz="2039"/>
             </a:lvl7pPr>
-            <a:lvl8pPr marL="3200400" indent="0">
-              <a:buNone/>
-              <a:defRPr sz="2000"/>
+            <a:lvl8pPr marL="3262488" indent="0">
+              <a:buNone/>
+              <a:defRPr sz="2039"/>
             </a:lvl8pPr>
-            <a:lvl9pPr marL="3657600" indent="0">
-              <a:buNone/>
-              <a:defRPr sz="2000"/>
+            <a:lvl9pPr marL="3728557" indent="0">
+              <a:buNone/>
+              <a:defRPr sz="2039"/>
             </a:lvl9pPr>
           </a:lstStyle>
           <a:p>
-            <a:endParaRPr lang="en-US"/>
-          </a:p>
-        </p:txBody>
-      </p:sp>
-      <p:sp>
-        <p:nvSpPr>
-          <p:cNvPr id="4" name="Text Placeholder 3">
-            <a:extLst>
-              <a:ext uri="{FF2B5EF4-FFF2-40B4-BE49-F238E27FC236}">
-                <a16:creationId xmlns:a16="http://schemas.microsoft.com/office/drawing/2014/main" id="{4CD051BF-D769-17DA-5CC9-DD893A7D11D8}"/>
-              </a:ext>
-            </a:extLst>
-          </p:cNvPr>
+            <a:r>
+              <a:rPr lang="en-US" dirty="0"/>
+              <a:t>Click icon to add picture</a:t>
+            </a:r>
+          </a:p>
+        </p:txBody>
+      </p:sp>
+      <p:sp>
+        <p:nvSpPr>
+          <p:cNvPr id="4" name="Text Placeholder 3"/>
           <p:cNvSpPr>
             <a:spLocks noGrp="1"/>
           </p:cNvSpPr>
@@ -2567,8 +2242,8 @@
         </p:nvSpPr>
         <p:spPr>
           <a:xfrm>
-            <a:off x="839788" y="2057400"/>
-            <a:ext cx="3932237" cy="3811588"/>
+            <a:off x="642088" y="2194560"/>
+            <a:ext cx="3006523" cy="4065694"/>
           </a:xfrm>
         </p:spPr>
         <p:txBody>
@@ -2576,45 +2251,45 @@
           <a:lstStyle>
             <a:lvl1pPr marL="0" indent="0">
               <a:buNone/>
-              <a:defRPr sz="1600"/>
+              <a:defRPr sz="1631"/>
             </a:lvl1pPr>
-            <a:lvl2pPr marL="457200" indent="0">
-              <a:buNone/>
-              <a:defRPr sz="1400"/>
+            <a:lvl2pPr marL="466070" indent="0">
+              <a:buNone/>
+              <a:defRPr sz="1427"/>
             </a:lvl2pPr>
-            <a:lvl3pPr marL="914400" indent="0">
-              <a:buNone/>
-              <a:defRPr sz="1200"/>
+            <a:lvl3pPr marL="932139" indent="0">
+              <a:buNone/>
+              <a:defRPr sz="1223"/>
             </a:lvl3pPr>
-            <a:lvl4pPr marL="1371600" indent="0">
-              <a:buNone/>
-              <a:defRPr sz="1000"/>
+            <a:lvl4pPr marL="1398209" indent="0">
+              <a:buNone/>
+              <a:defRPr sz="1019"/>
             </a:lvl4pPr>
-            <a:lvl5pPr marL="1828800" indent="0">
-              <a:buNone/>
-              <a:defRPr sz="1000"/>
+            <a:lvl5pPr marL="1864279" indent="0">
+              <a:buNone/>
+              <a:defRPr sz="1019"/>
             </a:lvl5pPr>
-            <a:lvl6pPr marL="2286000" indent="0">
-              <a:buNone/>
-              <a:defRPr sz="1000"/>
+            <a:lvl6pPr marL="2330348" indent="0">
+              <a:buNone/>
+              <a:defRPr sz="1019"/>
             </a:lvl6pPr>
-            <a:lvl7pPr marL="2743200" indent="0">
-              <a:buNone/>
-              <a:defRPr sz="1000"/>
+            <a:lvl7pPr marL="2796418" indent="0">
+              <a:buNone/>
+              <a:defRPr sz="1019"/>
             </a:lvl7pPr>
-            <a:lvl8pPr marL="3200400" indent="0">
-              <a:buNone/>
-              <a:defRPr sz="1000"/>
+            <a:lvl8pPr marL="3262488" indent="0">
+              <a:buNone/>
+              <a:defRPr sz="1019"/>
             </a:lvl8pPr>
-            <a:lvl9pPr marL="3657600" indent="0">
-              <a:buNone/>
-              <a:defRPr sz="1000"/>
+            <a:lvl9pPr marL="3728557" indent="0">
+              <a:buNone/>
+              <a:defRPr sz="1019"/>
             </a:lvl9pPr>
           </a:lstStyle>
           <a:p>
             <a:pPr lvl="0"/>
             <a:r>
-              <a:rPr lang="en-US"/>
+              <a:rPr lang="en-US" dirty="0"/>
               <a:t>Click to edit Master text styles</a:t>
             </a:r>
           </a:p>
@@ -2622,13 +2297,7 @@
       </p:sp>
       <p:sp>
         <p:nvSpPr>
-          <p:cNvPr id="5" name="Date Placeholder 4">
-            <a:extLst>
-              <a:ext uri="{FF2B5EF4-FFF2-40B4-BE49-F238E27FC236}">
-                <a16:creationId xmlns:a16="http://schemas.microsoft.com/office/drawing/2014/main" id="{99752F05-260F-EAF1-C966-CD25F608B3C1}"/>
-              </a:ext>
-            </a:extLst>
-          </p:cNvPr>
+          <p:cNvPr id="5" name="Date Placeholder 4"/>
           <p:cNvSpPr>
             <a:spLocks noGrp="1"/>
           </p:cNvSpPr>
@@ -2650,13 +2319,7 @@
       </p:sp>
       <p:sp>
         <p:nvSpPr>
-          <p:cNvPr id="6" name="Footer Placeholder 5">
-            <a:extLst>
-              <a:ext uri="{FF2B5EF4-FFF2-40B4-BE49-F238E27FC236}">
-                <a16:creationId xmlns:a16="http://schemas.microsoft.com/office/drawing/2014/main" id="{969E03F3-4DE7-331B-D9E9-2814BDE850FF}"/>
-              </a:ext>
-            </a:extLst>
-          </p:cNvPr>
+          <p:cNvPr id="6" name="Footer Placeholder 5"/>
           <p:cNvSpPr>
             <a:spLocks noGrp="1"/>
           </p:cNvSpPr>
@@ -2675,13 +2338,7 @@
       </p:sp>
       <p:sp>
         <p:nvSpPr>
-          <p:cNvPr id="7" name="Slide Number Placeholder 6">
-            <a:extLst>
-              <a:ext uri="{FF2B5EF4-FFF2-40B4-BE49-F238E27FC236}">
-                <a16:creationId xmlns:a16="http://schemas.microsoft.com/office/drawing/2014/main" id="{A4135118-7D33-7596-3B11-8754A06DD8E4}"/>
-              </a:ext>
-            </a:extLst>
-          </p:cNvPr>
+          <p:cNvPr id="7" name="Slide Number Placeholder 6"/>
           <p:cNvSpPr>
             <a:spLocks noGrp="1"/>
           </p:cNvSpPr>
@@ -2704,7 +2361,7 @@
     </p:spTree>
     <p:extLst>
       <p:ext uri="{BB962C8B-B14F-4D97-AF65-F5344CB8AC3E}">
-        <p14:creationId xmlns:p14="http://schemas.microsoft.com/office/powerpoint/2010/main" val="1339346052"/>
+        <p14:creationId xmlns:p14="http://schemas.microsoft.com/office/powerpoint/2010/main" val="3194671857"/>
       </p:ext>
     </p:extLst>
   </p:cSld>
@@ -2738,13 +2395,7 @@
       </p:grpSpPr>
       <p:sp>
         <p:nvSpPr>
-          <p:cNvPr id="2" name="Title Placeholder 1">
-            <a:extLst>
-              <a:ext uri="{FF2B5EF4-FFF2-40B4-BE49-F238E27FC236}">
-                <a16:creationId xmlns:a16="http://schemas.microsoft.com/office/drawing/2014/main" id="{CFD96E5D-D799-AB45-3D7F-22056FBCFC21}"/>
-              </a:ext>
-            </a:extLst>
-          </p:cNvPr>
+          <p:cNvPr id="2" name="Title Placeholder 1"/>
           <p:cNvSpPr>
             <a:spLocks noGrp="1"/>
           </p:cNvSpPr>
@@ -2754,8 +2405,8 @@
         </p:nvSpPr>
         <p:spPr>
           <a:xfrm>
-            <a:off x="838200" y="365125"/>
-            <a:ext cx="10515600" cy="1325563"/>
+            <a:off x="640874" y="389468"/>
+            <a:ext cx="8040053" cy="1413934"/>
           </a:xfrm>
           <a:prstGeom prst="rect">
             <a:avLst/>
@@ -2768,7 +2419,7 @@
           <a:lstStyle/>
           <a:p>
             <a:r>
-              <a:rPr lang="en-US"/>
+              <a:rPr lang="en-US" dirty="0"/>
               <a:t>Click to edit Master title style</a:t>
             </a:r>
           </a:p>
@@ -2776,13 +2427,7 @@
       </p:sp>
       <p:sp>
         <p:nvSpPr>
-          <p:cNvPr id="3" name="Text Placeholder 2">
-            <a:extLst>
-              <a:ext uri="{FF2B5EF4-FFF2-40B4-BE49-F238E27FC236}">
-                <a16:creationId xmlns:a16="http://schemas.microsoft.com/office/drawing/2014/main" id="{3C349250-F397-33D5-0C83-A9BDCDB4BF2D}"/>
-              </a:ext>
-            </a:extLst>
-          </p:cNvPr>
+          <p:cNvPr id="3" name="Text Placeholder 2"/>
           <p:cNvSpPr>
             <a:spLocks noGrp="1"/>
           </p:cNvSpPr>
@@ -2792,8 +2437,8 @@
         </p:nvSpPr>
         <p:spPr>
           <a:xfrm>
-            <a:off x="838200" y="1825625"/>
-            <a:ext cx="10515600" cy="4351338"/>
+            <a:off x="640874" y="1947333"/>
+            <a:ext cx="8040053" cy="4641427"/>
           </a:xfrm>
           <a:prstGeom prst="rect">
             <a:avLst/>
@@ -2807,35 +2452,35 @@
           <a:p>
             <a:pPr lvl="0"/>
             <a:r>
-              <a:rPr lang="en-US"/>
+              <a:rPr lang="en-US" dirty="0"/>
               <a:t>Click to edit Master text styles</a:t>
             </a:r>
           </a:p>
           <a:p>
             <a:pPr lvl="1"/>
             <a:r>
-              <a:rPr lang="en-US"/>
+              <a:rPr lang="en-US" dirty="0"/>
               <a:t>Second level</a:t>
             </a:r>
           </a:p>
           <a:p>
             <a:pPr lvl="2"/>
             <a:r>
-              <a:rPr lang="en-US"/>
+              <a:rPr lang="en-US" dirty="0"/>
               <a:t>Third level</a:t>
             </a:r>
           </a:p>
           <a:p>
             <a:pPr lvl="3"/>
             <a:r>
-              <a:rPr lang="en-US"/>
+              <a:rPr lang="en-US" dirty="0"/>
               <a:t>Fourth level</a:t>
             </a:r>
           </a:p>
           <a:p>
             <a:pPr lvl="4"/>
             <a:r>
-              <a:rPr lang="en-US"/>
+              <a:rPr lang="en-US" dirty="0"/>
               <a:t>Fifth level</a:t>
             </a:r>
           </a:p>
@@ -2843,13 +2488,7 @@
       </p:sp>
       <p:sp>
         <p:nvSpPr>
-          <p:cNvPr id="4" name="Date Placeholder 3">
-            <a:extLst>
-              <a:ext uri="{FF2B5EF4-FFF2-40B4-BE49-F238E27FC236}">
-                <a16:creationId xmlns:a16="http://schemas.microsoft.com/office/drawing/2014/main" id="{A1F9E45A-4D4B-3E3B-FB7D-CF3D7CEF35FF}"/>
-              </a:ext>
-            </a:extLst>
-          </p:cNvPr>
+          <p:cNvPr id="4" name="Date Placeholder 3"/>
           <p:cNvSpPr>
             <a:spLocks noGrp="1"/>
           </p:cNvSpPr>
@@ -2859,8 +2498,8 @@
         </p:nvSpPr>
         <p:spPr>
           <a:xfrm>
-            <a:off x="838200" y="6356350"/>
-            <a:ext cx="2743200" cy="365125"/>
+            <a:off x="640874" y="6780108"/>
+            <a:ext cx="2097405" cy="389467"/>
           </a:xfrm>
           <a:prstGeom prst="rect">
             <a:avLst/>
@@ -2870,7 +2509,7 @@
           <a:bodyPr vert="horz" lIns="91440" tIns="45720" rIns="91440" bIns="45720" rtlCol="0" anchor="ctr"/>
           <a:lstStyle>
             <a:lvl1pPr algn="l">
-              <a:defRPr sz="1200">
+              <a:defRPr sz="1223">
                 <a:solidFill>
                   <a:schemeClr val="tx1">
                     <a:tint val="75000"/>
@@ -2889,13 +2528,7 @@
       </p:sp>
       <p:sp>
         <p:nvSpPr>
-          <p:cNvPr id="5" name="Footer Placeholder 4">
-            <a:extLst>
-              <a:ext uri="{FF2B5EF4-FFF2-40B4-BE49-F238E27FC236}">
-                <a16:creationId xmlns:a16="http://schemas.microsoft.com/office/drawing/2014/main" id="{CC82F125-0F5E-81AC-2FF6-7E09700DC0FA}"/>
-              </a:ext>
-            </a:extLst>
-          </p:cNvPr>
+          <p:cNvPr id="5" name="Footer Placeholder 4"/>
           <p:cNvSpPr>
             <a:spLocks noGrp="1"/>
           </p:cNvSpPr>
@@ -2905,8 +2538,8 @@
         </p:nvSpPr>
         <p:spPr>
           <a:xfrm>
-            <a:off x="4038600" y="6356350"/>
-            <a:ext cx="4114800" cy="365125"/>
+            <a:off x="3087846" y="6780108"/>
+            <a:ext cx="3146108" cy="389467"/>
           </a:xfrm>
           <a:prstGeom prst="rect">
             <a:avLst/>
@@ -2916,7 +2549,7 @@
           <a:bodyPr vert="horz" lIns="91440" tIns="45720" rIns="91440" bIns="45720" rtlCol="0" anchor="ctr"/>
           <a:lstStyle>
             <a:lvl1pPr algn="ctr">
-              <a:defRPr sz="1200">
+              <a:defRPr sz="1223">
                 <a:solidFill>
                   <a:schemeClr val="tx1">
                     <a:tint val="75000"/>
@@ -2932,13 +2565,7 @@
       </p:sp>
       <p:sp>
         <p:nvSpPr>
-          <p:cNvPr id="6" name="Slide Number Placeholder 5">
-            <a:extLst>
-              <a:ext uri="{FF2B5EF4-FFF2-40B4-BE49-F238E27FC236}">
-                <a16:creationId xmlns:a16="http://schemas.microsoft.com/office/drawing/2014/main" id="{128B9CD3-7AF1-A6D0-8C47-4E7BDD26F63D}"/>
-              </a:ext>
-            </a:extLst>
-          </p:cNvPr>
+          <p:cNvPr id="6" name="Slide Number Placeholder 5"/>
           <p:cNvSpPr>
             <a:spLocks noGrp="1"/>
           </p:cNvSpPr>
@@ -2948,8 +2575,8 @@
         </p:nvSpPr>
         <p:spPr>
           <a:xfrm>
-            <a:off x="8610600" y="6356350"/>
-            <a:ext cx="2743200" cy="365125"/>
+            <a:off x="6583521" y="6780108"/>
+            <a:ext cx="2097405" cy="389467"/>
           </a:xfrm>
           <a:prstGeom prst="rect">
             <a:avLst/>
@@ -2959,7 +2586,7 @@
           <a:bodyPr vert="horz" lIns="91440" tIns="45720" rIns="91440" bIns="45720" rtlCol="0" anchor="ctr"/>
           <a:lstStyle>
             <a:lvl1pPr algn="r">
-              <a:defRPr sz="1200">
+              <a:defRPr sz="1223">
                 <a:solidFill>
                   <a:schemeClr val="tx1">
                     <a:tint val="75000"/>
@@ -2979,27 +2606,27 @@
     </p:spTree>
     <p:extLst>
       <p:ext uri="{BB962C8B-B14F-4D97-AF65-F5344CB8AC3E}">
-        <p14:creationId xmlns:p14="http://schemas.microsoft.com/office/powerpoint/2010/main" val="301623290"/>
+        <p14:creationId xmlns:p14="http://schemas.microsoft.com/office/powerpoint/2010/main" val="1087131768"/>
       </p:ext>
     </p:extLst>
   </p:cSld>
   <p:clrMap bg1="lt1" tx1="dk1" bg2="lt2" tx2="dk2" accent1="accent1" accent2="accent2" accent3="accent3" accent4="accent4" accent5="accent5" accent6="accent6" hlink="hlink" folHlink="folHlink"/>
   <p:sldLayoutIdLst>
-    <p:sldLayoutId id="2147483649" r:id="rId1"/>
-    <p:sldLayoutId id="2147483650" r:id="rId2"/>
-    <p:sldLayoutId id="2147483651" r:id="rId3"/>
-    <p:sldLayoutId id="2147483652" r:id="rId4"/>
-    <p:sldLayoutId id="2147483653" r:id="rId5"/>
-    <p:sldLayoutId id="2147483654" r:id="rId6"/>
-    <p:sldLayoutId id="2147483655" r:id="rId7"/>
-    <p:sldLayoutId id="2147483656" r:id="rId8"/>
-    <p:sldLayoutId id="2147483657" r:id="rId9"/>
-    <p:sldLayoutId id="2147483658" r:id="rId10"/>
-    <p:sldLayoutId id="2147483659" r:id="rId11"/>
+    <p:sldLayoutId id="2147483661" r:id="rId1"/>
+    <p:sldLayoutId id="2147483662" r:id="rId2"/>
+    <p:sldLayoutId id="2147483663" r:id="rId3"/>
+    <p:sldLayoutId id="2147483664" r:id="rId4"/>
+    <p:sldLayoutId id="2147483665" r:id="rId5"/>
+    <p:sldLayoutId id="2147483666" r:id="rId6"/>
+    <p:sldLayoutId id="2147483667" r:id="rId7"/>
+    <p:sldLayoutId id="2147483668" r:id="rId8"/>
+    <p:sldLayoutId id="2147483669" r:id="rId9"/>
+    <p:sldLayoutId id="2147483670" r:id="rId10"/>
+    <p:sldLayoutId id="2147483671" r:id="rId11"/>
   </p:sldLayoutIdLst>
   <p:txStyles>
     <p:titleStyle>
-      <a:lvl1pPr algn="l" defTabSz="914400" rtl="0" eaLnBrk="1" latinLnBrk="0" hangingPunct="1">
+      <a:lvl1pPr algn="l" defTabSz="932139" rtl="0" eaLnBrk="1" latinLnBrk="0" hangingPunct="1">
         <a:lnSpc>
           <a:spcPct val="90000"/>
         </a:lnSpc>
@@ -3007,7 +2634,7 @@
           <a:spcPct val="0"/>
         </a:spcBef>
         <a:buNone/>
-        <a:defRPr sz="4400" kern="1200">
+        <a:defRPr sz="4485" kern="1200">
           <a:solidFill>
             <a:schemeClr val="tx1"/>
           </a:solidFill>
@@ -3018,16 +2645,16 @@
       </a:lvl1pPr>
     </p:titleStyle>
     <p:bodyStyle>
-      <a:lvl1pPr marL="228600" indent="-228600" algn="l" defTabSz="914400" rtl="0" eaLnBrk="1" latinLnBrk="0" hangingPunct="1">
+      <a:lvl1pPr marL="233035" indent="-233035" algn="l" defTabSz="932139" rtl="0" eaLnBrk="1" latinLnBrk="0" hangingPunct="1">
         <a:lnSpc>
           <a:spcPct val="90000"/>
         </a:lnSpc>
         <a:spcBef>
-          <a:spcPts val="1000"/>
+          <a:spcPts val="1019"/>
         </a:spcBef>
         <a:buFont typeface="Arial" panose="020B0604020202020204" pitchFamily="34" charset="0"/>
         <a:buChar char="•"/>
-        <a:defRPr sz="2800" kern="1200">
+        <a:defRPr sz="2854" kern="1200">
           <a:solidFill>
             <a:schemeClr val="tx1"/>
           </a:solidFill>
@@ -3036,16 +2663,16 @@
           <a:cs typeface="+mn-cs"/>
         </a:defRPr>
       </a:lvl1pPr>
-      <a:lvl2pPr marL="685800" indent="-228600" algn="l" defTabSz="914400" rtl="0" eaLnBrk="1" latinLnBrk="0" hangingPunct="1">
+      <a:lvl2pPr marL="699105" indent="-233035" algn="l" defTabSz="932139" rtl="0" eaLnBrk="1" latinLnBrk="0" hangingPunct="1">
         <a:lnSpc>
           <a:spcPct val="90000"/>
         </a:lnSpc>
         <a:spcBef>
-          <a:spcPts val="500"/>
+          <a:spcPts val="510"/>
         </a:spcBef>
         <a:buFont typeface="Arial" panose="020B0604020202020204" pitchFamily="34" charset="0"/>
         <a:buChar char="•"/>
-        <a:defRPr sz="2400" kern="1200">
+        <a:defRPr sz="2447" kern="1200">
           <a:solidFill>
             <a:schemeClr val="tx1"/>
           </a:solidFill>
@@ -3054,16 +2681,16 @@
           <a:cs typeface="+mn-cs"/>
         </a:defRPr>
       </a:lvl2pPr>
-      <a:lvl3pPr marL="1143000" indent="-228600" algn="l" defTabSz="914400" rtl="0" eaLnBrk="1" latinLnBrk="0" hangingPunct="1">
+      <a:lvl3pPr marL="1165174" indent="-233035" algn="l" defTabSz="932139" rtl="0" eaLnBrk="1" latinLnBrk="0" hangingPunct="1">
         <a:lnSpc>
           <a:spcPct val="90000"/>
         </a:lnSpc>
         <a:spcBef>
-          <a:spcPts val="500"/>
+          <a:spcPts val="510"/>
         </a:spcBef>
         <a:buFont typeface="Arial" panose="020B0604020202020204" pitchFamily="34" charset="0"/>
         <a:buChar char="•"/>
-        <a:defRPr sz="2000" kern="1200">
+        <a:defRPr sz="2039" kern="1200">
           <a:solidFill>
             <a:schemeClr val="tx1"/>
           </a:solidFill>
@@ -3072,16 +2699,16 @@
           <a:cs typeface="+mn-cs"/>
         </a:defRPr>
       </a:lvl3pPr>
-      <a:lvl4pPr marL="1600200" indent="-228600" algn="l" defTabSz="914400" rtl="0" eaLnBrk="1" latinLnBrk="0" hangingPunct="1">
+      <a:lvl4pPr marL="1631244" indent="-233035" algn="l" defTabSz="932139" rtl="0" eaLnBrk="1" latinLnBrk="0" hangingPunct="1">
         <a:lnSpc>
           <a:spcPct val="90000"/>
         </a:lnSpc>
         <a:spcBef>
-          <a:spcPts val="500"/>
+          <a:spcPts val="510"/>
         </a:spcBef>
         <a:buFont typeface="Arial" panose="020B0604020202020204" pitchFamily="34" charset="0"/>
         <a:buChar char="•"/>
-        <a:defRPr sz="1800" kern="1200">
+        <a:defRPr sz="1835" kern="1200">
           <a:solidFill>
             <a:schemeClr val="tx1"/>
           </a:solidFill>
@@ -3090,16 +2717,16 @@
           <a:cs typeface="+mn-cs"/>
         </a:defRPr>
       </a:lvl4pPr>
-      <a:lvl5pPr marL="2057400" indent="-228600" algn="l" defTabSz="914400" rtl="0" eaLnBrk="1" latinLnBrk="0" hangingPunct="1">
+      <a:lvl5pPr marL="2097314" indent="-233035" algn="l" defTabSz="932139" rtl="0" eaLnBrk="1" latinLnBrk="0" hangingPunct="1">
         <a:lnSpc>
           <a:spcPct val="90000"/>
         </a:lnSpc>
         <a:spcBef>
-          <a:spcPts val="500"/>
+          <a:spcPts val="510"/>
         </a:spcBef>
         <a:buFont typeface="Arial" panose="020B0604020202020204" pitchFamily="34" charset="0"/>
         <a:buChar char="•"/>
-        <a:defRPr sz="1800" kern="1200">
+        <a:defRPr sz="1835" kern="1200">
           <a:solidFill>
             <a:schemeClr val="tx1"/>
           </a:solidFill>
@@ -3108,16 +2735,16 @@
           <a:cs typeface="+mn-cs"/>
         </a:defRPr>
       </a:lvl5pPr>
-      <a:lvl6pPr marL="2514600" indent="-228600" algn="l" defTabSz="914400" rtl="0" eaLnBrk="1" latinLnBrk="0" hangingPunct="1">
+      <a:lvl6pPr marL="2563383" indent="-233035" algn="l" defTabSz="932139" rtl="0" eaLnBrk="1" latinLnBrk="0" hangingPunct="1">
         <a:lnSpc>
           <a:spcPct val="90000"/>
         </a:lnSpc>
         <a:spcBef>
-          <a:spcPts val="500"/>
+          <a:spcPts val="510"/>
         </a:spcBef>
         <a:buFont typeface="Arial" panose="020B0604020202020204" pitchFamily="34" charset="0"/>
         <a:buChar char="•"/>
-        <a:defRPr sz="1800" kern="1200">
+        <a:defRPr sz="1835" kern="1200">
           <a:solidFill>
             <a:schemeClr val="tx1"/>
           </a:solidFill>
@@ -3126,16 +2753,16 @@
           <a:cs typeface="+mn-cs"/>
         </a:defRPr>
       </a:lvl6pPr>
-      <a:lvl7pPr marL="2971800" indent="-228600" algn="l" defTabSz="914400" rtl="0" eaLnBrk="1" latinLnBrk="0" hangingPunct="1">
+      <a:lvl7pPr marL="3029453" indent="-233035" algn="l" defTabSz="932139" rtl="0" eaLnBrk="1" latinLnBrk="0" hangingPunct="1">
         <a:lnSpc>
           <a:spcPct val="90000"/>
         </a:lnSpc>
         <a:spcBef>
-          <a:spcPts val="500"/>
+          <a:spcPts val="510"/>
         </a:spcBef>
         <a:buFont typeface="Arial" panose="020B0604020202020204" pitchFamily="34" charset="0"/>
         <a:buChar char="•"/>
-        <a:defRPr sz="1800" kern="1200">
+        <a:defRPr sz="1835" kern="1200">
           <a:solidFill>
             <a:schemeClr val="tx1"/>
           </a:solidFill>
@@ -3144,16 +2771,16 @@
           <a:cs typeface="+mn-cs"/>
         </a:defRPr>
       </a:lvl7pPr>
-      <a:lvl8pPr marL="3429000" indent="-228600" algn="l" defTabSz="914400" rtl="0" eaLnBrk="1" latinLnBrk="0" hangingPunct="1">
+      <a:lvl8pPr marL="3495523" indent="-233035" algn="l" defTabSz="932139" rtl="0" eaLnBrk="1" latinLnBrk="0" hangingPunct="1">
         <a:lnSpc>
           <a:spcPct val="90000"/>
         </a:lnSpc>
         <a:spcBef>
-          <a:spcPts val="500"/>
+          <a:spcPts val="510"/>
         </a:spcBef>
         <a:buFont typeface="Arial" panose="020B0604020202020204" pitchFamily="34" charset="0"/>
         <a:buChar char="•"/>
-        <a:defRPr sz="1800" kern="1200">
+        <a:defRPr sz="1835" kern="1200">
           <a:solidFill>
             <a:schemeClr val="tx1"/>
           </a:solidFill>
@@ -3162,16 +2789,16 @@
           <a:cs typeface="+mn-cs"/>
         </a:defRPr>
       </a:lvl8pPr>
-      <a:lvl9pPr marL="3886200" indent="-228600" algn="l" defTabSz="914400" rtl="0" eaLnBrk="1" latinLnBrk="0" hangingPunct="1">
+      <a:lvl9pPr marL="3961592" indent="-233035" algn="l" defTabSz="932139" rtl="0" eaLnBrk="1" latinLnBrk="0" hangingPunct="1">
         <a:lnSpc>
           <a:spcPct val="90000"/>
         </a:lnSpc>
         <a:spcBef>
-          <a:spcPts val="500"/>
+          <a:spcPts val="510"/>
         </a:spcBef>
         <a:buFont typeface="Arial" panose="020B0604020202020204" pitchFamily="34" charset="0"/>
         <a:buChar char="•"/>
-        <a:defRPr sz="1800" kern="1200">
+        <a:defRPr sz="1835" kern="1200">
           <a:solidFill>
             <a:schemeClr val="tx1"/>
           </a:solidFill>
@@ -3185,8 +2812,8 @@
       <a:defPPr>
         <a:defRPr lang="en-US"/>
       </a:defPPr>
-      <a:lvl1pPr marL="0" algn="l" defTabSz="914400" rtl="0" eaLnBrk="1" latinLnBrk="0" hangingPunct="1">
-        <a:defRPr sz="1800" kern="1200">
+      <a:lvl1pPr marL="0" algn="l" defTabSz="932139" rtl="0" eaLnBrk="1" latinLnBrk="0" hangingPunct="1">
+        <a:defRPr sz="1835" kern="1200">
           <a:solidFill>
             <a:schemeClr val="tx1"/>
           </a:solidFill>
@@ -3195,8 +2822,8 @@
           <a:cs typeface="+mn-cs"/>
         </a:defRPr>
       </a:lvl1pPr>
-      <a:lvl2pPr marL="457200" algn="l" defTabSz="914400" rtl="0" eaLnBrk="1" latinLnBrk="0" hangingPunct="1">
-        <a:defRPr sz="1800" kern="1200">
+      <a:lvl2pPr marL="466070" algn="l" defTabSz="932139" rtl="0" eaLnBrk="1" latinLnBrk="0" hangingPunct="1">
+        <a:defRPr sz="1835" kern="1200">
           <a:solidFill>
             <a:schemeClr val="tx1"/>
           </a:solidFill>
@@ -3205,8 +2832,8 @@
           <a:cs typeface="+mn-cs"/>
         </a:defRPr>
       </a:lvl2pPr>
-      <a:lvl3pPr marL="914400" algn="l" defTabSz="914400" rtl="0" eaLnBrk="1" latinLnBrk="0" hangingPunct="1">
-        <a:defRPr sz="1800" kern="1200">
+      <a:lvl3pPr marL="932139" algn="l" defTabSz="932139" rtl="0" eaLnBrk="1" latinLnBrk="0" hangingPunct="1">
+        <a:defRPr sz="1835" kern="1200">
           <a:solidFill>
             <a:schemeClr val="tx1"/>
           </a:solidFill>
@@ -3215,8 +2842,8 @@
           <a:cs typeface="+mn-cs"/>
         </a:defRPr>
       </a:lvl3pPr>
-      <a:lvl4pPr marL="1371600" algn="l" defTabSz="914400" rtl="0" eaLnBrk="1" latinLnBrk="0" hangingPunct="1">
-        <a:defRPr sz="1800" kern="1200">
+      <a:lvl4pPr marL="1398209" algn="l" defTabSz="932139" rtl="0" eaLnBrk="1" latinLnBrk="0" hangingPunct="1">
+        <a:defRPr sz="1835" kern="1200">
           <a:solidFill>
             <a:schemeClr val="tx1"/>
           </a:solidFill>
@@ -3225,8 +2852,8 @@
           <a:cs typeface="+mn-cs"/>
         </a:defRPr>
       </a:lvl4pPr>
-      <a:lvl5pPr marL="1828800" algn="l" defTabSz="914400" rtl="0" eaLnBrk="1" latinLnBrk="0" hangingPunct="1">
-        <a:defRPr sz="1800" kern="1200">
+      <a:lvl5pPr marL="1864279" algn="l" defTabSz="932139" rtl="0" eaLnBrk="1" latinLnBrk="0" hangingPunct="1">
+        <a:defRPr sz="1835" kern="1200">
           <a:solidFill>
             <a:schemeClr val="tx1"/>
           </a:solidFill>
@@ -3235,8 +2862,8 @@
           <a:cs typeface="+mn-cs"/>
         </a:defRPr>
       </a:lvl5pPr>
-      <a:lvl6pPr marL="2286000" algn="l" defTabSz="914400" rtl="0" eaLnBrk="1" latinLnBrk="0" hangingPunct="1">
-        <a:defRPr sz="1800" kern="1200">
+      <a:lvl6pPr marL="2330348" algn="l" defTabSz="932139" rtl="0" eaLnBrk="1" latinLnBrk="0" hangingPunct="1">
+        <a:defRPr sz="1835" kern="1200">
           <a:solidFill>
             <a:schemeClr val="tx1"/>
           </a:solidFill>
@@ -3245,8 +2872,8 @@
           <a:cs typeface="+mn-cs"/>
         </a:defRPr>
       </a:lvl6pPr>
-      <a:lvl7pPr marL="2743200" algn="l" defTabSz="914400" rtl="0" eaLnBrk="1" latinLnBrk="0" hangingPunct="1">
-        <a:defRPr sz="1800" kern="1200">
+      <a:lvl7pPr marL="2796418" algn="l" defTabSz="932139" rtl="0" eaLnBrk="1" latinLnBrk="0" hangingPunct="1">
+        <a:defRPr sz="1835" kern="1200">
           <a:solidFill>
             <a:schemeClr val="tx1"/>
           </a:solidFill>
@@ -3255,8 +2882,8 @@
           <a:cs typeface="+mn-cs"/>
         </a:defRPr>
       </a:lvl7pPr>
-      <a:lvl8pPr marL="3200400" algn="l" defTabSz="914400" rtl="0" eaLnBrk="1" latinLnBrk="0" hangingPunct="1">
-        <a:defRPr sz="1800" kern="1200">
+      <a:lvl8pPr marL="3262488" algn="l" defTabSz="932139" rtl="0" eaLnBrk="1" latinLnBrk="0" hangingPunct="1">
+        <a:defRPr sz="1835" kern="1200">
           <a:solidFill>
             <a:schemeClr val="tx1"/>
           </a:solidFill>
@@ -3265,8 +2892,8 @@
           <a:cs typeface="+mn-cs"/>
         </a:defRPr>
       </a:lvl8pPr>
-      <a:lvl9pPr marL="3657600" algn="l" defTabSz="914400" rtl="0" eaLnBrk="1" latinLnBrk="0" hangingPunct="1">
-        <a:defRPr sz="1800" kern="1200">
+      <a:lvl9pPr marL="3728557" algn="l" defTabSz="932139" rtl="0" eaLnBrk="1" latinLnBrk="0" hangingPunct="1">
+        <a:defRPr sz="1835" kern="1200">
           <a:solidFill>
             <a:schemeClr val="tx1"/>
           </a:solidFill>
@@ -3297,42 +2924,1077 @@
           <a:chExt cx="0" cy="0"/>
         </a:xfrm>
       </p:grpSpPr>
-      <p:pic>
-        <p:nvPicPr>
-          <p:cNvPr id="4" name="Picture 3">
+      <p:grpSp>
+        <p:nvGrpSpPr>
+          <p:cNvPr id="9" name="Group 8">
             <a:extLst>
               <a:ext uri="{FF2B5EF4-FFF2-40B4-BE49-F238E27FC236}">
-                <a16:creationId xmlns:a16="http://schemas.microsoft.com/office/drawing/2014/main" id="{CC3F3570-A976-8032-6712-A801E29D5E1E}"/>
+                <a16:creationId xmlns:a16="http://schemas.microsoft.com/office/drawing/2014/main" id="{88132207-B7CD-7EDB-A2C1-516365FEA2C6}"/>
               </a:ext>
             </a:extLst>
           </p:cNvPr>
-          <p:cNvPicPr>
-            <a:picLocks noChangeAspect="1"/>
-          </p:cNvPicPr>
+          <p:cNvGrpSpPr/>
           <p:nvPr/>
-        </p:nvPicPr>
-        <p:blipFill>
-          <a:blip r:embed="rId2"/>
-          <a:stretch>
-            <a:fillRect/>
-          </a:stretch>
-        </p:blipFill>
-        <p:spPr>
+        </p:nvGrpSpPr>
+        <p:grpSpPr>
           <a:xfrm>
-            <a:off x="2698507" y="0"/>
-            <a:ext cx="6794986" cy="6858000"/>
+            <a:off x="2063233" y="621956"/>
+            <a:ext cx="5195333" cy="5243513"/>
+            <a:chOff x="2063234" y="1035844"/>
+            <a:chExt cx="5195333" cy="5243513"/>
           </a:xfrm>
-          <a:prstGeom prst="rect">
-            <a:avLst/>
-          </a:prstGeom>
-        </p:spPr>
-      </p:pic>
-      <p:sp>
-        <p:nvSpPr>
-          <p:cNvPr id="6" name="Freeform 5">
+        </p:grpSpPr>
+        <p:pic>
+          <p:nvPicPr>
+            <p:cNvPr id="4" name="Picture 3">
+              <a:extLst>
+                <a:ext uri="{FF2B5EF4-FFF2-40B4-BE49-F238E27FC236}">
+                  <a16:creationId xmlns:a16="http://schemas.microsoft.com/office/drawing/2014/main" id="{CC3F3570-A976-8032-6712-A801E29D5E1E}"/>
+                </a:ext>
+              </a:extLst>
+            </p:cNvPr>
+            <p:cNvPicPr>
+              <a:picLocks noChangeAspect="1"/>
+            </p:cNvPicPr>
+            <p:nvPr/>
+          </p:nvPicPr>
+          <p:blipFill>
+            <a:blip r:embed="rId2"/>
+            <a:stretch>
+              <a:fillRect/>
+            </a:stretch>
+          </p:blipFill>
+          <p:spPr>
+            <a:xfrm>
+              <a:off x="2063234" y="1035844"/>
+              <a:ext cx="5195333" cy="5243513"/>
+            </a:xfrm>
+            <a:prstGeom prst="rect">
+              <a:avLst/>
+            </a:prstGeom>
+          </p:spPr>
+        </p:pic>
+        <p:sp>
+          <p:nvSpPr>
+            <p:cNvPr id="6" name="Freeform 5">
+              <a:extLst>
+                <a:ext uri="{FF2B5EF4-FFF2-40B4-BE49-F238E27FC236}">
+                  <a16:creationId xmlns:a16="http://schemas.microsoft.com/office/drawing/2014/main" id="{0732ACB9-DF25-447D-EDAC-7E8920A3B60F}"/>
+                </a:ext>
+              </a:extLst>
+            </p:cNvPr>
+            <p:cNvSpPr/>
+            <p:nvPr/>
+          </p:nvSpPr>
+          <p:spPr>
+            <a:xfrm>
+              <a:off x="3807847" y="2879609"/>
+              <a:ext cx="1632399" cy="598329"/>
+            </a:xfrm>
+            <a:custGeom>
+              <a:avLst/>
+              <a:gdLst>
+                <a:gd name="connsiteX0" fmla="*/ 561399 w 2135018"/>
+                <a:gd name="connsiteY0" fmla="*/ 191386 h 782556"/>
+                <a:gd name="connsiteX1" fmla="*/ 1050497 w 2135018"/>
+                <a:gd name="connsiteY1" fmla="*/ 0 h 782556"/>
+                <a:gd name="connsiteX2" fmla="*/ 2135018 w 2135018"/>
+                <a:gd name="connsiteY2" fmla="*/ 395531 h 782556"/>
+                <a:gd name="connsiteX3" fmla="*/ 1071762 w 2135018"/>
+                <a:gd name="connsiteY3" fmla="*/ 782556 h 782556"/>
+                <a:gd name="connsiteX4" fmla="*/ 0 w 2135018"/>
+                <a:gd name="connsiteY4" fmla="*/ 391278 h 782556"/>
+                <a:gd name="connsiteX5" fmla="*/ 0 w 2135018"/>
+                <a:gd name="connsiteY5" fmla="*/ 391278 h 782556"/>
+                <a:gd name="connsiteX0" fmla="*/ 12759 w 2135018"/>
+                <a:gd name="connsiteY0" fmla="*/ 382772 h 782556"/>
+                <a:gd name="connsiteX1" fmla="*/ 1050497 w 2135018"/>
+                <a:gd name="connsiteY1" fmla="*/ 0 h 782556"/>
+                <a:gd name="connsiteX2" fmla="*/ 2135018 w 2135018"/>
+                <a:gd name="connsiteY2" fmla="*/ 395531 h 782556"/>
+                <a:gd name="connsiteX3" fmla="*/ 1071762 w 2135018"/>
+                <a:gd name="connsiteY3" fmla="*/ 782556 h 782556"/>
+                <a:gd name="connsiteX4" fmla="*/ 0 w 2135018"/>
+                <a:gd name="connsiteY4" fmla="*/ 391278 h 782556"/>
+                <a:gd name="connsiteX5" fmla="*/ 0 w 2135018"/>
+                <a:gd name="connsiteY5" fmla="*/ 391278 h 782556"/>
+                <a:gd name="connsiteX0" fmla="*/ 12759 w 2135018"/>
+                <a:gd name="connsiteY0" fmla="*/ 382772 h 782556"/>
+                <a:gd name="connsiteX1" fmla="*/ 1050497 w 2135018"/>
+                <a:gd name="connsiteY1" fmla="*/ 0 h 782556"/>
+                <a:gd name="connsiteX2" fmla="*/ 2135018 w 2135018"/>
+                <a:gd name="connsiteY2" fmla="*/ 395531 h 782556"/>
+                <a:gd name="connsiteX3" fmla="*/ 1071762 w 2135018"/>
+                <a:gd name="connsiteY3" fmla="*/ 782556 h 782556"/>
+                <a:gd name="connsiteX4" fmla="*/ 0 w 2135018"/>
+                <a:gd name="connsiteY4" fmla="*/ 391278 h 782556"/>
+                <a:gd name="connsiteX5" fmla="*/ 0 w 2135018"/>
+                <a:gd name="connsiteY5" fmla="*/ 391278 h 782556"/>
+              </a:gdLst>
+              <a:ahLst/>
+              <a:cxnLst>
+                <a:cxn ang="0">
+                  <a:pos x="connsiteX0" y="connsiteY0"/>
+                </a:cxn>
+                <a:cxn ang="0">
+                  <a:pos x="connsiteX1" y="connsiteY1"/>
+                </a:cxn>
+                <a:cxn ang="0">
+                  <a:pos x="connsiteX2" y="connsiteY2"/>
+                </a:cxn>
+                <a:cxn ang="0">
+                  <a:pos x="connsiteX3" y="connsiteY3"/>
+                </a:cxn>
+                <a:cxn ang="0">
+                  <a:pos x="connsiteX4" y="connsiteY4"/>
+                </a:cxn>
+                <a:cxn ang="0">
+                  <a:pos x="connsiteX5" y="connsiteY5"/>
+                </a:cxn>
+              </a:cxnLst>
+              <a:rect l="l" t="t" r="r" b="b"/>
+              <a:pathLst>
+                <a:path w="2135018" h="782556">
+                  <a:moveTo>
+                    <a:pt x="12759" y="382772"/>
+                  </a:moveTo>
+                  <a:cubicBezTo>
+                    <a:pt x="31189" y="382771"/>
+                    <a:pt x="704584" y="127591"/>
+                    <a:pt x="1050497" y="0"/>
+                  </a:cubicBezTo>
+                  <a:lnTo>
+                    <a:pt x="2135018" y="395531"/>
+                  </a:lnTo>
+                  <a:lnTo>
+                    <a:pt x="1071762" y="782556"/>
+                  </a:lnTo>
+                  <a:lnTo>
+                    <a:pt x="0" y="391278"/>
+                  </a:lnTo>
+                  <a:lnTo>
+                    <a:pt x="0" y="391278"/>
+                  </a:lnTo>
+                </a:path>
+              </a:pathLst>
+            </a:custGeom>
+            <a:solidFill>
+              <a:srgbClr val="FDCC02"/>
+            </a:solidFill>
+            <a:ln>
+              <a:solidFill>
+                <a:srgbClr val="FDCC02"/>
+              </a:solidFill>
+            </a:ln>
+          </p:spPr>
+          <p:style>
+            <a:lnRef idx="2">
+              <a:schemeClr val="accent1">
+                <a:shade val="15000"/>
+              </a:schemeClr>
+            </a:lnRef>
+            <a:fillRef idx="1">
+              <a:schemeClr val="accent1"/>
+            </a:fillRef>
+            <a:effectRef idx="0">
+              <a:schemeClr val="accent1"/>
+            </a:effectRef>
+            <a:fontRef idx="minor">
+              <a:schemeClr val="lt1"/>
+            </a:fontRef>
+          </p:style>
+          <p:txBody>
+            <a:bodyPr rtlCol="0" anchor="ctr"/>
+            <a:lstStyle/>
+            <a:p>
+              <a:pPr algn="ctr"/>
+              <a:endParaRPr lang="en-US" sz="1376">
+                <a:solidFill>
+                  <a:srgbClr val="FDCC02"/>
+                </a:solidFill>
+              </a:endParaRPr>
+            </a:p>
+          </p:txBody>
+        </p:sp>
+        <p:sp>
+          <p:nvSpPr>
+            <p:cNvPr id="7" name="Freeform 6">
+              <a:extLst>
+                <a:ext uri="{FF2B5EF4-FFF2-40B4-BE49-F238E27FC236}">
+                  <a16:creationId xmlns:a16="http://schemas.microsoft.com/office/drawing/2014/main" id="{66038393-F867-9FEA-82FB-17C4F368C10C}"/>
+                </a:ext>
+              </a:extLst>
+            </p:cNvPr>
+            <p:cNvSpPr/>
+            <p:nvPr/>
+          </p:nvSpPr>
+          <p:spPr>
+            <a:xfrm>
+              <a:off x="3160741" y="1152908"/>
+              <a:ext cx="2913604" cy="2003103"/>
+            </a:xfrm>
+            <a:custGeom>
+              <a:avLst/>
+              <a:gdLst>
+                <a:gd name="connsiteX0" fmla="*/ 599676 w 3810708"/>
+                <a:gd name="connsiteY0" fmla="*/ 2607103 h 2619862"/>
+                <a:gd name="connsiteX1" fmla="*/ 1909607 w 3810708"/>
+                <a:gd name="connsiteY1" fmla="*/ 2143524 h 2619862"/>
+                <a:gd name="connsiteX2" fmla="*/ 3202526 w 3810708"/>
+                <a:gd name="connsiteY2" fmla="*/ 2619862 h 2619862"/>
+                <a:gd name="connsiteX3" fmla="*/ 3810708 w 3810708"/>
+                <a:gd name="connsiteY3" fmla="*/ 1956391 h 2619862"/>
+                <a:gd name="connsiteX4" fmla="*/ 3547021 w 3810708"/>
+                <a:gd name="connsiteY4" fmla="*/ 229663 h 2619862"/>
+                <a:gd name="connsiteX5" fmla="*/ 1841559 w 3810708"/>
+                <a:gd name="connsiteY5" fmla="*/ 0 h 2619862"/>
+                <a:gd name="connsiteX6" fmla="*/ 199892 w 3810708"/>
+                <a:gd name="connsiteY6" fmla="*/ 327483 h 2619862"/>
+                <a:gd name="connsiteX7" fmla="*/ 0 w 3810708"/>
+                <a:gd name="connsiteY7" fmla="*/ 1956391 h 2619862"/>
+                <a:gd name="connsiteX8" fmla="*/ 599676 w 3810708"/>
+                <a:gd name="connsiteY8" fmla="*/ 2607103 h 2619862"/>
+              </a:gdLst>
+              <a:ahLst/>
+              <a:cxnLst>
+                <a:cxn ang="0">
+                  <a:pos x="connsiteX0" y="connsiteY0"/>
+                </a:cxn>
+                <a:cxn ang="0">
+                  <a:pos x="connsiteX1" y="connsiteY1"/>
+                </a:cxn>
+                <a:cxn ang="0">
+                  <a:pos x="connsiteX2" y="connsiteY2"/>
+                </a:cxn>
+                <a:cxn ang="0">
+                  <a:pos x="connsiteX3" y="connsiteY3"/>
+                </a:cxn>
+                <a:cxn ang="0">
+                  <a:pos x="connsiteX4" y="connsiteY4"/>
+                </a:cxn>
+                <a:cxn ang="0">
+                  <a:pos x="connsiteX5" y="connsiteY5"/>
+                </a:cxn>
+                <a:cxn ang="0">
+                  <a:pos x="connsiteX6" y="connsiteY6"/>
+                </a:cxn>
+                <a:cxn ang="0">
+                  <a:pos x="connsiteX7" y="connsiteY7"/>
+                </a:cxn>
+                <a:cxn ang="0">
+                  <a:pos x="connsiteX8" y="connsiteY8"/>
+                </a:cxn>
+              </a:cxnLst>
+              <a:rect l="l" t="t" r="r" b="b"/>
+              <a:pathLst>
+                <a:path w="3810708" h="2619862">
+                  <a:moveTo>
+                    <a:pt x="599676" y="2607103"/>
+                  </a:moveTo>
+                  <a:lnTo>
+                    <a:pt x="1909607" y="2143524"/>
+                  </a:lnTo>
+                  <a:lnTo>
+                    <a:pt x="3202526" y="2619862"/>
+                  </a:lnTo>
+                  <a:lnTo>
+                    <a:pt x="3810708" y="1956391"/>
+                  </a:lnTo>
+                  <a:lnTo>
+                    <a:pt x="3547021" y="229663"/>
+                  </a:lnTo>
+                  <a:lnTo>
+                    <a:pt x="1841559" y="0"/>
+                  </a:lnTo>
+                  <a:lnTo>
+                    <a:pt x="199892" y="327483"/>
+                  </a:lnTo>
+                  <a:lnTo>
+                    <a:pt x="0" y="1956391"/>
+                  </a:lnTo>
+                  <a:lnTo>
+                    <a:pt x="599676" y="2607103"/>
+                  </a:lnTo>
+                  <a:close/>
+                </a:path>
+              </a:pathLst>
+            </a:custGeom>
+            <a:solidFill>
+              <a:srgbClr val="DCDDDA"/>
+            </a:solidFill>
+            <a:ln>
+              <a:noFill/>
+            </a:ln>
+          </p:spPr>
+          <p:style>
+            <a:lnRef idx="2">
+              <a:schemeClr val="accent1">
+                <a:shade val="15000"/>
+              </a:schemeClr>
+            </a:lnRef>
+            <a:fillRef idx="1">
+              <a:schemeClr val="accent1"/>
+            </a:fillRef>
+            <a:effectRef idx="0">
+              <a:schemeClr val="accent1"/>
+            </a:effectRef>
+            <a:fontRef idx="minor">
+              <a:schemeClr val="lt1"/>
+            </a:fontRef>
+          </p:style>
+          <p:txBody>
+            <a:bodyPr rtlCol="0" anchor="ctr"/>
+            <a:lstStyle/>
+            <a:p>
+              <a:pPr algn="ctr"/>
+              <a:endParaRPr lang="en-US" sz="1376"/>
+            </a:p>
+          </p:txBody>
+        </p:sp>
+        <p:sp>
+          <p:nvSpPr>
+            <p:cNvPr id="8" name="TextBox 7">
+              <a:extLst>
+                <a:ext uri="{FF2B5EF4-FFF2-40B4-BE49-F238E27FC236}">
+                  <a16:creationId xmlns:a16="http://schemas.microsoft.com/office/drawing/2014/main" id="{3DEBEA24-31E7-2937-E58E-6C995F8D61F6}"/>
+                </a:ext>
+              </a:extLst>
+            </p:cNvPr>
+            <p:cNvSpPr txBox="1"/>
+            <p:nvPr/>
+          </p:nvSpPr>
+          <p:spPr>
+            <a:xfrm>
+              <a:off x="2618557" y="1264654"/>
+              <a:ext cx="4200189" cy="1445460"/>
+            </a:xfrm>
+            <a:prstGeom prst="rect">
+              <a:avLst/>
+            </a:prstGeom>
+            <a:noFill/>
+          </p:spPr>
+          <p:txBody>
+            <a:bodyPr wrap="none" rtlCol="0">
+              <a:spAutoFit/>
+            </a:bodyPr>
+            <a:lstStyle/>
+            <a:p>
+              <a:r>
+                <a:rPr lang="en-US" sz="8793">
+                  <a:latin typeface="Kefa" panose="02000506000000020004" pitchFamily="2" charset="77"/>
+                  <a:cs typeface="Apple Chancery" panose="03020702040506060504" pitchFamily="66" charset="-79"/>
+                </a:rPr>
+                <a:t>xApRES</a:t>
+              </a:r>
+            </a:p>
+          </p:txBody>
+        </p:sp>
+      </p:grpSp>
+    </p:spTree>
+    <p:extLst>
+      <p:ext uri="{BB962C8B-B14F-4D97-AF65-F5344CB8AC3E}">
+        <p14:creationId xmlns:p14="http://schemas.microsoft.com/office/powerpoint/2010/main" val="28669324"/>
+      </p:ext>
+    </p:extLst>
+  </p:cSld>
+  <p:clrMapOvr>
+    <a:masterClrMapping/>
+  </p:clrMapOvr>
+</p:sld>
+</file>
+
+<file path=ppt/slides/slide2.xml><?xml version="1.0" encoding="utf-8"?>
+<p:sld xmlns:a="http://schemas.openxmlformats.org/drawingml/2006/main" xmlns:r="http://schemas.openxmlformats.org/officeDocument/2006/relationships" xmlns:p="http://schemas.openxmlformats.org/presentationml/2006/main">
+  <p:cSld>
+    <p:spTree>
+      <p:nvGrpSpPr>
+        <p:cNvPr id="1" name="">
+          <a:extLst>
+            <a:ext uri="{FF2B5EF4-FFF2-40B4-BE49-F238E27FC236}">
+              <a16:creationId xmlns:a16="http://schemas.microsoft.com/office/drawing/2014/main" id="{87213EE7-696A-7A2E-2447-F77DF1859189}"/>
+            </a:ext>
+          </a:extLst>
+        </p:cNvPr>
+        <p:cNvGrpSpPr/>
+        <p:nvPr/>
+      </p:nvGrpSpPr>
+      <p:grpSpPr>
+        <a:xfrm>
+          <a:off x="0" y="0"/>
+          <a:ext cx="0" cy="0"/>
+          <a:chOff x="0" y="0"/>
+          <a:chExt cx="0" cy="0"/>
+        </a:xfrm>
+      </p:grpSpPr>
+      <p:grpSp>
+        <p:nvGrpSpPr>
+          <p:cNvPr id="5" name="Group 4">
             <a:extLst>
               <a:ext uri="{FF2B5EF4-FFF2-40B4-BE49-F238E27FC236}">
-                <a16:creationId xmlns:a16="http://schemas.microsoft.com/office/drawing/2014/main" id="{0732ACB9-DF25-447D-EDAC-7E8920A3B60F}"/>
+                <a16:creationId xmlns:a16="http://schemas.microsoft.com/office/drawing/2014/main" id="{D143574F-76D1-7961-7736-12C2EFF43E76}"/>
+              </a:ext>
+            </a:extLst>
+          </p:cNvPr>
+          <p:cNvGrpSpPr/>
+          <p:nvPr/>
+        </p:nvGrpSpPr>
+        <p:grpSpPr>
+          <a:xfrm>
+            <a:off x="2063233" y="621956"/>
+            <a:ext cx="5195333" cy="5243513"/>
+            <a:chOff x="2063233" y="621956"/>
+            <a:chExt cx="5195333" cy="5243513"/>
+          </a:xfrm>
+        </p:grpSpPr>
+        <p:grpSp>
+          <p:nvGrpSpPr>
+            <p:cNvPr id="9" name="Group 8">
+              <a:extLst>
+                <a:ext uri="{FF2B5EF4-FFF2-40B4-BE49-F238E27FC236}">
+                  <a16:creationId xmlns:a16="http://schemas.microsoft.com/office/drawing/2014/main" id="{E9BEB3A7-7F71-4173-C752-2FD8389571AE}"/>
+                </a:ext>
+              </a:extLst>
+            </p:cNvPr>
+            <p:cNvGrpSpPr/>
+            <p:nvPr/>
+          </p:nvGrpSpPr>
+          <p:grpSpPr>
+            <a:xfrm>
+              <a:off x="2063233" y="621956"/>
+              <a:ext cx="5195333" cy="5243513"/>
+              <a:chOff x="2063234" y="1035844"/>
+              <a:chExt cx="5195333" cy="5243513"/>
+            </a:xfrm>
+          </p:grpSpPr>
+          <p:pic>
+            <p:nvPicPr>
+              <p:cNvPr id="4" name="Picture 3">
+                <a:extLst>
+                  <a:ext uri="{FF2B5EF4-FFF2-40B4-BE49-F238E27FC236}">
+                    <a16:creationId xmlns:a16="http://schemas.microsoft.com/office/drawing/2014/main" id="{6BFA1DA5-1634-CDBB-5393-3B2F5A12E8AA}"/>
+                  </a:ext>
+                </a:extLst>
+              </p:cNvPr>
+              <p:cNvPicPr>
+                <a:picLocks noChangeAspect="1"/>
+              </p:cNvPicPr>
+              <p:nvPr/>
+            </p:nvPicPr>
+            <p:blipFill>
+              <a:blip r:embed="rId2"/>
+              <a:stretch>
+                <a:fillRect/>
+              </a:stretch>
+            </p:blipFill>
+            <p:spPr>
+              <a:xfrm>
+                <a:off x="2063234" y="1035844"/>
+                <a:ext cx="5195333" cy="5243513"/>
+              </a:xfrm>
+              <a:prstGeom prst="rect">
+                <a:avLst/>
+              </a:prstGeom>
+            </p:spPr>
+          </p:pic>
+          <p:sp>
+            <p:nvSpPr>
+              <p:cNvPr id="6" name="Freeform 5">
+                <a:extLst>
+                  <a:ext uri="{FF2B5EF4-FFF2-40B4-BE49-F238E27FC236}">
+                    <a16:creationId xmlns:a16="http://schemas.microsoft.com/office/drawing/2014/main" id="{01702F05-938F-83E1-2E7F-5AA8B6BE256E}"/>
+                  </a:ext>
+                </a:extLst>
+              </p:cNvPr>
+              <p:cNvSpPr/>
+              <p:nvPr/>
+            </p:nvSpPr>
+            <p:spPr>
+              <a:xfrm>
+                <a:off x="3807847" y="2879609"/>
+                <a:ext cx="1632399" cy="598329"/>
+              </a:xfrm>
+              <a:custGeom>
+                <a:avLst/>
+                <a:gdLst>
+                  <a:gd name="connsiteX0" fmla="*/ 561399 w 2135018"/>
+                  <a:gd name="connsiteY0" fmla="*/ 191386 h 782556"/>
+                  <a:gd name="connsiteX1" fmla="*/ 1050497 w 2135018"/>
+                  <a:gd name="connsiteY1" fmla="*/ 0 h 782556"/>
+                  <a:gd name="connsiteX2" fmla="*/ 2135018 w 2135018"/>
+                  <a:gd name="connsiteY2" fmla="*/ 395531 h 782556"/>
+                  <a:gd name="connsiteX3" fmla="*/ 1071762 w 2135018"/>
+                  <a:gd name="connsiteY3" fmla="*/ 782556 h 782556"/>
+                  <a:gd name="connsiteX4" fmla="*/ 0 w 2135018"/>
+                  <a:gd name="connsiteY4" fmla="*/ 391278 h 782556"/>
+                  <a:gd name="connsiteX5" fmla="*/ 0 w 2135018"/>
+                  <a:gd name="connsiteY5" fmla="*/ 391278 h 782556"/>
+                  <a:gd name="connsiteX0" fmla="*/ 12759 w 2135018"/>
+                  <a:gd name="connsiteY0" fmla="*/ 382772 h 782556"/>
+                  <a:gd name="connsiteX1" fmla="*/ 1050497 w 2135018"/>
+                  <a:gd name="connsiteY1" fmla="*/ 0 h 782556"/>
+                  <a:gd name="connsiteX2" fmla="*/ 2135018 w 2135018"/>
+                  <a:gd name="connsiteY2" fmla="*/ 395531 h 782556"/>
+                  <a:gd name="connsiteX3" fmla="*/ 1071762 w 2135018"/>
+                  <a:gd name="connsiteY3" fmla="*/ 782556 h 782556"/>
+                  <a:gd name="connsiteX4" fmla="*/ 0 w 2135018"/>
+                  <a:gd name="connsiteY4" fmla="*/ 391278 h 782556"/>
+                  <a:gd name="connsiteX5" fmla="*/ 0 w 2135018"/>
+                  <a:gd name="connsiteY5" fmla="*/ 391278 h 782556"/>
+                  <a:gd name="connsiteX0" fmla="*/ 12759 w 2135018"/>
+                  <a:gd name="connsiteY0" fmla="*/ 382772 h 782556"/>
+                  <a:gd name="connsiteX1" fmla="*/ 1050497 w 2135018"/>
+                  <a:gd name="connsiteY1" fmla="*/ 0 h 782556"/>
+                  <a:gd name="connsiteX2" fmla="*/ 2135018 w 2135018"/>
+                  <a:gd name="connsiteY2" fmla="*/ 395531 h 782556"/>
+                  <a:gd name="connsiteX3" fmla="*/ 1071762 w 2135018"/>
+                  <a:gd name="connsiteY3" fmla="*/ 782556 h 782556"/>
+                  <a:gd name="connsiteX4" fmla="*/ 0 w 2135018"/>
+                  <a:gd name="connsiteY4" fmla="*/ 391278 h 782556"/>
+                  <a:gd name="connsiteX5" fmla="*/ 0 w 2135018"/>
+                  <a:gd name="connsiteY5" fmla="*/ 391278 h 782556"/>
+                </a:gdLst>
+                <a:ahLst/>
+                <a:cxnLst>
+                  <a:cxn ang="0">
+                    <a:pos x="connsiteX0" y="connsiteY0"/>
+                  </a:cxn>
+                  <a:cxn ang="0">
+                    <a:pos x="connsiteX1" y="connsiteY1"/>
+                  </a:cxn>
+                  <a:cxn ang="0">
+                    <a:pos x="connsiteX2" y="connsiteY2"/>
+                  </a:cxn>
+                  <a:cxn ang="0">
+                    <a:pos x="connsiteX3" y="connsiteY3"/>
+                  </a:cxn>
+                  <a:cxn ang="0">
+                    <a:pos x="connsiteX4" y="connsiteY4"/>
+                  </a:cxn>
+                  <a:cxn ang="0">
+                    <a:pos x="connsiteX5" y="connsiteY5"/>
+                  </a:cxn>
+                </a:cxnLst>
+                <a:rect l="l" t="t" r="r" b="b"/>
+                <a:pathLst>
+                  <a:path w="2135018" h="782556">
+                    <a:moveTo>
+                      <a:pt x="12759" y="382772"/>
+                    </a:moveTo>
+                    <a:cubicBezTo>
+                      <a:pt x="31189" y="382771"/>
+                      <a:pt x="704584" y="127591"/>
+                      <a:pt x="1050497" y="0"/>
+                    </a:cubicBezTo>
+                    <a:lnTo>
+                      <a:pt x="2135018" y="395531"/>
+                    </a:lnTo>
+                    <a:lnTo>
+                      <a:pt x="1071762" y="782556"/>
+                    </a:lnTo>
+                    <a:lnTo>
+                      <a:pt x="0" y="391278"/>
+                    </a:lnTo>
+                    <a:lnTo>
+                      <a:pt x="0" y="391278"/>
+                    </a:lnTo>
+                  </a:path>
+                </a:pathLst>
+              </a:custGeom>
+              <a:solidFill>
+                <a:srgbClr val="FDCC02"/>
+              </a:solidFill>
+              <a:ln>
+                <a:solidFill>
+                  <a:srgbClr val="FDCC02"/>
+                </a:solidFill>
+              </a:ln>
+            </p:spPr>
+            <p:style>
+              <a:lnRef idx="2">
+                <a:schemeClr val="accent1">
+                  <a:shade val="15000"/>
+                </a:schemeClr>
+              </a:lnRef>
+              <a:fillRef idx="1">
+                <a:schemeClr val="accent1"/>
+              </a:fillRef>
+              <a:effectRef idx="0">
+                <a:schemeClr val="accent1"/>
+              </a:effectRef>
+              <a:fontRef idx="minor">
+                <a:schemeClr val="lt1"/>
+              </a:fontRef>
+            </p:style>
+            <p:txBody>
+              <a:bodyPr rtlCol="0" anchor="ctr"/>
+              <a:lstStyle/>
+              <a:p>
+                <a:pPr algn="ctr"/>
+                <a:endParaRPr lang="en-US" sz="1376">
+                  <a:solidFill>
+                    <a:srgbClr val="FDCC02"/>
+                  </a:solidFill>
+                </a:endParaRPr>
+              </a:p>
+            </p:txBody>
+          </p:sp>
+          <p:sp>
+            <p:nvSpPr>
+              <p:cNvPr id="7" name="Freeform 6">
+                <a:extLst>
+                  <a:ext uri="{FF2B5EF4-FFF2-40B4-BE49-F238E27FC236}">
+                    <a16:creationId xmlns:a16="http://schemas.microsoft.com/office/drawing/2014/main" id="{E71D52BC-6DBB-859F-DFF3-F80DF4F44517}"/>
+                  </a:ext>
+                </a:extLst>
+              </p:cNvPr>
+              <p:cNvSpPr/>
+              <p:nvPr/>
+            </p:nvSpPr>
+            <p:spPr>
+              <a:xfrm>
+                <a:off x="3160741" y="1152908"/>
+                <a:ext cx="2913604" cy="2003103"/>
+              </a:xfrm>
+              <a:custGeom>
+                <a:avLst/>
+                <a:gdLst>
+                  <a:gd name="connsiteX0" fmla="*/ 599676 w 3810708"/>
+                  <a:gd name="connsiteY0" fmla="*/ 2607103 h 2619862"/>
+                  <a:gd name="connsiteX1" fmla="*/ 1909607 w 3810708"/>
+                  <a:gd name="connsiteY1" fmla="*/ 2143524 h 2619862"/>
+                  <a:gd name="connsiteX2" fmla="*/ 3202526 w 3810708"/>
+                  <a:gd name="connsiteY2" fmla="*/ 2619862 h 2619862"/>
+                  <a:gd name="connsiteX3" fmla="*/ 3810708 w 3810708"/>
+                  <a:gd name="connsiteY3" fmla="*/ 1956391 h 2619862"/>
+                  <a:gd name="connsiteX4" fmla="*/ 3547021 w 3810708"/>
+                  <a:gd name="connsiteY4" fmla="*/ 229663 h 2619862"/>
+                  <a:gd name="connsiteX5" fmla="*/ 1841559 w 3810708"/>
+                  <a:gd name="connsiteY5" fmla="*/ 0 h 2619862"/>
+                  <a:gd name="connsiteX6" fmla="*/ 199892 w 3810708"/>
+                  <a:gd name="connsiteY6" fmla="*/ 327483 h 2619862"/>
+                  <a:gd name="connsiteX7" fmla="*/ 0 w 3810708"/>
+                  <a:gd name="connsiteY7" fmla="*/ 1956391 h 2619862"/>
+                  <a:gd name="connsiteX8" fmla="*/ 599676 w 3810708"/>
+                  <a:gd name="connsiteY8" fmla="*/ 2607103 h 2619862"/>
+                </a:gdLst>
+                <a:ahLst/>
+                <a:cxnLst>
+                  <a:cxn ang="0">
+                    <a:pos x="connsiteX0" y="connsiteY0"/>
+                  </a:cxn>
+                  <a:cxn ang="0">
+                    <a:pos x="connsiteX1" y="connsiteY1"/>
+                  </a:cxn>
+                  <a:cxn ang="0">
+                    <a:pos x="connsiteX2" y="connsiteY2"/>
+                  </a:cxn>
+                  <a:cxn ang="0">
+                    <a:pos x="connsiteX3" y="connsiteY3"/>
+                  </a:cxn>
+                  <a:cxn ang="0">
+                    <a:pos x="connsiteX4" y="connsiteY4"/>
+                  </a:cxn>
+                  <a:cxn ang="0">
+                    <a:pos x="connsiteX5" y="connsiteY5"/>
+                  </a:cxn>
+                  <a:cxn ang="0">
+                    <a:pos x="connsiteX6" y="connsiteY6"/>
+                  </a:cxn>
+                  <a:cxn ang="0">
+                    <a:pos x="connsiteX7" y="connsiteY7"/>
+                  </a:cxn>
+                  <a:cxn ang="0">
+                    <a:pos x="connsiteX8" y="connsiteY8"/>
+                  </a:cxn>
+                </a:cxnLst>
+                <a:rect l="l" t="t" r="r" b="b"/>
+                <a:pathLst>
+                  <a:path w="3810708" h="2619862">
+                    <a:moveTo>
+                      <a:pt x="599676" y="2607103"/>
+                    </a:moveTo>
+                    <a:lnTo>
+                      <a:pt x="1909607" y="2143524"/>
+                    </a:lnTo>
+                    <a:lnTo>
+                      <a:pt x="3202526" y="2619862"/>
+                    </a:lnTo>
+                    <a:lnTo>
+                      <a:pt x="3810708" y="1956391"/>
+                    </a:lnTo>
+                    <a:lnTo>
+                      <a:pt x="3547021" y="229663"/>
+                    </a:lnTo>
+                    <a:lnTo>
+                      <a:pt x="1841559" y="0"/>
+                    </a:lnTo>
+                    <a:lnTo>
+                      <a:pt x="199892" y="327483"/>
+                    </a:lnTo>
+                    <a:lnTo>
+                      <a:pt x="0" y="1956391"/>
+                    </a:lnTo>
+                    <a:lnTo>
+                      <a:pt x="599676" y="2607103"/>
+                    </a:lnTo>
+                    <a:close/>
+                  </a:path>
+                </a:pathLst>
+              </a:custGeom>
+              <a:solidFill>
+                <a:srgbClr val="DCDDDA"/>
+              </a:solidFill>
+              <a:ln>
+                <a:noFill/>
+              </a:ln>
+            </p:spPr>
+            <p:style>
+              <a:lnRef idx="2">
+                <a:schemeClr val="accent1">
+                  <a:shade val="15000"/>
+                </a:schemeClr>
+              </a:lnRef>
+              <a:fillRef idx="1">
+                <a:schemeClr val="accent1"/>
+              </a:fillRef>
+              <a:effectRef idx="0">
+                <a:schemeClr val="accent1"/>
+              </a:effectRef>
+              <a:fontRef idx="minor">
+                <a:schemeClr val="lt1"/>
+              </a:fontRef>
+            </p:style>
+            <p:txBody>
+              <a:bodyPr rtlCol="0" anchor="ctr"/>
+              <a:lstStyle/>
+              <a:p>
+                <a:pPr algn="ctr"/>
+                <a:endParaRPr lang="en-US" sz="1376"/>
+              </a:p>
+            </p:txBody>
+          </p:sp>
+          <p:sp>
+            <p:nvSpPr>
+              <p:cNvPr id="8" name="TextBox 7">
+                <a:extLst>
+                  <a:ext uri="{FF2B5EF4-FFF2-40B4-BE49-F238E27FC236}">
+                    <a16:creationId xmlns:a16="http://schemas.microsoft.com/office/drawing/2014/main" id="{2CE4C1EF-F3C0-EEAF-3F40-BB2F59EE595B}"/>
+                  </a:ext>
+                </a:extLst>
+              </p:cNvPr>
+              <p:cNvSpPr txBox="1"/>
+              <p:nvPr/>
+            </p:nvSpPr>
+            <p:spPr>
+              <a:xfrm>
+                <a:off x="2618557" y="1264654"/>
+                <a:ext cx="4200189" cy="1445460"/>
+              </a:xfrm>
+              <a:prstGeom prst="rect">
+                <a:avLst/>
+              </a:prstGeom>
+              <a:noFill/>
+            </p:spPr>
+            <p:txBody>
+              <a:bodyPr wrap="none" rtlCol="0">
+                <a:spAutoFit/>
+              </a:bodyPr>
+              <a:lstStyle/>
+              <a:p>
+                <a:r>
+                  <a:rPr lang="en-US" sz="8793">
+                    <a:latin typeface="Kefa" panose="02000506000000020004" pitchFamily="2" charset="77"/>
+                    <a:cs typeface="Apple Chancery" panose="03020702040506060504" pitchFamily="66" charset="-79"/>
+                  </a:rPr>
+                  <a:t>xApRES</a:t>
+                </a:r>
+              </a:p>
+            </p:txBody>
+          </p:sp>
+        </p:grpSp>
+        <p:sp>
+          <p:nvSpPr>
+            <p:cNvPr id="2" name="Freeform 1">
+              <a:extLst>
+                <a:ext uri="{FF2B5EF4-FFF2-40B4-BE49-F238E27FC236}">
+                  <a16:creationId xmlns:a16="http://schemas.microsoft.com/office/drawing/2014/main" id="{BCBFFC7C-0A3A-23B4-14C8-C36AEABB1373}"/>
+                </a:ext>
+              </a:extLst>
+            </p:cNvPr>
+            <p:cNvSpPr/>
+            <p:nvPr/>
+          </p:nvSpPr>
+          <p:spPr>
+            <a:xfrm>
+              <a:off x="2444262" y="3862754"/>
+              <a:ext cx="2022230" cy="1629508"/>
+            </a:xfrm>
+            <a:custGeom>
+              <a:avLst/>
+              <a:gdLst>
+                <a:gd name="connsiteX0" fmla="*/ 240323 w 2022230"/>
+                <a:gd name="connsiteY0" fmla="*/ 82061 h 1629508"/>
+                <a:gd name="connsiteX1" fmla="*/ 2022230 w 2022230"/>
+                <a:gd name="connsiteY1" fmla="*/ 732692 h 1629508"/>
+                <a:gd name="connsiteX2" fmla="*/ 2010507 w 2022230"/>
+                <a:gd name="connsiteY2" fmla="*/ 1629508 h 1629508"/>
+                <a:gd name="connsiteX3" fmla="*/ 1184030 w 2022230"/>
+                <a:gd name="connsiteY3" fmla="*/ 1295400 h 1629508"/>
+                <a:gd name="connsiteX4" fmla="*/ 849923 w 2022230"/>
+                <a:gd name="connsiteY4" fmla="*/ 1312984 h 1629508"/>
+                <a:gd name="connsiteX5" fmla="*/ 574430 w 2022230"/>
+                <a:gd name="connsiteY5" fmla="*/ 1002323 h 1629508"/>
+                <a:gd name="connsiteX6" fmla="*/ 222738 w 2022230"/>
+                <a:gd name="connsiteY6" fmla="*/ 885092 h 1629508"/>
+                <a:gd name="connsiteX7" fmla="*/ 0 w 2022230"/>
+                <a:gd name="connsiteY7" fmla="*/ 0 h 1629508"/>
+                <a:gd name="connsiteX8" fmla="*/ 240323 w 2022230"/>
+                <a:gd name="connsiteY8" fmla="*/ 82061 h 1629508"/>
+              </a:gdLst>
+              <a:ahLst/>
+              <a:cxnLst>
+                <a:cxn ang="0">
+                  <a:pos x="connsiteX0" y="connsiteY0"/>
+                </a:cxn>
+                <a:cxn ang="0">
+                  <a:pos x="connsiteX1" y="connsiteY1"/>
+                </a:cxn>
+                <a:cxn ang="0">
+                  <a:pos x="connsiteX2" y="connsiteY2"/>
+                </a:cxn>
+                <a:cxn ang="0">
+                  <a:pos x="connsiteX3" y="connsiteY3"/>
+                </a:cxn>
+                <a:cxn ang="0">
+                  <a:pos x="connsiteX4" y="connsiteY4"/>
+                </a:cxn>
+                <a:cxn ang="0">
+                  <a:pos x="connsiteX5" y="connsiteY5"/>
+                </a:cxn>
+                <a:cxn ang="0">
+                  <a:pos x="connsiteX6" y="connsiteY6"/>
+                </a:cxn>
+                <a:cxn ang="0">
+                  <a:pos x="connsiteX7" y="connsiteY7"/>
+                </a:cxn>
+                <a:cxn ang="0">
+                  <a:pos x="connsiteX8" y="connsiteY8"/>
+                </a:cxn>
+              </a:cxnLst>
+              <a:rect l="l" t="t" r="r" b="b"/>
+              <a:pathLst>
+                <a:path w="2022230" h="1629508">
+                  <a:moveTo>
+                    <a:pt x="240323" y="82061"/>
+                  </a:moveTo>
+                  <a:lnTo>
+                    <a:pt x="2022230" y="732692"/>
+                  </a:lnTo>
+                  <a:lnTo>
+                    <a:pt x="2010507" y="1629508"/>
+                  </a:lnTo>
+                  <a:lnTo>
+                    <a:pt x="1184030" y="1295400"/>
+                  </a:lnTo>
+                  <a:lnTo>
+                    <a:pt x="849923" y="1312984"/>
+                  </a:lnTo>
+                  <a:lnTo>
+                    <a:pt x="574430" y="1002323"/>
+                  </a:lnTo>
+                  <a:lnTo>
+                    <a:pt x="222738" y="885092"/>
+                  </a:lnTo>
+                  <a:lnTo>
+                    <a:pt x="0" y="0"/>
+                  </a:lnTo>
+                  <a:lnTo>
+                    <a:pt x="240323" y="82061"/>
+                  </a:lnTo>
+                  <a:close/>
+                </a:path>
+              </a:pathLst>
+            </a:custGeom>
+            <a:solidFill>
+              <a:srgbClr val="FDFFFF"/>
+            </a:solidFill>
+            <a:ln>
+              <a:noFill/>
+            </a:ln>
+          </p:spPr>
+          <p:style>
+            <a:lnRef idx="2">
+              <a:schemeClr val="accent1">
+                <a:shade val="15000"/>
+              </a:schemeClr>
+            </a:lnRef>
+            <a:fillRef idx="1">
+              <a:schemeClr val="accent1"/>
+            </a:fillRef>
+            <a:effectRef idx="0">
+              <a:schemeClr val="accent1"/>
+            </a:effectRef>
+            <a:fontRef idx="minor">
+              <a:schemeClr val="lt1"/>
+            </a:fontRef>
+          </p:style>
+          <p:txBody>
+            <a:bodyPr rtlCol="0" anchor="ctr"/>
+            <a:lstStyle/>
+            <a:p>
+              <a:pPr algn="ctr"/>
+              <a:endParaRPr lang="en-US"/>
+            </a:p>
+          </p:txBody>
+        </p:sp>
+        <p:sp>
+          <p:nvSpPr>
+            <p:cNvPr id="3" name="Freeform 2">
+              <a:extLst>
+                <a:ext uri="{FF2B5EF4-FFF2-40B4-BE49-F238E27FC236}">
+                  <a16:creationId xmlns:a16="http://schemas.microsoft.com/office/drawing/2014/main" id="{1EDD42A5-F819-8AD4-D340-F6EA3B6CAC87}"/>
+                </a:ext>
+              </a:extLst>
+            </p:cNvPr>
+            <p:cNvSpPr/>
+            <p:nvPr/>
+          </p:nvSpPr>
+          <p:spPr>
+            <a:xfrm>
+              <a:off x="4583723" y="3809999"/>
+              <a:ext cx="2192215" cy="1318846"/>
+            </a:xfrm>
+            <a:custGeom>
+              <a:avLst/>
+              <a:gdLst>
+                <a:gd name="connsiteX0" fmla="*/ 0 w 2192215"/>
+                <a:gd name="connsiteY0" fmla="*/ 797169 h 1318846"/>
+                <a:gd name="connsiteX1" fmla="*/ 709246 w 2192215"/>
+                <a:gd name="connsiteY1" fmla="*/ 527539 h 1318846"/>
+                <a:gd name="connsiteX2" fmla="*/ 2180492 w 2192215"/>
+                <a:gd name="connsiteY2" fmla="*/ 0 h 1318846"/>
+                <a:gd name="connsiteX3" fmla="*/ 2192215 w 2192215"/>
+                <a:gd name="connsiteY3" fmla="*/ 984739 h 1318846"/>
+                <a:gd name="connsiteX4" fmla="*/ 931985 w 2192215"/>
+                <a:gd name="connsiteY4" fmla="*/ 1318846 h 1318846"/>
+                <a:gd name="connsiteX5" fmla="*/ 0 w 2192215"/>
+                <a:gd name="connsiteY5" fmla="*/ 797169 h 1318846"/>
+              </a:gdLst>
+              <a:ahLst/>
+              <a:cxnLst>
+                <a:cxn ang="0">
+                  <a:pos x="connsiteX0" y="connsiteY0"/>
+                </a:cxn>
+                <a:cxn ang="0">
+                  <a:pos x="connsiteX1" y="connsiteY1"/>
+                </a:cxn>
+                <a:cxn ang="0">
+                  <a:pos x="connsiteX2" y="connsiteY2"/>
+                </a:cxn>
+                <a:cxn ang="0">
+                  <a:pos x="connsiteX3" y="connsiteY3"/>
+                </a:cxn>
+                <a:cxn ang="0">
+                  <a:pos x="connsiteX4" y="connsiteY4"/>
+                </a:cxn>
+                <a:cxn ang="0">
+                  <a:pos x="connsiteX5" y="connsiteY5"/>
+                </a:cxn>
+              </a:cxnLst>
+              <a:rect l="l" t="t" r="r" b="b"/>
+              <a:pathLst>
+                <a:path w="2192215" h="1318846">
+                  <a:moveTo>
+                    <a:pt x="0" y="797169"/>
+                  </a:moveTo>
+                  <a:lnTo>
+                    <a:pt x="709246" y="527539"/>
+                  </a:lnTo>
+                  <a:lnTo>
+                    <a:pt x="2180492" y="0"/>
+                  </a:lnTo>
+                  <a:lnTo>
+                    <a:pt x="2192215" y="984739"/>
+                  </a:lnTo>
+                  <a:lnTo>
+                    <a:pt x="931985" y="1318846"/>
+                  </a:lnTo>
+                  <a:lnTo>
+                    <a:pt x="0" y="797169"/>
+                  </a:lnTo>
+                  <a:close/>
+                </a:path>
+              </a:pathLst>
+            </a:custGeom>
+            <a:solidFill>
+              <a:srgbClr val="CFE2E4"/>
+            </a:solidFill>
+            <a:ln>
+              <a:noFill/>
+            </a:ln>
+          </p:spPr>
+          <p:style>
+            <a:lnRef idx="2">
+              <a:schemeClr val="accent1">
+                <a:shade val="15000"/>
+              </a:schemeClr>
+            </a:lnRef>
+            <a:fillRef idx="1">
+              <a:schemeClr val="accent1"/>
+            </a:fillRef>
+            <a:effectRef idx="0">
+              <a:schemeClr val="accent1"/>
+            </a:effectRef>
+            <a:fontRef idx="minor">
+              <a:schemeClr val="lt1"/>
+            </a:fontRef>
+          </p:style>
+          <p:txBody>
+            <a:bodyPr rtlCol="0" anchor="ctr"/>
+            <a:lstStyle/>
+            <a:p>
+              <a:pPr algn="ctr"/>
+              <a:endParaRPr lang="en-US"/>
+            </a:p>
+          </p:txBody>
+        </p:sp>
+      </p:grpSp>
+    </p:spTree>
+    <p:extLst>
+      <p:ext uri="{BB962C8B-B14F-4D97-AF65-F5344CB8AC3E}">
+        <p14:creationId xmlns:p14="http://schemas.microsoft.com/office/powerpoint/2010/main" val="3663914622"/>
+      </p:ext>
+    </p:extLst>
+  </p:cSld>
+  <p:clrMapOvr>
+    <a:masterClrMapping/>
+  </p:clrMapOvr>
+</p:sld>
+</file>
+
+<file path=ppt/slides/slide3.xml><?xml version="1.0" encoding="utf-8"?>
+<p:sld xmlns:a="http://schemas.openxmlformats.org/drawingml/2006/main" xmlns:r="http://schemas.openxmlformats.org/officeDocument/2006/relationships" xmlns:p="http://schemas.openxmlformats.org/presentationml/2006/main">
+  <p:cSld>
+    <p:spTree>
+      <p:nvGrpSpPr>
+        <p:cNvPr id="1" name=""/>
+        <p:cNvGrpSpPr/>
+        <p:nvPr/>
+      </p:nvGrpSpPr>
+      <p:grpSpPr>
+        <a:xfrm>
+          <a:off x="0" y="0"/>
+          <a:ext cx="0" cy="0"/>
+          <a:chOff x="0" y="0"/>
+          <a:chExt cx="0" cy="0"/>
+        </a:xfrm>
+      </p:grpSpPr>
+      <p:sp>
+        <p:nvSpPr>
+          <p:cNvPr id="5" name="Rectangle 4">
+            <a:extLst>
+              <a:ext uri="{FF2B5EF4-FFF2-40B4-BE49-F238E27FC236}">
+                <a16:creationId xmlns:a16="http://schemas.microsoft.com/office/drawing/2014/main" id="{C4228863-DE30-30B6-AA24-E0FCE85B499E}"/>
               </a:ext>
             </a:extLst>
           </p:cNvPr>
@@ -3341,102 +4003,18 @@
         </p:nvSpPr>
         <p:spPr>
           <a:xfrm>
-            <a:off x="4980290" y="2411464"/>
-            <a:ext cx="2135018" cy="782556"/>
+            <a:off x="3200400" y="1664677"/>
+            <a:ext cx="2584938" cy="2416435"/>
           </a:xfrm>
-          <a:custGeom>
+          <a:prstGeom prst="rect">
             <a:avLst/>
-            <a:gdLst>
-              <a:gd name="connsiteX0" fmla="*/ 561399 w 2135018"/>
-              <a:gd name="connsiteY0" fmla="*/ 191386 h 782556"/>
-              <a:gd name="connsiteX1" fmla="*/ 1050497 w 2135018"/>
-              <a:gd name="connsiteY1" fmla="*/ 0 h 782556"/>
-              <a:gd name="connsiteX2" fmla="*/ 2135018 w 2135018"/>
-              <a:gd name="connsiteY2" fmla="*/ 395531 h 782556"/>
-              <a:gd name="connsiteX3" fmla="*/ 1071762 w 2135018"/>
-              <a:gd name="connsiteY3" fmla="*/ 782556 h 782556"/>
-              <a:gd name="connsiteX4" fmla="*/ 0 w 2135018"/>
-              <a:gd name="connsiteY4" fmla="*/ 391278 h 782556"/>
-              <a:gd name="connsiteX5" fmla="*/ 0 w 2135018"/>
-              <a:gd name="connsiteY5" fmla="*/ 391278 h 782556"/>
-              <a:gd name="connsiteX0" fmla="*/ 12759 w 2135018"/>
-              <a:gd name="connsiteY0" fmla="*/ 382772 h 782556"/>
-              <a:gd name="connsiteX1" fmla="*/ 1050497 w 2135018"/>
-              <a:gd name="connsiteY1" fmla="*/ 0 h 782556"/>
-              <a:gd name="connsiteX2" fmla="*/ 2135018 w 2135018"/>
-              <a:gd name="connsiteY2" fmla="*/ 395531 h 782556"/>
-              <a:gd name="connsiteX3" fmla="*/ 1071762 w 2135018"/>
-              <a:gd name="connsiteY3" fmla="*/ 782556 h 782556"/>
-              <a:gd name="connsiteX4" fmla="*/ 0 w 2135018"/>
-              <a:gd name="connsiteY4" fmla="*/ 391278 h 782556"/>
-              <a:gd name="connsiteX5" fmla="*/ 0 w 2135018"/>
-              <a:gd name="connsiteY5" fmla="*/ 391278 h 782556"/>
-              <a:gd name="connsiteX0" fmla="*/ 12759 w 2135018"/>
-              <a:gd name="connsiteY0" fmla="*/ 382772 h 782556"/>
-              <a:gd name="connsiteX1" fmla="*/ 1050497 w 2135018"/>
-              <a:gd name="connsiteY1" fmla="*/ 0 h 782556"/>
-              <a:gd name="connsiteX2" fmla="*/ 2135018 w 2135018"/>
-              <a:gd name="connsiteY2" fmla="*/ 395531 h 782556"/>
-              <a:gd name="connsiteX3" fmla="*/ 1071762 w 2135018"/>
-              <a:gd name="connsiteY3" fmla="*/ 782556 h 782556"/>
-              <a:gd name="connsiteX4" fmla="*/ 0 w 2135018"/>
-              <a:gd name="connsiteY4" fmla="*/ 391278 h 782556"/>
-              <a:gd name="connsiteX5" fmla="*/ 0 w 2135018"/>
-              <a:gd name="connsiteY5" fmla="*/ 391278 h 782556"/>
-            </a:gdLst>
-            <a:ahLst/>
-            <a:cxnLst>
-              <a:cxn ang="0">
-                <a:pos x="connsiteX0" y="connsiteY0"/>
-              </a:cxn>
-              <a:cxn ang="0">
-                <a:pos x="connsiteX1" y="connsiteY1"/>
-              </a:cxn>
-              <a:cxn ang="0">
-                <a:pos x="connsiteX2" y="connsiteY2"/>
-              </a:cxn>
-              <a:cxn ang="0">
-                <a:pos x="connsiteX3" y="connsiteY3"/>
-              </a:cxn>
-              <a:cxn ang="0">
-                <a:pos x="connsiteX4" y="connsiteY4"/>
-              </a:cxn>
-              <a:cxn ang="0">
-                <a:pos x="connsiteX5" y="connsiteY5"/>
-              </a:cxn>
-            </a:cxnLst>
-            <a:rect l="l" t="t" r="r" b="b"/>
-            <a:pathLst>
-              <a:path w="2135018" h="782556">
-                <a:moveTo>
-                  <a:pt x="12759" y="382772"/>
-                </a:moveTo>
-                <a:cubicBezTo>
-                  <a:pt x="31189" y="382771"/>
-                  <a:pt x="704584" y="127591"/>
-                  <a:pt x="1050497" y="0"/>
-                </a:cubicBezTo>
-                <a:lnTo>
-                  <a:pt x="2135018" y="395531"/>
-                </a:lnTo>
-                <a:lnTo>
-                  <a:pt x="1071762" y="782556"/>
-                </a:lnTo>
-                <a:lnTo>
-                  <a:pt x="0" y="391278"/>
-                </a:lnTo>
-                <a:lnTo>
-                  <a:pt x="0" y="391278"/>
-                </a:lnTo>
-              </a:path>
-            </a:pathLst>
-          </a:custGeom>
+          </a:prstGeom>
           <a:solidFill>
-            <a:srgbClr val="FDCC02"/>
+            <a:srgbClr val="DDDFE1"/>
           </a:solidFill>
           <a:ln>
             <a:solidFill>
-              <a:srgbClr val="FDCC02"/>
+              <a:schemeClr val="tx1"/>
             </a:solidFill>
           </a:ln>
         </p:spPr>
@@ -3461,20 +4039,16 @@
           <a:lstStyle/>
           <a:p>
             <a:pPr algn="ctr"/>
-            <a:endParaRPr lang="en-US">
-              <a:solidFill>
-                <a:srgbClr val="FDCC02"/>
-              </a:solidFill>
-            </a:endParaRPr>
-          </a:p>
-        </p:txBody>
-      </p:sp>
-      <p:sp>
-        <p:nvSpPr>
-          <p:cNvPr id="7" name="Freeform 6">
+            <a:endParaRPr lang="en-US" sz="1600"/>
+          </a:p>
+        </p:txBody>
+      </p:sp>
+      <p:sp>
+        <p:nvSpPr>
+          <p:cNvPr id="4" name="Rectangle 3">
             <a:extLst>
               <a:ext uri="{FF2B5EF4-FFF2-40B4-BE49-F238E27FC236}">
-                <a16:creationId xmlns:a16="http://schemas.microsoft.com/office/drawing/2014/main" id="{66038393-F867-9FEA-82FB-17C4F368C10C}"/>
+                <a16:creationId xmlns:a16="http://schemas.microsoft.com/office/drawing/2014/main" id="{EDABE274-2521-FD03-3253-CDC85F025EA0}"/>
               </a:ext>
             </a:extLst>
           </p:cNvPr>
@@ -3483,100 +4057,70 @@
         </p:nvSpPr>
         <p:spPr>
           <a:xfrm>
-            <a:off x="4133939" y="153109"/>
-            <a:ext cx="3810708" cy="2619862"/>
+            <a:off x="3944479" y="2527681"/>
+            <a:ext cx="1142867" cy="606392"/>
           </a:xfrm>
-          <a:custGeom>
+          <a:prstGeom prst="rect">
             <a:avLst/>
-            <a:gdLst>
-              <a:gd name="connsiteX0" fmla="*/ 599676 w 3810708"/>
-              <a:gd name="connsiteY0" fmla="*/ 2607103 h 2619862"/>
-              <a:gd name="connsiteX1" fmla="*/ 1909607 w 3810708"/>
-              <a:gd name="connsiteY1" fmla="*/ 2143524 h 2619862"/>
-              <a:gd name="connsiteX2" fmla="*/ 3202526 w 3810708"/>
-              <a:gd name="connsiteY2" fmla="*/ 2619862 h 2619862"/>
-              <a:gd name="connsiteX3" fmla="*/ 3810708 w 3810708"/>
-              <a:gd name="connsiteY3" fmla="*/ 1956391 h 2619862"/>
-              <a:gd name="connsiteX4" fmla="*/ 3547021 w 3810708"/>
-              <a:gd name="connsiteY4" fmla="*/ 229663 h 2619862"/>
-              <a:gd name="connsiteX5" fmla="*/ 1841559 w 3810708"/>
-              <a:gd name="connsiteY5" fmla="*/ 0 h 2619862"/>
-              <a:gd name="connsiteX6" fmla="*/ 199892 w 3810708"/>
-              <a:gd name="connsiteY6" fmla="*/ 327483 h 2619862"/>
-              <a:gd name="connsiteX7" fmla="*/ 0 w 3810708"/>
-              <a:gd name="connsiteY7" fmla="*/ 1956391 h 2619862"/>
-              <a:gd name="connsiteX8" fmla="*/ 599676 w 3810708"/>
-              <a:gd name="connsiteY8" fmla="*/ 2607103 h 2619862"/>
-            </a:gdLst>
-            <a:ahLst/>
-            <a:cxnLst>
-              <a:cxn ang="0">
-                <a:pos x="connsiteX0" y="connsiteY0"/>
-              </a:cxn>
-              <a:cxn ang="0">
-                <a:pos x="connsiteX1" y="connsiteY1"/>
-              </a:cxn>
-              <a:cxn ang="0">
-                <a:pos x="connsiteX2" y="connsiteY2"/>
-              </a:cxn>
-              <a:cxn ang="0">
-                <a:pos x="connsiteX3" y="connsiteY3"/>
-              </a:cxn>
-              <a:cxn ang="0">
-                <a:pos x="connsiteX4" y="connsiteY4"/>
-              </a:cxn>
-              <a:cxn ang="0">
-                <a:pos x="connsiteX5" y="connsiteY5"/>
-              </a:cxn>
-              <a:cxn ang="0">
-                <a:pos x="connsiteX6" y="connsiteY6"/>
-              </a:cxn>
-              <a:cxn ang="0">
-                <a:pos x="connsiteX7" y="connsiteY7"/>
-              </a:cxn>
-              <a:cxn ang="0">
-                <a:pos x="connsiteX8" y="connsiteY8"/>
-              </a:cxn>
-            </a:cxnLst>
-            <a:rect l="l" t="t" r="r" b="b"/>
-            <a:pathLst>
-              <a:path w="3810708" h="2619862">
-                <a:moveTo>
-                  <a:pt x="599676" y="2607103"/>
-                </a:moveTo>
-                <a:lnTo>
-                  <a:pt x="1909607" y="2143524"/>
-                </a:lnTo>
-                <a:lnTo>
-                  <a:pt x="3202526" y="2619862"/>
-                </a:lnTo>
-                <a:lnTo>
-                  <a:pt x="3810708" y="1956391"/>
-                </a:lnTo>
-                <a:lnTo>
-                  <a:pt x="3547021" y="229663"/>
-                </a:lnTo>
-                <a:lnTo>
-                  <a:pt x="1841559" y="0"/>
-                </a:lnTo>
-                <a:lnTo>
-                  <a:pt x="199892" y="327483"/>
-                </a:lnTo>
-                <a:lnTo>
-                  <a:pt x="0" y="1956391"/>
-                </a:lnTo>
-                <a:lnTo>
-                  <a:pt x="599676" y="2607103"/>
-                </a:lnTo>
-                <a:close/>
-              </a:path>
-            </a:pathLst>
-          </a:custGeom>
+          </a:prstGeom>
           <a:solidFill>
-            <a:srgbClr val="DCDDDA"/>
+            <a:srgbClr val="FDCC02"/>
+          </a:solidFill>
+        </p:spPr>
+        <p:style>
+          <a:lnRef idx="2">
+            <a:schemeClr val="accent1">
+              <a:shade val="15000"/>
+            </a:schemeClr>
+          </a:lnRef>
+          <a:fillRef idx="1">
+            <a:schemeClr val="accent1"/>
+          </a:fillRef>
+          <a:effectRef idx="0">
+            <a:schemeClr val="accent1"/>
+          </a:effectRef>
+          <a:fontRef idx="minor">
+            <a:schemeClr val="lt1"/>
+          </a:fontRef>
+        </p:style>
+        <p:txBody>
+          <a:bodyPr rtlCol="0" anchor="ctr"/>
+          <a:lstStyle/>
+          <a:p>
+            <a:pPr algn="ctr"/>
+            <a:endParaRPr lang="en-US"/>
+          </a:p>
+        </p:txBody>
+      </p:sp>
+      <p:sp>
+        <p:nvSpPr>
+          <p:cNvPr id="6" name="Rectangle 5">
+            <a:extLst>
+              <a:ext uri="{FF2B5EF4-FFF2-40B4-BE49-F238E27FC236}">
+                <a16:creationId xmlns:a16="http://schemas.microsoft.com/office/drawing/2014/main" id="{3298D6FF-E540-B4AA-EC73-C4109FCBCAD6}"/>
+              </a:ext>
+            </a:extLst>
+          </p:cNvPr>
+          <p:cNvSpPr/>
+          <p:nvPr/>
+        </p:nvSpPr>
+        <p:spPr>
+          <a:xfrm>
+            <a:off x="3376247" y="3129875"/>
+            <a:ext cx="2266392" cy="873556"/>
+          </a:xfrm>
+          <a:prstGeom prst="rect">
+            <a:avLst/>
+          </a:prstGeom>
+          <a:solidFill>
+            <a:schemeClr val="bg1">
+              <a:lumMod val="95000"/>
+            </a:schemeClr>
           </a:solidFill>
           <a:ln>
-            <a:noFill/>
+            <a:solidFill>
+              <a:schemeClr val="tx1"/>
+            </a:solidFill>
           </a:ln>
         </p:spPr>
         <p:style>
@@ -3606,10 +4150,10 @@
       </p:sp>
       <p:sp>
         <p:nvSpPr>
-          <p:cNvPr id="8" name="TextBox 7">
+          <p:cNvPr id="7" name="TextBox 6">
             <a:extLst>
               <a:ext uri="{FF2B5EF4-FFF2-40B4-BE49-F238E27FC236}">
-                <a16:creationId xmlns:a16="http://schemas.microsoft.com/office/drawing/2014/main" id="{3DEBEA24-31E7-2937-E58E-6C995F8D61F6}"/>
+                <a16:creationId xmlns:a16="http://schemas.microsoft.com/office/drawing/2014/main" id="{5AE21119-EE5C-D220-B717-F66AA1DD2B5E}"/>
               </a:ext>
             </a:extLst>
           </p:cNvPr>
@@ -3618,8 +4162,8 @@
         </p:nvSpPr>
         <p:spPr>
           <a:xfrm>
-            <a:off x="3321241" y="616793"/>
-            <a:ext cx="5436104" cy="1862048"/>
+            <a:off x="3436082" y="1733129"/>
+            <a:ext cx="2194832" cy="769441"/>
           </a:xfrm>
           <a:prstGeom prst="rect">
             <a:avLst/>
@@ -3633,7 +4177,7 @@
           <a:lstStyle/>
           <a:p>
             <a:r>
-              <a:rPr lang="en-US" sz="11500">
+              <a:rPr lang="en-US" sz="4400">
                 <a:latin typeface="Kefa" panose="02000506000000020004" pitchFamily="2" charset="77"/>
                 <a:cs typeface="Apple Chancery" panose="03020702040506060504" pitchFamily="66" charset="-79"/>
               </a:rPr>
@@ -3642,10 +4186,295 @@
           </a:p>
         </p:txBody>
       </p:sp>
+      <p:pic>
+        <p:nvPicPr>
+          <p:cNvPr id="2054" name="Picture 6" descr="Xarray: N-D labeled arrays and datasets in Python">
+            <a:extLst>
+              <a:ext uri="{FF2B5EF4-FFF2-40B4-BE49-F238E27FC236}">
+                <a16:creationId xmlns:a16="http://schemas.microsoft.com/office/drawing/2014/main" id="{A9423A6A-ED34-FD96-FAE7-250C8C205562}"/>
+              </a:ext>
+            </a:extLst>
+          </p:cNvPr>
+          <p:cNvPicPr>
+            <a:picLocks noChangeAspect="1" noChangeArrowheads="1"/>
+          </p:cNvPicPr>
+          <p:nvPr/>
+        </p:nvPicPr>
+        <p:blipFill rotWithShape="1">
+          <a:blip r:embed="rId2">
+            <a:extLst>
+              <a:ext uri="{28A0092B-C50C-407E-A947-70E740481C1C}">
+                <a14:useLocalDpi xmlns:a14="http://schemas.microsoft.com/office/drawing/2010/main" val="0"/>
+              </a:ext>
+            </a:extLst>
+          </a:blip>
+          <a:srcRect t="10888" r="25047"/>
+          <a:stretch/>
+        </p:blipFill>
+        <p:spPr bwMode="auto">
+          <a:xfrm>
+            <a:off x="4157749" y="2646210"/>
+            <a:ext cx="703388" cy="249227"/>
+          </a:xfrm>
+          <a:prstGeom prst="rect">
+            <a:avLst/>
+          </a:prstGeom>
+          <a:noFill/>
+          <a:extLst>
+            <a:ext uri="{909E8E84-426E-40DD-AFC4-6F175D3DCCD1}">
+              <a14:hiddenFill xmlns:a14="http://schemas.microsoft.com/office/drawing/2010/main">
+                <a:solidFill>
+                  <a:srgbClr val="FFFFFF"/>
+                </a:solidFill>
+              </a14:hiddenFill>
+            </a:ext>
+          </a:extLst>
+        </p:spPr>
+      </p:pic>
     </p:spTree>
     <p:extLst>
       <p:ext uri="{BB962C8B-B14F-4D97-AF65-F5344CB8AC3E}">
-        <p14:creationId xmlns:p14="http://schemas.microsoft.com/office/powerpoint/2010/main" val="28669324"/>
+        <p14:creationId xmlns:p14="http://schemas.microsoft.com/office/powerpoint/2010/main" val="628526431"/>
+      </p:ext>
+    </p:extLst>
+  </p:cSld>
+  <p:clrMapOvr>
+    <a:masterClrMapping/>
+  </p:clrMapOvr>
+</p:sld>
+</file>
+
+<file path=ppt/slides/slide4.xml><?xml version="1.0" encoding="utf-8"?>
+<p:sld xmlns:a="http://schemas.openxmlformats.org/drawingml/2006/main" xmlns:r="http://schemas.openxmlformats.org/officeDocument/2006/relationships" xmlns:p="http://schemas.openxmlformats.org/presentationml/2006/main">
+  <p:cSld>
+    <p:spTree>
+      <p:nvGrpSpPr>
+        <p:cNvPr id="1" name=""/>
+        <p:cNvGrpSpPr/>
+        <p:nvPr/>
+      </p:nvGrpSpPr>
+      <p:grpSpPr>
+        <a:xfrm>
+          <a:off x="0" y="0"/>
+          <a:ext cx="0" cy="0"/>
+          <a:chOff x="0" y="0"/>
+          <a:chExt cx="0" cy="0"/>
+        </a:xfrm>
+      </p:grpSpPr>
+      <mc:AlternateContent xmlns:mc="http://schemas.openxmlformats.org/markup-compatibility/2006">
+        <mc:Choice xmlns:am3d="http://schemas.microsoft.com/office/drawing/2017/model3d" Requires="am3d">
+          <p:graphicFrame>
+            <p:nvGraphicFramePr>
+              <p:cNvPr id="7" name="3D Model 6" descr="Light Gray Cuboid">
+                <a:extLst>
+                  <a:ext uri="{FF2B5EF4-FFF2-40B4-BE49-F238E27FC236}">
+                    <a16:creationId xmlns:a16="http://schemas.microsoft.com/office/drawing/2014/main" id="{B0B2BB34-580A-D4BA-6F7F-8C21E55DBD3F}"/>
+                  </a:ext>
+                </a:extLst>
+              </p:cNvPr>
+              <p:cNvGraphicFramePr>
+                <a:graphicFrameLocks noChangeAspect="1"/>
+              </p:cNvGraphicFramePr>
+              <p:nvPr>
+                <p:extLst>
+                  <p:ext uri="{D42A27DB-BD31-4B8C-83A1-F6EECF244321}">
+                    <p14:modId xmlns:p14="http://schemas.microsoft.com/office/powerpoint/2010/main" val="2350555909"/>
+                  </p:ext>
+                </p:extLst>
+              </p:nvPr>
+            </p:nvGraphicFramePr>
+            <p:xfrm>
+              <a:off x="1644587" y="950196"/>
+              <a:ext cx="4008011" cy="3341890"/>
+            </p:xfrm>
+            <a:graphic>
+              <a:graphicData uri="http://schemas.microsoft.com/office/drawing/2017/model3d">
+                <am3d:model3d r:embed="rId2">
+                  <am3d:spPr>
+                    <a:xfrm>
+                      <a:off x="0" y="0"/>
+                      <a:ext cx="4008011" cy="3341890"/>
+                    </a:xfrm>
+                    <a:prstGeom prst="rect">
+                      <a:avLst/>
+                    </a:prstGeom>
+                    <a:ln w="31750">
+                      <a:noFill/>
+                    </a:ln>
+                  </am3d:spPr>
+                  <am3d:camera>
+                    <am3d:pos x="0" y="0" z="57664451"/>
+                    <am3d:up dx="0" dy="36000000" dz="0"/>
+                    <am3d:lookAt x="0" y="0" z="0"/>
+                    <am3d:perspective fov="2700000"/>
+                  </am3d:camera>
+                  <am3d:trans>
+                    <am3d:meterPerModelUnit n="4361393" d="1000000"/>
+                    <am3d:preTrans dx="0" dy="-6493603" dz="0"/>
+                    <am3d:scale>
+                      <am3d:sx n="1000000" d="1000000"/>
+                      <am3d:sy n="1000000" d="1000000"/>
+                      <am3d:sz n="1000000" d="1000000"/>
+                    </am3d:scale>
+                    <am3d:rot ax="2508942" ay="2995949" az="2063775"/>
+                    <am3d:postTrans dx="0" dy="0" dz="0"/>
+                  </am3d:trans>
+                  <am3d:raster rName="Office3DRenderer" rVer="16.0.8326">
+                    <am3d:blip r:embed="rId3"/>
+                  </am3d:raster>
+                  <am3d:objViewport viewportSz="4302487"/>
+                  <am3d:ambientLight>
+                    <am3d:clr>
+                      <a:scrgbClr r="50000" g="50000" b="50000"/>
+                    </am3d:clr>
+                    <am3d:illuminance n="500000" d="1000000"/>
+                  </am3d:ambientLight>
+                  <am3d:ptLight rad="0">
+                    <am3d:clr>
+                      <a:scrgbClr r="100000" g="75000" b="50000"/>
+                    </am3d:clr>
+                    <am3d:intensity n="9765625" d="1000000"/>
+                    <am3d:pos x="21959998" y="70920001" z="16344003"/>
+                  </am3d:ptLight>
+                  <am3d:ptLight rad="0">
+                    <am3d:clr>
+                      <a:scrgbClr r="40000" g="60000" b="95000"/>
+                    </am3d:clr>
+                    <am3d:intensity n="12250000" d="1000000"/>
+                    <am3d:pos x="-37964106" y="51130435" z="57631972"/>
+                  </am3d:ptLight>
+                  <am3d:ptLight rad="0">
+                    <am3d:clr>
+                      <a:scrgbClr r="86837" g="72700" b="100000"/>
+                    </am3d:clr>
+                    <am3d:intensity n="3125000" d="1000000"/>
+                    <am3d:pos x="-37739122" y="58056624" z="-34769649"/>
+                  </am3d:ptLight>
+                </am3d:model3d>
+              </a:graphicData>
+            </a:graphic>
+          </p:graphicFrame>
+        </mc:Choice>
+        <mc:Fallback>
+          <p:pic>
+            <p:nvPicPr>
+              <p:cNvPr id="7" name="3D Model 6" descr="Light Gray Cuboid">
+                <a:extLst>
+                  <a:ext uri="{FF2B5EF4-FFF2-40B4-BE49-F238E27FC236}">
+                    <a16:creationId xmlns:a16="http://schemas.microsoft.com/office/drawing/2014/main" id="{B0B2BB34-580A-D4BA-6F7F-8C21E55DBD3F}"/>
+                  </a:ext>
+                </a:extLst>
+              </p:cNvPr>
+              <p:cNvPicPr>
+                <a:picLocks noGrp="1" noRot="1" noChangeAspect="1" noMove="1" noResize="1" noEditPoints="1" noAdjustHandles="1" noChangeArrowheads="1" noChangeShapeType="1" noCrop="1"/>
+              </p:cNvPicPr>
+              <p:nvPr/>
+            </p:nvPicPr>
+            <p:blipFill>
+              <a:blip r:embed="rId3"/>
+              <a:stretch>
+                <a:fillRect/>
+              </a:stretch>
+            </p:blipFill>
+            <p:spPr>
+              <a:xfrm>
+                <a:off x="1644587" y="950196"/>
+                <a:ext cx="4008011" cy="3341890"/>
+              </a:xfrm>
+              <a:prstGeom prst="rect">
+                <a:avLst/>
+              </a:prstGeom>
+              <a:ln w="31750">
+                <a:noFill/>
+              </a:ln>
+            </p:spPr>
+          </p:pic>
+        </mc:Fallback>
+      </mc:AlternateContent>
+    </p:spTree>
+    <p:extLst>
+      <p:ext uri="{BB962C8B-B14F-4D97-AF65-F5344CB8AC3E}">
+        <p14:creationId xmlns:p14="http://schemas.microsoft.com/office/powerpoint/2010/main" val="1279647449"/>
+      </p:ext>
+    </p:extLst>
+  </p:cSld>
+  <p:clrMapOvr>
+    <a:masterClrMapping/>
+  </p:clrMapOvr>
+</p:sld>
+</file>
+
+<file path=ppt/slides/slide5.xml><?xml version="1.0" encoding="utf-8"?>
+<p:sld xmlns:a="http://schemas.openxmlformats.org/drawingml/2006/main" xmlns:r="http://schemas.openxmlformats.org/officeDocument/2006/relationships" xmlns:p="http://schemas.openxmlformats.org/presentationml/2006/main">
+  <p:cSld>
+    <p:spTree>
+      <p:nvGrpSpPr>
+        <p:cNvPr id="1" name=""/>
+        <p:cNvGrpSpPr/>
+        <p:nvPr/>
+      </p:nvGrpSpPr>
+      <p:grpSpPr>
+        <a:xfrm>
+          <a:off x="0" y="0"/>
+          <a:ext cx="0" cy="0"/>
+          <a:chOff x="0" y="0"/>
+          <a:chExt cx="0" cy="0"/>
+        </a:xfrm>
+      </p:grpSpPr>
+      <p:sp>
+        <p:nvSpPr>
+          <p:cNvPr id="2" name="Title 1">
+            <a:extLst>
+              <a:ext uri="{FF2B5EF4-FFF2-40B4-BE49-F238E27FC236}">
+                <a16:creationId xmlns:a16="http://schemas.microsoft.com/office/drawing/2014/main" id="{7B6DDCD2-78D1-13F4-2524-024B80B17489}"/>
+              </a:ext>
+            </a:extLst>
+          </p:cNvPr>
+          <p:cNvSpPr>
+            <a:spLocks noGrp="1"/>
+          </p:cNvSpPr>
+          <p:nvPr>
+            <p:ph type="title"/>
+          </p:nvPr>
+        </p:nvSpPr>
+        <p:spPr/>
+        <p:txBody>
+          <a:bodyPr/>
+          <a:lstStyle/>
+          <a:p>
+            <a:endParaRPr lang="en-US"/>
+          </a:p>
+        </p:txBody>
+      </p:sp>
+      <p:sp>
+        <p:nvSpPr>
+          <p:cNvPr id="3" name="Content Placeholder 2">
+            <a:extLst>
+              <a:ext uri="{FF2B5EF4-FFF2-40B4-BE49-F238E27FC236}">
+                <a16:creationId xmlns:a16="http://schemas.microsoft.com/office/drawing/2014/main" id="{13481C19-73C8-E8AD-FFD0-3220F232C1C0}"/>
+              </a:ext>
+            </a:extLst>
+          </p:cNvPr>
+          <p:cNvSpPr>
+            <a:spLocks noGrp="1"/>
+          </p:cNvSpPr>
+          <p:nvPr>
+            <p:ph idx="1"/>
+          </p:nvPr>
+        </p:nvSpPr>
+        <p:spPr/>
+        <p:txBody>
+          <a:bodyPr/>
+          <a:lstStyle/>
+          <a:p>
+            <a:endParaRPr lang="en-US"/>
+          </a:p>
+        </p:txBody>
+      </p:sp>
+    </p:spTree>
+    <p:extLst>
+      <p:ext uri="{BB962C8B-B14F-4D97-AF65-F5344CB8AC3E}">
+        <p14:creationId xmlns:p14="http://schemas.microsoft.com/office/powerpoint/2010/main" val="4098347069"/>
       </p:ext>
     </p:extLst>
   </p:cSld>
@@ -3658,7 +4487,7 @@
 <file path=ppt/theme/theme1.xml><?xml version="1.0" encoding="utf-8"?>
 <a:theme xmlns:a="http://schemas.openxmlformats.org/drawingml/2006/main" name="Office Theme">
   <a:themeElements>
-    <a:clrScheme name="Office">
+    <a:clrScheme name="Office Theme">
       <a:dk1>
         <a:sysClr val="windowText" lastClr="000000"/>
       </a:dk1>
@@ -3696,7 +4525,7 @@
         <a:srgbClr val="954F72"/>
       </a:folHlink>
     </a:clrScheme>
-    <a:fontScheme name="Office">
+    <a:fontScheme name="Office Theme">
       <a:majorFont>
         <a:latin typeface="Calibri Light" panose="020F0302020204030204"/>
         <a:ea typeface=""/>
@@ -3731,23 +4560,6 @@
         <a:font script="Viet" typeface="Times New Roman"/>
         <a:font script="Uigh" typeface="Microsoft Uighur"/>
         <a:font script="Geor" typeface="Sylfaen"/>
-        <a:font script="Armn" typeface="Arial"/>
-        <a:font script="Bugi" typeface="Leelawadee UI"/>
-        <a:font script="Bopo" typeface="Microsoft JhengHei"/>
-        <a:font script="Java" typeface="Javanese Text"/>
-        <a:font script="Lisu" typeface="Segoe UI"/>
-        <a:font script="Mymr" typeface="Myanmar Text"/>
-        <a:font script="Nkoo" typeface="Ebrima"/>
-        <a:font script="Olck" typeface="Nirmala UI"/>
-        <a:font script="Osma" typeface="Ebrima"/>
-        <a:font script="Phag" typeface="Phagspa"/>
-        <a:font script="Syrn" typeface="Estrangelo Edessa"/>
-        <a:font script="Syrj" typeface="Estrangelo Edessa"/>
-        <a:font script="Syre" typeface="Estrangelo Edessa"/>
-        <a:font script="Sora" typeface="Nirmala UI"/>
-        <a:font script="Tale" typeface="Microsoft Tai Le"/>
-        <a:font script="Talu" typeface="Microsoft New Tai Lue"/>
-        <a:font script="Tfng" typeface="Ebrima"/>
       </a:majorFont>
       <a:minorFont>
         <a:latin typeface="Calibri" panose="020F0502020204030204"/>
@@ -3783,26 +4595,9 @@
         <a:font script="Viet" typeface="Arial"/>
         <a:font script="Uigh" typeface="Microsoft Uighur"/>
         <a:font script="Geor" typeface="Sylfaen"/>
-        <a:font script="Armn" typeface="Arial"/>
-        <a:font script="Bugi" typeface="Leelawadee UI"/>
-        <a:font script="Bopo" typeface="Microsoft JhengHei"/>
-        <a:font script="Java" typeface="Javanese Text"/>
-        <a:font script="Lisu" typeface="Segoe UI"/>
-        <a:font script="Mymr" typeface="Myanmar Text"/>
-        <a:font script="Nkoo" typeface="Ebrima"/>
-        <a:font script="Olck" typeface="Nirmala UI"/>
-        <a:font script="Osma" typeface="Ebrima"/>
-        <a:font script="Phag" typeface="Phagspa"/>
-        <a:font script="Syrn" typeface="Estrangelo Edessa"/>
-        <a:font script="Syrj" typeface="Estrangelo Edessa"/>
-        <a:font script="Syre" typeface="Estrangelo Edessa"/>
-        <a:font script="Sora" typeface="Nirmala UI"/>
-        <a:font script="Tale" typeface="Microsoft Tai Le"/>
-        <a:font script="Talu" typeface="Microsoft New Tai Lue"/>
-        <a:font script="Tfng" typeface="Ebrima"/>
       </a:minorFont>
     </a:fontScheme>
-    <a:fmtScheme name="Office">
+    <a:fmtScheme name="Office Theme">
       <a:fillStyleLst>
         <a:solidFill>
           <a:schemeClr val="phClr"/>
@@ -3944,7 +4739,7 @@
   <a:extraClrSchemeLst/>
   <a:extLst>
     <a:ext uri="{05A4C25C-085E-4340-85A3-A5531E510DB2}">
-      <thm15:themeFamily xmlns:thm15="http://schemas.microsoft.com/office/thememl/2012/main" name="Office Theme" id="{62F939B6-93AF-4DB8-9C6B-D6C7DFDC589F}" vid="{4A3C46E8-61CC-4603-A589-7422A47A8E4A}"/>
+      <thm15:themeFamily xmlns:thm15="http://schemas.microsoft.com/office/thememl/2012/main" name="Office 2013 - 2022 Theme" id="{62F939B6-93AF-4DB8-9C6B-D6C7DFDC589F}" vid="{4A3C46E8-61CC-4603-A589-7422A47A8E4A}"/>
     </a:ext>
   </a:extLst>
 </a:theme>

</xml_diff>

<commit_message>
small changes to docs/src files
</commit_message>
<xml_diff>
--- a/docs/src/images/logo.pptx
+++ b/docs/src/images/logo.pptx
@@ -3328,10 +3328,10 @@
       </p:grpSpPr>
       <p:grpSp>
         <p:nvGrpSpPr>
-          <p:cNvPr id="5" name="Group 4">
+          <p:cNvPr id="10" name="Group 9">
             <a:extLst>
               <a:ext uri="{FF2B5EF4-FFF2-40B4-BE49-F238E27FC236}">
-                <a16:creationId xmlns:a16="http://schemas.microsoft.com/office/drawing/2014/main" id="{D143574F-76D1-7961-7736-12C2EFF43E76}"/>
+                <a16:creationId xmlns:a16="http://schemas.microsoft.com/office/drawing/2014/main" id="{5A5D33D4-46A2-373B-1C43-F11EFF7D6B4F}"/>
               </a:ext>
             </a:extLst>
           </p:cNvPr>
@@ -3346,372 +3346,351 @@
             <a:chExt cx="5195333" cy="5243513"/>
           </a:xfrm>
         </p:grpSpPr>
-        <p:grpSp>
-          <p:nvGrpSpPr>
-            <p:cNvPr id="9" name="Group 8">
+        <p:pic>
+          <p:nvPicPr>
+            <p:cNvPr id="4" name="Picture 3">
               <a:extLst>
                 <a:ext uri="{FF2B5EF4-FFF2-40B4-BE49-F238E27FC236}">
-                  <a16:creationId xmlns:a16="http://schemas.microsoft.com/office/drawing/2014/main" id="{E9BEB3A7-7F71-4173-C752-2FD8389571AE}"/>
+                  <a16:creationId xmlns:a16="http://schemas.microsoft.com/office/drawing/2014/main" id="{6BFA1DA5-1634-CDBB-5393-3B2F5A12E8AA}"/>
                 </a:ext>
               </a:extLst>
             </p:cNvPr>
-            <p:cNvGrpSpPr/>
+            <p:cNvPicPr>
+              <a:picLocks noChangeAspect="1"/>
+            </p:cNvPicPr>
             <p:nvPr/>
-          </p:nvGrpSpPr>
-          <p:grpSpPr>
+          </p:nvPicPr>
+          <p:blipFill>
+            <a:blip r:embed="rId2"/>
+            <a:stretch>
+              <a:fillRect/>
+            </a:stretch>
+          </p:blipFill>
+          <p:spPr>
             <a:xfrm>
               <a:off x="2063233" y="621956"/>
               <a:ext cx="5195333" cy="5243513"/>
-              <a:chOff x="2063234" y="1035844"/>
-              <a:chExt cx="5195333" cy="5243513"/>
             </a:xfrm>
-          </p:grpSpPr>
-          <p:pic>
-            <p:nvPicPr>
-              <p:cNvPr id="4" name="Picture 3">
-                <a:extLst>
-                  <a:ext uri="{FF2B5EF4-FFF2-40B4-BE49-F238E27FC236}">
-                    <a16:creationId xmlns:a16="http://schemas.microsoft.com/office/drawing/2014/main" id="{6BFA1DA5-1634-CDBB-5393-3B2F5A12E8AA}"/>
-                  </a:ext>
-                </a:extLst>
-              </p:cNvPr>
-              <p:cNvPicPr>
-                <a:picLocks noChangeAspect="1"/>
-              </p:cNvPicPr>
-              <p:nvPr/>
-            </p:nvPicPr>
-            <p:blipFill>
-              <a:blip r:embed="rId2"/>
-              <a:stretch>
-                <a:fillRect/>
-              </a:stretch>
-            </p:blipFill>
-            <p:spPr>
-              <a:xfrm>
-                <a:off x="2063234" y="1035844"/>
-                <a:ext cx="5195333" cy="5243513"/>
-              </a:xfrm>
-              <a:prstGeom prst="rect">
-                <a:avLst/>
-              </a:prstGeom>
-            </p:spPr>
-          </p:pic>
-          <p:sp>
-            <p:nvSpPr>
-              <p:cNvPr id="6" name="Freeform 5">
-                <a:extLst>
-                  <a:ext uri="{FF2B5EF4-FFF2-40B4-BE49-F238E27FC236}">
-                    <a16:creationId xmlns:a16="http://schemas.microsoft.com/office/drawing/2014/main" id="{01702F05-938F-83E1-2E7F-5AA8B6BE256E}"/>
-                  </a:ext>
-                </a:extLst>
-              </p:cNvPr>
-              <p:cNvSpPr/>
-              <p:nvPr/>
-            </p:nvSpPr>
-            <p:spPr>
-              <a:xfrm>
-                <a:off x="3807847" y="2879609"/>
-                <a:ext cx="1632399" cy="598329"/>
-              </a:xfrm>
-              <a:custGeom>
-                <a:avLst/>
-                <a:gdLst>
-                  <a:gd name="connsiteX0" fmla="*/ 561399 w 2135018"/>
-                  <a:gd name="connsiteY0" fmla="*/ 191386 h 782556"/>
-                  <a:gd name="connsiteX1" fmla="*/ 1050497 w 2135018"/>
-                  <a:gd name="connsiteY1" fmla="*/ 0 h 782556"/>
-                  <a:gd name="connsiteX2" fmla="*/ 2135018 w 2135018"/>
-                  <a:gd name="connsiteY2" fmla="*/ 395531 h 782556"/>
-                  <a:gd name="connsiteX3" fmla="*/ 1071762 w 2135018"/>
-                  <a:gd name="connsiteY3" fmla="*/ 782556 h 782556"/>
-                  <a:gd name="connsiteX4" fmla="*/ 0 w 2135018"/>
-                  <a:gd name="connsiteY4" fmla="*/ 391278 h 782556"/>
-                  <a:gd name="connsiteX5" fmla="*/ 0 w 2135018"/>
-                  <a:gd name="connsiteY5" fmla="*/ 391278 h 782556"/>
-                  <a:gd name="connsiteX0" fmla="*/ 12759 w 2135018"/>
-                  <a:gd name="connsiteY0" fmla="*/ 382772 h 782556"/>
-                  <a:gd name="connsiteX1" fmla="*/ 1050497 w 2135018"/>
-                  <a:gd name="connsiteY1" fmla="*/ 0 h 782556"/>
-                  <a:gd name="connsiteX2" fmla="*/ 2135018 w 2135018"/>
-                  <a:gd name="connsiteY2" fmla="*/ 395531 h 782556"/>
-                  <a:gd name="connsiteX3" fmla="*/ 1071762 w 2135018"/>
-                  <a:gd name="connsiteY3" fmla="*/ 782556 h 782556"/>
-                  <a:gd name="connsiteX4" fmla="*/ 0 w 2135018"/>
-                  <a:gd name="connsiteY4" fmla="*/ 391278 h 782556"/>
-                  <a:gd name="connsiteX5" fmla="*/ 0 w 2135018"/>
-                  <a:gd name="connsiteY5" fmla="*/ 391278 h 782556"/>
-                  <a:gd name="connsiteX0" fmla="*/ 12759 w 2135018"/>
-                  <a:gd name="connsiteY0" fmla="*/ 382772 h 782556"/>
-                  <a:gd name="connsiteX1" fmla="*/ 1050497 w 2135018"/>
-                  <a:gd name="connsiteY1" fmla="*/ 0 h 782556"/>
-                  <a:gd name="connsiteX2" fmla="*/ 2135018 w 2135018"/>
-                  <a:gd name="connsiteY2" fmla="*/ 395531 h 782556"/>
-                  <a:gd name="connsiteX3" fmla="*/ 1071762 w 2135018"/>
-                  <a:gd name="connsiteY3" fmla="*/ 782556 h 782556"/>
-                  <a:gd name="connsiteX4" fmla="*/ 0 w 2135018"/>
-                  <a:gd name="connsiteY4" fmla="*/ 391278 h 782556"/>
-                  <a:gd name="connsiteX5" fmla="*/ 0 w 2135018"/>
-                  <a:gd name="connsiteY5" fmla="*/ 391278 h 782556"/>
-                </a:gdLst>
-                <a:ahLst/>
-                <a:cxnLst>
-                  <a:cxn ang="0">
-                    <a:pos x="connsiteX0" y="connsiteY0"/>
-                  </a:cxn>
-                  <a:cxn ang="0">
-                    <a:pos x="connsiteX1" y="connsiteY1"/>
-                  </a:cxn>
-                  <a:cxn ang="0">
-                    <a:pos x="connsiteX2" y="connsiteY2"/>
-                  </a:cxn>
-                  <a:cxn ang="0">
-                    <a:pos x="connsiteX3" y="connsiteY3"/>
-                  </a:cxn>
-                  <a:cxn ang="0">
-                    <a:pos x="connsiteX4" y="connsiteY4"/>
-                  </a:cxn>
-                  <a:cxn ang="0">
-                    <a:pos x="connsiteX5" y="connsiteY5"/>
-                  </a:cxn>
-                </a:cxnLst>
-                <a:rect l="l" t="t" r="r" b="b"/>
-                <a:pathLst>
-                  <a:path w="2135018" h="782556">
-                    <a:moveTo>
-                      <a:pt x="12759" y="382772"/>
-                    </a:moveTo>
-                    <a:cubicBezTo>
-                      <a:pt x="31189" y="382771"/>
-                      <a:pt x="704584" y="127591"/>
-                      <a:pt x="1050497" y="0"/>
-                    </a:cubicBezTo>
-                    <a:lnTo>
-                      <a:pt x="2135018" y="395531"/>
-                    </a:lnTo>
-                    <a:lnTo>
-                      <a:pt x="1071762" y="782556"/>
-                    </a:lnTo>
-                    <a:lnTo>
-                      <a:pt x="0" y="391278"/>
-                    </a:lnTo>
-                    <a:lnTo>
-                      <a:pt x="0" y="391278"/>
-                    </a:lnTo>
-                  </a:path>
-                </a:pathLst>
-              </a:custGeom>
+            <a:prstGeom prst="rect">
+              <a:avLst/>
+            </a:prstGeom>
+          </p:spPr>
+        </p:pic>
+        <p:sp>
+          <p:nvSpPr>
+            <p:cNvPr id="6" name="Freeform 5">
+              <a:extLst>
+                <a:ext uri="{FF2B5EF4-FFF2-40B4-BE49-F238E27FC236}">
+                  <a16:creationId xmlns:a16="http://schemas.microsoft.com/office/drawing/2014/main" id="{01702F05-938F-83E1-2E7F-5AA8B6BE256E}"/>
+                </a:ext>
+              </a:extLst>
+            </p:cNvPr>
+            <p:cNvSpPr/>
+            <p:nvPr/>
+          </p:nvSpPr>
+          <p:spPr>
+            <a:xfrm>
+              <a:off x="3807846" y="2465721"/>
+              <a:ext cx="1632399" cy="598329"/>
+            </a:xfrm>
+            <a:custGeom>
+              <a:avLst/>
+              <a:gdLst>
+                <a:gd name="connsiteX0" fmla="*/ 561399 w 2135018"/>
+                <a:gd name="connsiteY0" fmla="*/ 191386 h 782556"/>
+                <a:gd name="connsiteX1" fmla="*/ 1050497 w 2135018"/>
+                <a:gd name="connsiteY1" fmla="*/ 0 h 782556"/>
+                <a:gd name="connsiteX2" fmla="*/ 2135018 w 2135018"/>
+                <a:gd name="connsiteY2" fmla="*/ 395531 h 782556"/>
+                <a:gd name="connsiteX3" fmla="*/ 1071762 w 2135018"/>
+                <a:gd name="connsiteY3" fmla="*/ 782556 h 782556"/>
+                <a:gd name="connsiteX4" fmla="*/ 0 w 2135018"/>
+                <a:gd name="connsiteY4" fmla="*/ 391278 h 782556"/>
+                <a:gd name="connsiteX5" fmla="*/ 0 w 2135018"/>
+                <a:gd name="connsiteY5" fmla="*/ 391278 h 782556"/>
+                <a:gd name="connsiteX0" fmla="*/ 12759 w 2135018"/>
+                <a:gd name="connsiteY0" fmla="*/ 382772 h 782556"/>
+                <a:gd name="connsiteX1" fmla="*/ 1050497 w 2135018"/>
+                <a:gd name="connsiteY1" fmla="*/ 0 h 782556"/>
+                <a:gd name="connsiteX2" fmla="*/ 2135018 w 2135018"/>
+                <a:gd name="connsiteY2" fmla="*/ 395531 h 782556"/>
+                <a:gd name="connsiteX3" fmla="*/ 1071762 w 2135018"/>
+                <a:gd name="connsiteY3" fmla="*/ 782556 h 782556"/>
+                <a:gd name="connsiteX4" fmla="*/ 0 w 2135018"/>
+                <a:gd name="connsiteY4" fmla="*/ 391278 h 782556"/>
+                <a:gd name="connsiteX5" fmla="*/ 0 w 2135018"/>
+                <a:gd name="connsiteY5" fmla="*/ 391278 h 782556"/>
+                <a:gd name="connsiteX0" fmla="*/ 12759 w 2135018"/>
+                <a:gd name="connsiteY0" fmla="*/ 382772 h 782556"/>
+                <a:gd name="connsiteX1" fmla="*/ 1050497 w 2135018"/>
+                <a:gd name="connsiteY1" fmla="*/ 0 h 782556"/>
+                <a:gd name="connsiteX2" fmla="*/ 2135018 w 2135018"/>
+                <a:gd name="connsiteY2" fmla="*/ 395531 h 782556"/>
+                <a:gd name="connsiteX3" fmla="*/ 1071762 w 2135018"/>
+                <a:gd name="connsiteY3" fmla="*/ 782556 h 782556"/>
+                <a:gd name="connsiteX4" fmla="*/ 0 w 2135018"/>
+                <a:gd name="connsiteY4" fmla="*/ 391278 h 782556"/>
+                <a:gd name="connsiteX5" fmla="*/ 0 w 2135018"/>
+                <a:gd name="connsiteY5" fmla="*/ 391278 h 782556"/>
+              </a:gdLst>
+              <a:ahLst/>
+              <a:cxnLst>
+                <a:cxn ang="0">
+                  <a:pos x="connsiteX0" y="connsiteY0"/>
+                </a:cxn>
+                <a:cxn ang="0">
+                  <a:pos x="connsiteX1" y="connsiteY1"/>
+                </a:cxn>
+                <a:cxn ang="0">
+                  <a:pos x="connsiteX2" y="connsiteY2"/>
+                </a:cxn>
+                <a:cxn ang="0">
+                  <a:pos x="connsiteX3" y="connsiteY3"/>
+                </a:cxn>
+                <a:cxn ang="0">
+                  <a:pos x="connsiteX4" y="connsiteY4"/>
+                </a:cxn>
+                <a:cxn ang="0">
+                  <a:pos x="connsiteX5" y="connsiteY5"/>
+                </a:cxn>
+              </a:cxnLst>
+              <a:rect l="l" t="t" r="r" b="b"/>
+              <a:pathLst>
+                <a:path w="2135018" h="782556">
+                  <a:moveTo>
+                    <a:pt x="12759" y="382772"/>
+                  </a:moveTo>
+                  <a:cubicBezTo>
+                    <a:pt x="31189" y="382771"/>
+                    <a:pt x="704584" y="127591"/>
+                    <a:pt x="1050497" y="0"/>
+                  </a:cubicBezTo>
+                  <a:lnTo>
+                    <a:pt x="2135018" y="395531"/>
+                  </a:lnTo>
+                  <a:lnTo>
+                    <a:pt x="1071762" y="782556"/>
+                  </a:lnTo>
+                  <a:lnTo>
+                    <a:pt x="0" y="391278"/>
+                  </a:lnTo>
+                  <a:lnTo>
+                    <a:pt x="0" y="391278"/>
+                  </a:lnTo>
+                </a:path>
+              </a:pathLst>
+            </a:custGeom>
+            <a:solidFill>
+              <a:srgbClr val="FDCC02"/>
+            </a:solidFill>
+            <a:ln>
               <a:solidFill>
                 <a:srgbClr val="FDCC02"/>
               </a:solidFill>
-              <a:ln>
+            </a:ln>
+          </p:spPr>
+          <p:style>
+            <a:lnRef idx="2">
+              <a:schemeClr val="accent1">
+                <a:shade val="15000"/>
+              </a:schemeClr>
+            </a:lnRef>
+            <a:fillRef idx="1">
+              <a:schemeClr val="accent1"/>
+            </a:fillRef>
+            <a:effectRef idx="0">
+              <a:schemeClr val="accent1"/>
+            </a:effectRef>
+            <a:fontRef idx="minor">
+              <a:schemeClr val="lt1"/>
+            </a:fontRef>
+          </p:style>
+          <p:txBody>
+            <a:bodyPr rtlCol="0" anchor="ctr"/>
+            <a:lstStyle/>
+            <a:p>
+              <a:pPr algn="ctr"/>
+              <a:endParaRPr lang="en-US" sz="1376">
                 <a:solidFill>
                   <a:srgbClr val="FDCC02"/>
                 </a:solidFill>
-              </a:ln>
-            </p:spPr>
-            <p:style>
-              <a:lnRef idx="2">
-                <a:schemeClr val="accent1">
-                  <a:shade val="15000"/>
-                </a:schemeClr>
-              </a:lnRef>
-              <a:fillRef idx="1">
-                <a:schemeClr val="accent1"/>
-              </a:fillRef>
-              <a:effectRef idx="0">
-                <a:schemeClr val="accent1"/>
-              </a:effectRef>
-              <a:fontRef idx="minor">
-                <a:schemeClr val="lt1"/>
-              </a:fontRef>
-            </p:style>
-            <p:txBody>
-              <a:bodyPr rtlCol="0" anchor="ctr"/>
-              <a:lstStyle/>
-              <a:p>
-                <a:pPr algn="ctr"/>
-                <a:endParaRPr lang="en-US" sz="1376">
-                  <a:solidFill>
-                    <a:srgbClr val="FDCC02"/>
-                  </a:solidFill>
-                </a:endParaRPr>
-              </a:p>
-            </p:txBody>
-          </p:sp>
-          <p:sp>
-            <p:nvSpPr>
-              <p:cNvPr id="7" name="Freeform 6">
-                <a:extLst>
-                  <a:ext uri="{FF2B5EF4-FFF2-40B4-BE49-F238E27FC236}">
-                    <a16:creationId xmlns:a16="http://schemas.microsoft.com/office/drawing/2014/main" id="{E71D52BC-6DBB-859F-DFF3-F80DF4F44517}"/>
-                  </a:ext>
-                </a:extLst>
-              </p:cNvPr>
-              <p:cNvSpPr/>
-              <p:nvPr/>
-            </p:nvSpPr>
-            <p:spPr>
-              <a:xfrm>
-                <a:off x="3160741" y="1152908"/>
-                <a:ext cx="2913604" cy="2003103"/>
-              </a:xfrm>
-              <a:custGeom>
-                <a:avLst/>
-                <a:gdLst>
-                  <a:gd name="connsiteX0" fmla="*/ 599676 w 3810708"/>
-                  <a:gd name="connsiteY0" fmla="*/ 2607103 h 2619862"/>
-                  <a:gd name="connsiteX1" fmla="*/ 1909607 w 3810708"/>
-                  <a:gd name="connsiteY1" fmla="*/ 2143524 h 2619862"/>
-                  <a:gd name="connsiteX2" fmla="*/ 3202526 w 3810708"/>
-                  <a:gd name="connsiteY2" fmla="*/ 2619862 h 2619862"/>
-                  <a:gd name="connsiteX3" fmla="*/ 3810708 w 3810708"/>
-                  <a:gd name="connsiteY3" fmla="*/ 1956391 h 2619862"/>
-                  <a:gd name="connsiteX4" fmla="*/ 3547021 w 3810708"/>
-                  <a:gd name="connsiteY4" fmla="*/ 229663 h 2619862"/>
-                  <a:gd name="connsiteX5" fmla="*/ 1841559 w 3810708"/>
-                  <a:gd name="connsiteY5" fmla="*/ 0 h 2619862"/>
-                  <a:gd name="connsiteX6" fmla="*/ 199892 w 3810708"/>
-                  <a:gd name="connsiteY6" fmla="*/ 327483 h 2619862"/>
-                  <a:gd name="connsiteX7" fmla="*/ 0 w 3810708"/>
-                  <a:gd name="connsiteY7" fmla="*/ 1956391 h 2619862"/>
-                  <a:gd name="connsiteX8" fmla="*/ 599676 w 3810708"/>
-                  <a:gd name="connsiteY8" fmla="*/ 2607103 h 2619862"/>
-                </a:gdLst>
-                <a:ahLst/>
-                <a:cxnLst>
-                  <a:cxn ang="0">
-                    <a:pos x="connsiteX0" y="connsiteY0"/>
-                  </a:cxn>
-                  <a:cxn ang="0">
-                    <a:pos x="connsiteX1" y="connsiteY1"/>
-                  </a:cxn>
-                  <a:cxn ang="0">
-                    <a:pos x="connsiteX2" y="connsiteY2"/>
-                  </a:cxn>
-                  <a:cxn ang="0">
-                    <a:pos x="connsiteX3" y="connsiteY3"/>
-                  </a:cxn>
-                  <a:cxn ang="0">
-                    <a:pos x="connsiteX4" y="connsiteY4"/>
-                  </a:cxn>
-                  <a:cxn ang="0">
-                    <a:pos x="connsiteX5" y="connsiteY5"/>
-                  </a:cxn>
-                  <a:cxn ang="0">
-                    <a:pos x="connsiteX6" y="connsiteY6"/>
-                  </a:cxn>
-                  <a:cxn ang="0">
-                    <a:pos x="connsiteX7" y="connsiteY7"/>
-                  </a:cxn>
-                  <a:cxn ang="0">
-                    <a:pos x="connsiteX8" y="connsiteY8"/>
-                  </a:cxn>
-                </a:cxnLst>
-                <a:rect l="l" t="t" r="r" b="b"/>
-                <a:pathLst>
-                  <a:path w="3810708" h="2619862">
-                    <a:moveTo>
-                      <a:pt x="599676" y="2607103"/>
-                    </a:moveTo>
-                    <a:lnTo>
-                      <a:pt x="1909607" y="2143524"/>
-                    </a:lnTo>
-                    <a:lnTo>
-                      <a:pt x="3202526" y="2619862"/>
-                    </a:lnTo>
-                    <a:lnTo>
-                      <a:pt x="3810708" y="1956391"/>
-                    </a:lnTo>
-                    <a:lnTo>
-                      <a:pt x="3547021" y="229663"/>
-                    </a:lnTo>
-                    <a:lnTo>
-                      <a:pt x="1841559" y="0"/>
-                    </a:lnTo>
-                    <a:lnTo>
-                      <a:pt x="199892" y="327483"/>
-                    </a:lnTo>
-                    <a:lnTo>
-                      <a:pt x="0" y="1956391"/>
-                    </a:lnTo>
-                    <a:lnTo>
-                      <a:pt x="599676" y="2607103"/>
-                    </a:lnTo>
-                    <a:close/>
-                  </a:path>
-                </a:pathLst>
-              </a:custGeom>
-              <a:solidFill>
-                <a:srgbClr val="DCDDDA"/>
-              </a:solidFill>
-              <a:ln>
-                <a:noFill/>
-              </a:ln>
-            </p:spPr>
-            <p:style>
-              <a:lnRef idx="2">
-                <a:schemeClr val="accent1">
-                  <a:shade val="15000"/>
-                </a:schemeClr>
-              </a:lnRef>
-              <a:fillRef idx="1">
-                <a:schemeClr val="accent1"/>
-              </a:fillRef>
-              <a:effectRef idx="0">
-                <a:schemeClr val="accent1"/>
-              </a:effectRef>
-              <a:fontRef idx="minor">
-                <a:schemeClr val="lt1"/>
-              </a:fontRef>
-            </p:style>
-            <p:txBody>
-              <a:bodyPr rtlCol="0" anchor="ctr"/>
-              <a:lstStyle/>
-              <a:p>
-                <a:pPr algn="ctr"/>
-                <a:endParaRPr lang="en-US" sz="1376"/>
-              </a:p>
-            </p:txBody>
-          </p:sp>
-          <p:sp>
-            <p:nvSpPr>
-              <p:cNvPr id="8" name="TextBox 7">
-                <a:extLst>
-                  <a:ext uri="{FF2B5EF4-FFF2-40B4-BE49-F238E27FC236}">
-                    <a16:creationId xmlns:a16="http://schemas.microsoft.com/office/drawing/2014/main" id="{2CE4C1EF-F3C0-EEAF-3F40-BB2F59EE595B}"/>
-                  </a:ext>
-                </a:extLst>
-              </p:cNvPr>
-              <p:cNvSpPr txBox="1"/>
-              <p:nvPr/>
-            </p:nvSpPr>
-            <p:spPr>
-              <a:xfrm>
-                <a:off x="2618557" y="1264654"/>
-                <a:ext cx="4200189" cy="1445460"/>
-              </a:xfrm>
-              <a:prstGeom prst="rect">
-                <a:avLst/>
-              </a:prstGeom>
+              </a:endParaRPr>
+            </a:p>
+          </p:txBody>
+        </p:sp>
+        <p:sp>
+          <p:nvSpPr>
+            <p:cNvPr id="7" name="Freeform 6">
+              <a:extLst>
+                <a:ext uri="{FF2B5EF4-FFF2-40B4-BE49-F238E27FC236}">
+                  <a16:creationId xmlns:a16="http://schemas.microsoft.com/office/drawing/2014/main" id="{E71D52BC-6DBB-859F-DFF3-F80DF4F44517}"/>
+                </a:ext>
+              </a:extLst>
+            </p:cNvPr>
+            <p:cNvSpPr/>
+            <p:nvPr/>
+          </p:nvSpPr>
+          <p:spPr>
+            <a:xfrm>
+              <a:off x="3160740" y="739020"/>
+              <a:ext cx="2913604" cy="2003103"/>
+            </a:xfrm>
+            <a:custGeom>
+              <a:avLst/>
+              <a:gdLst>
+                <a:gd name="connsiteX0" fmla="*/ 599676 w 3810708"/>
+                <a:gd name="connsiteY0" fmla="*/ 2607103 h 2619862"/>
+                <a:gd name="connsiteX1" fmla="*/ 1909607 w 3810708"/>
+                <a:gd name="connsiteY1" fmla="*/ 2143524 h 2619862"/>
+                <a:gd name="connsiteX2" fmla="*/ 3202526 w 3810708"/>
+                <a:gd name="connsiteY2" fmla="*/ 2619862 h 2619862"/>
+                <a:gd name="connsiteX3" fmla="*/ 3810708 w 3810708"/>
+                <a:gd name="connsiteY3" fmla="*/ 1956391 h 2619862"/>
+                <a:gd name="connsiteX4" fmla="*/ 3547021 w 3810708"/>
+                <a:gd name="connsiteY4" fmla="*/ 229663 h 2619862"/>
+                <a:gd name="connsiteX5" fmla="*/ 1841559 w 3810708"/>
+                <a:gd name="connsiteY5" fmla="*/ 0 h 2619862"/>
+                <a:gd name="connsiteX6" fmla="*/ 199892 w 3810708"/>
+                <a:gd name="connsiteY6" fmla="*/ 327483 h 2619862"/>
+                <a:gd name="connsiteX7" fmla="*/ 0 w 3810708"/>
+                <a:gd name="connsiteY7" fmla="*/ 1956391 h 2619862"/>
+                <a:gd name="connsiteX8" fmla="*/ 599676 w 3810708"/>
+                <a:gd name="connsiteY8" fmla="*/ 2607103 h 2619862"/>
+              </a:gdLst>
+              <a:ahLst/>
+              <a:cxnLst>
+                <a:cxn ang="0">
+                  <a:pos x="connsiteX0" y="connsiteY0"/>
+                </a:cxn>
+                <a:cxn ang="0">
+                  <a:pos x="connsiteX1" y="connsiteY1"/>
+                </a:cxn>
+                <a:cxn ang="0">
+                  <a:pos x="connsiteX2" y="connsiteY2"/>
+                </a:cxn>
+                <a:cxn ang="0">
+                  <a:pos x="connsiteX3" y="connsiteY3"/>
+                </a:cxn>
+                <a:cxn ang="0">
+                  <a:pos x="connsiteX4" y="connsiteY4"/>
+                </a:cxn>
+                <a:cxn ang="0">
+                  <a:pos x="connsiteX5" y="connsiteY5"/>
+                </a:cxn>
+                <a:cxn ang="0">
+                  <a:pos x="connsiteX6" y="connsiteY6"/>
+                </a:cxn>
+                <a:cxn ang="0">
+                  <a:pos x="connsiteX7" y="connsiteY7"/>
+                </a:cxn>
+                <a:cxn ang="0">
+                  <a:pos x="connsiteX8" y="connsiteY8"/>
+                </a:cxn>
+              </a:cxnLst>
+              <a:rect l="l" t="t" r="r" b="b"/>
+              <a:pathLst>
+                <a:path w="3810708" h="2619862">
+                  <a:moveTo>
+                    <a:pt x="599676" y="2607103"/>
+                  </a:moveTo>
+                  <a:lnTo>
+                    <a:pt x="1909607" y="2143524"/>
+                  </a:lnTo>
+                  <a:lnTo>
+                    <a:pt x="3202526" y="2619862"/>
+                  </a:lnTo>
+                  <a:lnTo>
+                    <a:pt x="3810708" y="1956391"/>
+                  </a:lnTo>
+                  <a:lnTo>
+                    <a:pt x="3547021" y="229663"/>
+                  </a:lnTo>
+                  <a:lnTo>
+                    <a:pt x="1841559" y="0"/>
+                  </a:lnTo>
+                  <a:lnTo>
+                    <a:pt x="199892" y="327483"/>
+                  </a:lnTo>
+                  <a:lnTo>
+                    <a:pt x="0" y="1956391"/>
+                  </a:lnTo>
+                  <a:lnTo>
+                    <a:pt x="599676" y="2607103"/>
+                  </a:lnTo>
+                  <a:close/>
+                </a:path>
+              </a:pathLst>
+            </a:custGeom>
+            <a:solidFill>
+              <a:srgbClr val="DCDDDA"/>
+            </a:solidFill>
+            <a:ln>
               <a:noFill/>
-            </p:spPr>
-            <p:txBody>
-              <a:bodyPr wrap="none" rtlCol="0">
-                <a:spAutoFit/>
-              </a:bodyPr>
-              <a:lstStyle/>
-              <a:p>
-                <a:r>
-                  <a:rPr lang="en-US" sz="8793">
-                    <a:latin typeface="Kefa" panose="02000506000000020004" pitchFamily="2" charset="77"/>
-                    <a:cs typeface="Apple Chancery" panose="03020702040506060504" pitchFamily="66" charset="-79"/>
-                  </a:rPr>
-                  <a:t>xApRES</a:t>
-                </a:r>
-              </a:p>
-            </p:txBody>
-          </p:sp>
-        </p:grpSp>
+            </a:ln>
+          </p:spPr>
+          <p:style>
+            <a:lnRef idx="2">
+              <a:schemeClr val="accent1">
+                <a:shade val="15000"/>
+              </a:schemeClr>
+            </a:lnRef>
+            <a:fillRef idx="1">
+              <a:schemeClr val="accent1"/>
+            </a:fillRef>
+            <a:effectRef idx="0">
+              <a:schemeClr val="accent1"/>
+            </a:effectRef>
+            <a:fontRef idx="minor">
+              <a:schemeClr val="lt1"/>
+            </a:fontRef>
+          </p:style>
+          <p:txBody>
+            <a:bodyPr rtlCol="0" anchor="ctr"/>
+            <a:lstStyle/>
+            <a:p>
+              <a:pPr algn="ctr"/>
+              <a:endParaRPr lang="en-US" sz="1376"/>
+            </a:p>
+          </p:txBody>
+        </p:sp>
+        <p:sp>
+          <p:nvSpPr>
+            <p:cNvPr id="8" name="TextBox 7">
+              <a:extLst>
+                <a:ext uri="{FF2B5EF4-FFF2-40B4-BE49-F238E27FC236}">
+                  <a16:creationId xmlns:a16="http://schemas.microsoft.com/office/drawing/2014/main" id="{2CE4C1EF-F3C0-EEAF-3F40-BB2F59EE595B}"/>
+                </a:ext>
+              </a:extLst>
+            </p:cNvPr>
+            <p:cNvSpPr txBox="1"/>
+            <p:nvPr/>
+          </p:nvSpPr>
+          <p:spPr>
+            <a:xfrm>
+              <a:off x="2618556" y="850766"/>
+              <a:ext cx="4200189" cy="1445460"/>
+            </a:xfrm>
+            <a:prstGeom prst="rect">
+              <a:avLst/>
+            </a:prstGeom>
+            <a:noFill/>
+          </p:spPr>
+          <p:txBody>
+            <a:bodyPr wrap="none" rtlCol="0">
+              <a:spAutoFit/>
+            </a:bodyPr>
+            <a:lstStyle/>
+            <a:p>
+              <a:r>
+                <a:rPr lang="en-US" sz="8793">
+                  <a:latin typeface="Kefa" panose="02000506000000020004" pitchFamily="2" charset="77"/>
+                  <a:cs typeface="Apple Chancery" panose="03020702040506060504" pitchFamily="66" charset="-79"/>
+                </a:rPr>
+                <a:t>xApRES</a:t>
+              </a:r>
+            </a:p>
+          </p:txBody>
+        </p:sp>
         <p:sp>
           <p:nvSpPr>
             <p:cNvPr id="2" name="Freeform 1">

</xml_diff>